<commit_message>
Started page on PEPPOL PKI
</commit_message>
<xml_diff>
--- a/docs/PEPPOL practical.pptx
+++ b/docs/PEPPOL practical.pptx
@@ -7,6 +7,7 @@
   <p:sldIdLst>
     <p:sldId id="256" r:id="rId2"/>
     <p:sldId id="257" r:id="rId3"/>
+    <p:sldId id="258" r:id="rId4"/>
   </p:sldIdLst>
   <p:sldSz cx="9144000" cy="6858000" type="screen4x3"/>
   <p:notesSz cx="6858000" cy="9144000"/>
@@ -289,7 +290,7 @@
           <a:p>
             <a:fld id="{80F9A3F1-91AA-4A03-9A50-C623FA2DD738}" type="datetimeFigureOut">
               <a:rPr lang="de-AT" smtClean="0"/>
-              <a:t>08.11.2014</a:t>
+              <a:t>31.03.2017</a:t>
             </a:fld>
             <a:endParaRPr lang="de-AT"/>
           </a:p>
@@ -454,7 +455,7 @@
           <a:p>
             <a:fld id="{80F9A3F1-91AA-4A03-9A50-C623FA2DD738}" type="datetimeFigureOut">
               <a:rPr lang="de-AT" smtClean="0"/>
-              <a:t>08.11.2014</a:t>
+              <a:t>31.03.2017</a:t>
             </a:fld>
             <a:endParaRPr lang="de-AT"/>
           </a:p>
@@ -629,7 +630,7 @@
           <a:p>
             <a:fld id="{80F9A3F1-91AA-4A03-9A50-C623FA2DD738}" type="datetimeFigureOut">
               <a:rPr lang="de-AT" smtClean="0"/>
-              <a:t>08.11.2014</a:t>
+              <a:t>31.03.2017</a:t>
             </a:fld>
             <a:endParaRPr lang="de-AT"/>
           </a:p>
@@ -794,7 +795,7 @@
           <a:p>
             <a:fld id="{80F9A3F1-91AA-4A03-9A50-C623FA2DD738}" type="datetimeFigureOut">
               <a:rPr lang="de-AT" smtClean="0"/>
-              <a:t>08.11.2014</a:t>
+              <a:t>31.03.2017</a:t>
             </a:fld>
             <a:endParaRPr lang="de-AT"/>
           </a:p>
@@ -1035,7 +1036,7 @@
           <a:p>
             <a:fld id="{80F9A3F1-91AA-4A03-9A50-C623FA2DD738}" type="datetimeFigureOut">
               <a:rPr lang="de-AT" smtClean="0"/>
-              <a:t>08.11.2014</a:t>
+              <a:t>31.03.2017</a:t>
             </a:fld>
             <a:endParaRPr lang="de-AT"/>
           </a:p>
@@ -1318,7 +1319,7 @@
           <a:p>
             <a:fld id="{80F9A3F1-91AA-4A03-9A50-C623FA2DD738}" type="datetimeFigureOut">
               <a:rPr lang="de-AT" smtClean="0"/>
-              <a:t>08.11.2014</a:t>
+              <a:t>31.03.2017</a:t>
             </a:fld>
             <a:endParaRPr lang="de-AT"/>
           </a:p>
@@ -1735,7 +1736,7 @@
           <a:p>
             <a:fld id="{80F9A3F1-91AA-4A03-9A50-C623FA2DD738}" type="datetimeFigureOut">
               <a:rPr lang="de-AT" smtClean="0"/>
-              <a:t>08.11.2014</a:t>
+              <a:t>31.03.2017</a:t>
             </a:fld>
             <a:endParaRPr lang="de-AT"/>
           </a:p>
@@ -1848,7 +1849,7 @@
           <a:p>
             <a:fld id="{80F9A3F1-91AA-4A03-9A50-C623FA2DD738}" type="datetimeFigureOut">
               <a:rPr lang="de-AT" smtClean="0"/>
-              <a:t>08.11.2014</a:t>
+              <a:t>31.03.2017</a:t>
             </a:fld>
             <a:endParaRPr lang="de-AT"/>
           </a:p>
@@ -1938,7 +1939,7 @@
           <a:p>
             <a:fld id="{80F9A3F1-91AA-4A03-9A50-C623FA2DD738}" type="datetimeFigureOut">
               <a:rPr lang="de-AT" smtClean="0"/>
-              <a:t>08.11.2014</a:t>
+              <a:t>31.03.2017</a:t>
             </a:fld>
             <a:endParaRPr lang="de-AT"/>
           </a:p>
@@ -2210,7 +2211,7 @@
           <a:p>
             <a:fld id="{80F9A3F1-91AA-4A03-9A50-C623FA2DD738}" type="datetimeFigureOut">
               <a:rPr lang="de-AT" smtClean="0"/>
-              <a:t>08.11.2014</a:t>
+              <a:t>31.03.2017</a:t>
             </a:fld>
             <a:endParaRPr lang="de-AT"/>
           </a:p>
@@ -2458,7 +2459,7 @@
           <a:p>
             <a:fld id="{80F9A3F1-91AA-4A03-9A50-C623FA2DD738}" type="datetimeFigureOut">
               <a:rPr lang="de-AT" smtClean="0"/>
-              <a:t>08.11.2014</a:t>
+              <a:t>31.03.2017</a:t>
             </a:fld>
             <a:endParaRPr lang="de-AT"/>
           </a:p>
@@ -2666,7 +2667,7 @@
           <a:p>
             <a:fld id="{80F9A3F1-91AA-4A03-9A50-C623FA2DD738}" type="datetimeFigureOut">
               <a:rPr lang="de-AT" smtClean="0"/>
-              <a:t>08.11.2014</a:t>
+              <a:t>31.03.2017</a:t>
             </a:fld>
             <a:endParaRPr lang="de-AT"/>
           </a:p>
@@ -3338,6 +3339,2309 @@
 </p:sld>
 </file>
 
+<file path=ppt/slides/slide3.xml><?xml version="1.0" encoding="utf-8"?>
+<p:sld xmlns:a="http://schemas.openxmlformats.org/drawingml/2006/main" xmlns:r="http://schemas.openxmlformats.org/officeDocument/2006/relationships" xmlns:p="http://schemas.openxmlformats.org/presentationml/2006/main">
+  <p:cSld>
+    <p:spTree>
+      <p:nvGrpSpPr>
+        <p:cNvPr id="1" name=""/>
+        <p:cNvGrpSpPr/>
+        <p:nvPr/>
+      </p:nvGrpSpPr>
+      <p:grpSpPr>
+        <a:xfrm>
+          <a:off x="0" y="0"/>
+          <a:ext cx="0" cy="0"/>
+          <a:chOff x="0" y="0"/>
+          <a:chExt cx="0" cy="0"/>
+        </a:xfrm>
+      </p:grpSpPr>
+      <p:sp>
+        <p:nvSpPr>
+          <p:cNvPr id="5" name="Rechteck 4"/>
+          <p:cNvSpPr/>
+          <p:nvPr/>
+        </p:nvSpPr>
+        <p:spPr>
+          <a:xfrm>
+            <a:off x="1835696" y="2312272"/>
+            <a:ext cx="1296145" cy="576064"/>
+          </a:xfrm>
+          <a:prstGeom prst="rect">
+            <a:avLst/>
+          </a:prstGeom>
+          <a:solidFill>
+            <a:srgbClr val="9BBB59"/>
+          </a:solidFill>
+          <a:ln w="25400" cap="rnd" cmpd="sng" algn="ctr">
+            <a:solidFill>
+              <a:srgbClr val="9BBB59">
+                <a:shade val="50000"/>
+              </a:srgbClr>
+            </a:solidFill>
+            <a:prstDash val="solid"/>
+          </a:ln>
+          <a:effectLst/>
+        </p:spPr>
+        <p:txBody>
+          <a:bodyPr lIns="91431" tIns="45715" rIns="91431" bIns="45715" rtlCol="0" anchor="ctr"/>
+          <a:lstStyle>
+            <a:defPPr>
+              <a:defRPr lang="en-US"/>
+            </a:defPPr>
+            <a:lvl1pPr marL="0" algn="l" defTabSz="914400" rtl="0" eaLnBrk="1" latinLnBrk="0" hangingPunct="1">
+              <a:defRPr sz="1800" kern="1200">
+                <a:solidFill>
+                  <a:schemeClr val="tx1"/>
+                </a:solidFill>
+                <a:latin typeface="+mn-lt"/>
+                <a:ea typeface="+mn-ea"/>
+                <a:cs typeface="+mn-cs"/>
+              </a:defRPr>
+            </a:lvl1pPr>
+            <a:lvl2pPr marL="457200" algn="l" defTabSz="914400" rtl="0" eaLnBrk="1" latinLnBrk="0" hangingPunct="1">
+              <a:defRPr sz="1800" kern="1200">
+                <a:solidFill>
+                  <a:schemeClr val="tx1"/>
+                </a:solidFill>
+                <a:latin typeface="+mn-lt"/>
+                <a:ea typeface="+mn-ea"/>
+                <a:cs typeface="+mn-cs"/>
+              </a:defRPr>
+            </a:lvl2pPr>
+            <a:lvl3pPr marL="914400" algn="l" defTabSz="914400" rtl="0" eaLnBrk="1" latinLnBrk="0" hangingPunct="1">
+              <a:defRPr sz="1800" kern="1200">
+                <a:solidFill>
+                  <a:schemeClr val="tx1"/>
+                </a:solidFill>
+                <a:latin typeface="+mn-lt"/>
+                <a:ea typeface="+mn-ea"/>
+                <a:cs typeface="+mn-cs"/>
+              </a:defRPr>
+            </a:lvl3pPr>
+            <a:lvl4pPr marL="1371600" algn="l" defTabSz="914400" rtl="0" eaLnBrk="1" latinLnBrk="0" hangingPunct="1">
+              <a:defRPr sz="1800" kern="1200">
+                <a:solidFill>
+                  <a:schemeClr val="tx1"/>
+                </a:solidFill>
+                <a:latin typeface="+mn-lt"/>
+                <a:ea typeface="+mn-ea"/>
+                <a:cs typeface="+mn-cs"/>
+              </a:defRPr>
+            </a:lvl4pPr>
+            <a:lvl5pPr marL="1828800" algn="l" defTabSz="914400" rtl="0" eaLnBrk="1" latinLnBrk="0" hangingPunct="1">
+              <a:defRPr sz="1800" kern="1200">
+                <a:solidFill>
+                  <a:schemeClr val="tx1"/>
+                </a:solidFill>
+                <a:latin typeface="+mn-lt"/>
+                <a:ea typeface="+mn-ea"/>
+                <a:cs typeface="+mn-cs"/>
+              </a:defRPr>
+            </a:lvl5pPr>
+            <a:lvl6pPr marL="2286000" algn="l" defTabSz="914400" rtl="0" eaLnBrk="1" latinLnBrk="0" hangingPunct="1">
+              <a:defRPr sz="1800" kern="1200">
+                <a:solidFill>
+                  <a:schemeClr val="tx1"/>
+                </a:solidFill>
+                <a:latin typeface="+mn-lt"/>
+                <a:ea typeface="+mn-ea"/>
+                <a:cs typeface="+mn-cs"/>
+              </a:defRPr>
+            </a:lvl6pPr>
+            <a:lvl7pPr marL="2743200" algn="l" defTabSz="914400" rtl="0" eaLnBrk="1" latinLnBrk="0" hangingPunct="1">
+              <a:defRPr sz="1800" kern="1200">
+                <a:solidFill>
+                  <a:schemeClr val="tx1"/>
+                </a:solidFill>
+                <a:latin typeface="+mn-lt"/>
+                <a:ea typeface="+mn-ea"/>
+                <a:cs typeface="+mn-cs"/>
+              </a:defRPr>
+            </a:lvl7pPr>
+            <a:lvl8pPr marL="3200400" algn="l" defTabSz="914400" rtl="0" eaLnBrk="1" latinLnBrk="0" hangingPunct="1">
+              <a:defRPr sz="1800" kern="1200">
+                <a:solidFill>
+                  <a:schemeClr val="tx1"/>
+                </a:solidFill>
+                <a:latin typeface="+mn-lt"/>
+                <a:ea typeface="+mn-ea"/>
+                <a:cs typeface="+mn-cs"/>
+              </a:defRPr>
+            </a:lvl8pPr>
+            <a:lvl9pPr marL="3657600" algn="l" defTabSz="914400" rtl="0" eaLnBrk="1" latinLnBrk="0" hangingPunct="1">
+              <a:defRPr sz="1800" kern="1200">
+                <a:solidFill>
+                  <a:schemeClr val="tx1"/>
+                </a:solidFill>
+                <a:latin typeface="+mn-lt"/>
+                <a:ea typeface="+mn-ea"/>
+                <a:cs typeface="+mn-cs"/>
+              </a:defRPr>
+            </a:lvl9pPr>
+          </a:lstStyle>
+          <a:p>
+            <a:pPr algn="ctr" defTabSz="914309">
+              <a:defRPr/>
+            </a:pPr>
+            <a:r>
+              <a:rPr lang="de-AT" sz="1600" kern="0" dirty="0">
+                <a:solidFill>
+                  <a:sysClr val="window" lastClr="FFFFFF"/>
+                </a:solidFill>
+                <a:latin typeface="Calibri"/>
+              </a:rPr>
+              <a:t>PEPPOL Pilot Root CA</a:t>
+            </a:r>
+          </a:p>
+        </p:txBody>
+      </p:sp>
+      <p:sp>
+        <p:nvSpPr>
+          <p:cNvPr id="6" name="Rechteck 5"/>
+          <p:cNvSpPr/>
+          <p:nvPr/>
+        </p:nvSpPr>
+        <p:spPr>
+          <a:xfrm>
+            <a:off x="3275856" y="3680424"/>
+            <a:ext cx="1296145" cy="576064"/>
+          </a:xfrm>
+          <a:prstGeom prst="rect">
+            <a:avLst/>
+          </a:prstGeom>
+          <a:gradFill rotWithShape="1">
+            <a:gsLst>
+              <a:gs pos="0">
+                <a:srgbClr val="9BBB59">
+                  <a:tint val="50000"/>
+                  <a:satMod val="300000"/>
+                </a:srgbClr>
+              </a:gs>
+              <a:gs pos="35000">
+                <a:srgbClr val="9BBB59">
+                  <a:tint val="37000"/>
+                  <a:satMod val="300000"/>
+                </a:srgbClr>
+              </a:gs>
+              <a:gs pos="100000">
+                <a:srgbClr val="9BBB59">
+                  <a:tint val="15000"/>
+                  <a:satMod val="350000"/>
+                </a:srgbClr>
+              </a:gs>
+            </a:gsLst>
+            <a:lin ang="16200000" scaled="1"/>
+          </a:gradFill>
+          <a:ln w="9525" cap="rnd" cmpd="sng" algn="ctr">
+            <a:solidFill>
+              <a:srgbClr val="9BBB59">
+                <a:shade val="95000"/>
+                <a:satMod val="105000"/>
+              </a:srgbClr>
+            </a:solidFill>
+            <a:prstDash val="solid"/>
+          </a:ln>
+          <a:effectLst>
+            <a:outerShdw blurRad="40000" dist="20000" dir="5400000">
+              <a:srgbClr val="000000">
+                <a:alpha val="38000"/>
+              </a:srgbClr>
+            </a:outerShdw>
+          </a:effectLst>
+        </p:spPr>
+        <p:txBody>
+          <a:bodyPr lIns="91431" tIns="45715" rIns="91431" bIns="45715" rtlCol="0" anchor="ctr"/>
+          <a:lstStyle>
+            <a:defPPr>
+              <a:defRPr lang="en-US"/>
+            </a:defPPr>
+            <a:lvl1pPr marL="0" algn="l" defTabSz="914400" rtl="0" eaLnBrk="1" latinLnBrk="0" hangingPunct="1">
+              <a:defRPr sz="1800" kern="1200">
+                <a:solidFill>
+                  <a:schemeClr val="tx1"/>
+                </a:solidFill>
+                <a:latin typeface="+mn-lt"/>
+                <a:ea typeface="+mn-ea"/>
+                <a:cs typeface="+mn-cs"/>
+              </a:defRPr>
+            </a:lvl1pPr>
+            <a:lvl2pPr marL="457200" algn="l" defTabSz="914400" rtl="0" eaLnBrk="1" latinLnBrk="0" hangingPunct="1">
+              <a:defRPr sz="1800" kern="1200">
+                <a:solidFill>
+                  <a:schemeClr val="tx1"/>
+                </a:solidFill>
+                <a:latin typeface="+mn-lt"/>
+                <a:ea typeface="+mn-ea"/>
+                <a:cs typeface="+mn-cs"/>
+              </a:defRPr>
+            </a:lvl2pPr>
+            <a:lvl3pPr marL="914400" algn="l" defTabSz="914400" rtl="0" eaLnBrk="1" latinLnBrk="0" hangingPunct="1">
+              <a:defRPr sz="1800" kern="1200">
+                <a:solidFill>
+                  <a:schemeClr val="tx1"/>
+                </a:solidFill>
+                <a:latin typeface="+mn-lt"/>
+                <a:ea typeface="+mn-ea"/>
+                <a:cs typeface="+mn-cs"/>
+              </a:defRPr>
+            </a:lvl3pPr>
+            <a:lvl4pPr marL="1371600" algn="l" defTabSz="914400" rtl="0" eaLnBrk="1" latinLnBrk="0" hangingPunct="1">
+              <a:defRPr sz="1800" kern="1200">
+                <a:solidFill>
+                  <a:schemeClr val="tx1"/>
+                </a:solidFill>
+                <a:latin typeface="+mn-lt"/>
+                <a:ea typeface="+mn-ea"/>
+                <a:cs typeface="+mn-cs"/>
+              </a:defRPr>
+            </a:lvl4pPr>
+            <a:lvl5pPr marL="1828800" algn="l" defTabSz="914400" rtl="0" eaLnBrk="1" latinLnBrk="0" hangingPunct="1">
+              <a:defRPr sz="1800" kern="1200">
+                <a:solidFill>
+                  <a:schemeClr val="tx1"/>
+                </a:solidFill>
+                <a:latin typeface="+mn-lt"/>
+                <a:ea typeface="+mn-ea"/>
+                <a:cs typeface="+mn-cs"/>
+              </a:defRPr>
+            </a:lvl5pPr>
+            <a:lvl6pPr marL="2286000" algn="l" defTabSz="914400" rtl="0" eaLnBrk="1" latinLnBrk="0" hangingPunct="1">
+              <a:defRPr sz="1800" kern="1200">
+                <a:solidFill>
+                  <a:schemeClr val="tx1"/>
+                </a:solidFill>
+                <a:latin typeface="+mn-lt"/>
+                <a:ea typeface="+mn-ea"/>
+                <a:cs typeface="+mn-cs"/>
+              </a:defRPr>
+            </a:lvl6pPr>
+            <a:lvl7pPr marL="2743200" algn="l" defTabSz="914400" rtl="0" eaLnBrk="1" latinLnBrk="0" hangingPunct="1">
+              <a:defRPr sz="1800" kern="1200">
+                <a:solidFill>
+                  <a:schemeClr val="tx1"/>
+                </a:solidFill>
+                <a:latin typeface="+mn-lt"/>
+                <a:ea typeface="+mn-ea"/>
+                <a:cs typeface="+mn-cs"/>
+              </a:defRPr>
+            </a:lvl7pPr>
+            <a:lvl8pPr marL="3200400" algn="l" defTabSz="914400" rtl="0" eaLnBrk="1" latinLnBrk="0" hangingPunct="1">
+              <a:defRPr sz="1800" kern="1200">
+                <a:solidFill>
+                  <a:schemeClr val="tx1"/>
+                </a:solidFill>
+                <a:latin typeface="+mn-lt"/>
+                <a:ea typeface="+mn-ea"/>
+                <a:cs typeface="+mn-cs"/>
+              </a:defRPr>
+            </a:lvl8pPr>
+            <a:lvl9pPr marL="3657600" algn="l" defTabSz="914400" rtl="0" eaLnBrk="1" latinLnBrk="0" hangingPunct="1">
+              <a:defRPr sz="1800" kern="1200">
+                <a:solidFill>
+                  <a:schemeClr val="tx1"/>
+                </a:solidFill>
+                <a:latin typeface="+mn-lt"/>
+                <a:ea typeface="+mn-ea"/>
+                <a:cs typeface="+mn-cs"/>
+              </a:defRPr>
+            </a:lvl9pPr>
+          </a:lstStyle>
+          <a:p>
+            <a:pPr algn="ctr" defTabSz="914309">
+              <a:defRPr/>
+            </a:pPr>
+            <a:r>
+              <a:rPr lang="de-AT" sz="1600" kern="0" dirty="0">
+                <a:solidFill>
+                  <a:sysClr val="windowText" lastClr="000000"/>
+                </a:solidFill>
+                <a:latin typeface="Calibri"/>
+              </a:rPr>
+              <a:t>PEPPOL Pilot STS CA</a:t>
+            </a:r>
+          </a:p>
+        </p:txBody>
+      </p:sp>
+      <p:sp>
+        <p:nvSpPr>
+          <p:cNvPr id="7" name="Rechteck 6"/>
+          <p:cNvSpPr/>
+          <p:nvPr/>
+        </p:nvSpPr>
+        <p:spPr>
+          <a:xfrm>
+            <a:off x="1835696" y="3680424"/>
+            <a:ext cx="1296145" cy="576064"/>
+          </a:xfrm>
+          <a:prstGeom prst="rect">
+            <a:avLst/>
+          </a:prstGeom>
+          <a:solidFill>
+            <a:srgbClr val="9BBB59"/>
+          </a:solidFill>
+          <a:ln w="25400" cap="rnd" cmpd="sng" algn="ctr">
+            <a:solidFill>
+              <a:srgbClr val="9BBB59">
+                <a:shade val="50000"/>
+              </a:srgbClr>
+            </a:solidFill>
+            <a:prstDash val="solid"/>
+          </a:ln>
+          <a:effectLst/>
+        </p:spPr>
+        <p:txBody>
+          <a:bodyPr lIns="91431" tIns="45715" rIns="91431" bIns="45715" rtlCol="0" anchor="ctr"/>
+          <a:lstStyle>
+            <a:defPPr>
+              <a:defRPr lang="en-US"/>
+            </a:defPPr>
+            <a:lvl1pPr marL="0" algn="l" defTabSz="914400" rtl="0" eaLnBrk="1" latinLnBrk="0" hangingPunct="1">
+              <a:defRPr sz="1800" kern="1200">
+                <a:solidFill>
+                  <a:schemeClr val="tx1"/>
+                </a:solidFill>
+                <a:latin typeface="+mn-lt"/>
+                <a:ea typeface="+mn-ea"/>
+                <a:cs typeface="+mn-cs"/>
+              </a:defRPr>
+            </a:lvl1pPr>
+            <a:lvl2pPr marL="457200" algn="l" defTabSz="914400" rtl="0" eaLnBrk="1" latinLnBrk="0" hangingPunct="1">
+              <a:defRPr sz="1800" kern="1200">
+                <a:solidFill>
+                  <a:schemeClr val="tx1"/>
+                </a:solidFill>
+                <a:latin typeface="+mn-lt"/>
+                <a:ea typeface="+mn-ea"/>
+                <a:cs typeface="+mn-cs"/>
+              </a:defRPr>
+            </a:lvl2pPr>
+            <a:lvl3pPr marL="914400" algn="l" defTabSz="914400" rtl="0" eaLnBrk="1" latinLnBrk="0" hangingPunct="1">
+              <a:defRPr sz="1800" kern="1200">
+                <a:solidFill>
+                  <a:schemeClr val="tx1"/>
+                </a:solidFill>
+                <a:latin typeface="+mn-lt"/>
+                <a:ea typeface="+mn-ea"/>
+                <a:cs typeface="+mn-cs"/>
+              </a:defRPr>
+            </a:lvl3pPr>
+            <a:lvl4pPr marL="1371600" algn="l" defTabSz="914400" rtl="0" eaLnBrk="1" latinLnBrk="0" hangingPunct="1">
+              <a:defRPr sz="1800" kern="1200">
+                <a:solidFill>
+                  <a:schemeClr val="tx1"/>
+                </a:solidFill>
+                <a:latin typeface="+mn-lt"/>
+                <a:ea typeface="+mn-ea"/>
+                <a:cs typeface="+mn-cs"/>
+              </a:defRPr>
+            </a:lvl4pPr>
+            <a:lvl5pPr marL="1828800" algn="l" defTabSz="914400" rtl="0" eaLnBrk="1" latinLnBrk="0" hangingPunct="1">
+              <a:defRPr sz="1800" kern="1200">
+                <a:solidFill>
+                  <a:schemeClr val="tx1"/>
+                </a:solidFill>
+                <a:latin typeface="+mn-lt"/>
+                <a:ea typeface="+mn-ea"/>
+                <a:cs typeface="+mn-cs"/>
+              </a:defRPr>
+            </a:lvl5pPr>
+            <a:lvl6pPr marL="2286000" algn="l" defTabSz="914400" rtl="0" eaLnBrk="1" latinLnBrk="0" hangingPunct="1">
+              <a:defRPr sz="1800" kern="1200">
+                <a:solidFill>
+                  <a:schemeClr val="tx1"/>
+                </a:solidFill>
+                <a:latin typeface="+mn-lt"/>
+                <a:ea typeface="+mn-ea"/>
+                <a:cs typeface="+mn-cs"/>
+              </a:defRPr>
+            </a:lvl6pPr>
+            <a:lvl7pPr marL="2743200" algn="l" defTabSz="914400" rtl="0" eaLnBrk="1" latinLnBrk="0" hangingPunct="1">
+              <a:defRPr sz="1800" kern="1200">
+                <a:solidFill>
+                  <a:schemeClr val="tx1"/>
+                </a:solidFill>
+                <a:latin typeface="+mn-lt"/>
+                <a:ea typeface="+mn-ea"/>
+                <a:cs typeface="+mn-cs"/>
+              </a:defRPr>
+            </a:lvl7pPr>
+            <a:lvl8pPr marL="3200400" algn="l" defTabSz="914400" rtl="0" eaLnBrk="1" latinLnBrk="0" hangingPunct="1">
+              <a:defRPr sz="1800" kern="1200">
+                <a:solidFill>
+                  <a:schemeClr val="tx1"/>
+                </a:solidFill>
+                <a:latin typeface="+mn-lt"/>
+                <a:ea typeface="+mn-ea"/>
+                <a:cs typeface="+mn-cs"/>
+              </a:defRPr>
+            </a:lvl8pPr>
+            <a:lvl9pPr marL="3657600" algn="l" defTabSz="914400" rtl="0" eaLnBrk="1" latinLnBrk="0" hangingPunct="1">
+              <a:defRPr sz="1800" kern="1200">
+                <a:solidFill>
+                  <a:schemeClr val="tx1"/>
+                </a:solidFill>
+                <a:latin typeface="+mn-lt"/>
+                <a:ea typeface="+mn-ea"/>
+                <a:cs typeface="+mn-cs"/>
+              </a:defRPr>
+            </a:lvl9pPr>
+          </a:lstStyle>
+          <a:p>
+            <a:pPr algn="ctr" defTabSz="914309">
+              <a:defRPr/>
+            </a:pPr>
+            <a:r>
+              <a:rPr lang="de-AT" sz="1600" kern="0" dirty="0">
+                <a:solidFill>
+                  <a:sysClr val="window" lastClr="FFFFFF"/>
+                </a:solidFill>
+                <a:latin typeface="Calibri"/>
+              </a:rPr>
+              <a:t>PEPPOL Pilot SMP CA</a:t>
+            </a:r>
+          </a:p>
+        </p:txBody>
+      </p:sp>
+      <p:sp>
+        <p:nvSpPr>
+          <p:cNvPr id="8" name="Rechteck 7"/>
+          <p:cNvSpPr/>
+          <p:nvPr/>
+        </p:nvSpPr>
+        <p:spPr>
+          <a:xfrm>
+            <a:off x="395536" y="3680424"/>
+            <a:ext cx="1296145" cy="576064"/>
+          </a:xfrm>
+          <a:prstGeom prst="rect">
+            <a:avLst/>
+          </a:prstGeom>
+          <a:solidFill>
+            <a:srgbClr val="9BBB59"/>
+          </a:solidFill>
+          <a:ln w="25400" cap="rnd" cmpd="sng" algn="ctr">
+            <a:solidFill>
+              <a:srgbClr val="9BBB59">
+                <a:shade val="50000"/>
+              </a:srgbClr>
+            </a:solidFill>
+            <a:prstDash val="solid"/>
+          </a:ln>
+          <a:effectLst/>
+        </p:spPr>
+        <p:txBody>
+          <a:bodyPr lIns="91431" tIns="45715" rIns="91431" bIns="45715" rtlCol="0" anchor="ctr"/>
+          <a:lstStyle>
+            <a:defPPr>
+              <a:defRPr lang="en-US"/>
+            </a:defPPr>
+            <a:lvl1pPr marL="0" algn="l" defTabSz="914400" rtl="0" eaLnBrk="1" latinLnBrk="0" hangingPunct="1">
+              <a:defRPr sz="1800" kern="1200">
+                <a:solidFill>
+                  <a:schemeClr val="tx1"/>
+                </a:solidFill>
+                <a:latin typeface="+mn-lt"/>
+                <a:ea typeface="+mn-ea"/>
+                <a:cs typeface="+mn-cs"/>
+              </a:defRPr>
+            </a:lvl1pPr>
+            <a:lvl2pPr marL="457200" algn="l" defTabSz="914400" rtl="0" eaLnBrk="1" latinLnBrk="0" hangingPunct="1">
+              <a:defRPr sz="1800" kern="1200">
+                <a:solidFill>
+                  <a:schemeClr val="tx1"/>
+                </a:solidFill>
+                <a:latin typeface="+mn-lt"/>
+                <a:ea typeface="+mn-ea"/>
+                <a:cs typeface="+mn-cs"/>
+              </a:defRPr>
+            </a:lvl2pPr>
+            <a:lvl3pPr marL="914400" algn="l" defTabSz="914400" rtl="0" eaLnBrk="1" latinLnBrk="0" hangingPunct="1">
+              <a:defRPr sz="1800" kern="1200">
+                <a:solidFill>
+                  <a:schemeClr val="tx1"/>
+                </a:solidFill>
+                <a:latin typeface="+mn-lt"/>
+                <a:ea typeface="+mn-ea"/>
+                <a:cs typeface="+mn-cs"/>
+              </a:defRPr>
+            </a:lvl3pPr>
+            <a:lvl4pPr marL="1371600" algn="l" defTabSz="914400" rtl="0" eaLnBrk="1" latinLnBrk="0" hangingPunct="1">
+              <a:defRPr sz="1800" kern="1200">
+                <a:solidFill>
+                  <a:schemeClr val="tx1"/>
+                </a:solidFill>
+                <a:latin typeface="+mn-lt"/>
+                <a:ea typeface="+mn-ea"/>
+                <a:cs typeface="+mn-cs"/>
+              </a:defRPr>
+            </a:lvl4pPr>
+            <a:lvl5pPr marL="1828800" algn="l" defTabSz="914400" rtl="0" eaLnBrk="1" latinLnBrk="0" hangingPunct="1">
+              <a:defRPr sz="1800" kern="1200">
+                <a:solidFill>
+                  <a:schemeClr val="tx1"/>
+                </a:solidFill>
+                <a:latin typeface="+mn-lt"/>
+                <a:ea typeface="+mn-ea"/>
+                <a:cs typeface="+mn-cs"/>
+              </a:defRPr>
+            </a:lvl5pPr>
+            <a:lvl6pPr marL="2286000" algn="l" defTabSz="914400" rtl="0" eaLnBrk="1" latinLnBrk="0" hangingPunct="1">
+              <a:defRPr sz="1800" kern="1200">
+                <a:solidFill>
+                  <a:schemeClr val="tx1"/>
+                </a:solidFill>
+                <a:latin typeface="+mn-lt"/>
+                <a:ea typeface="+mn-ea"/>
+                <a:cs typeface="+mn-cs"/>
+              </a:defRPr>
+            </a:lvl6pPr>
+            <a:lvl7pPr marL="2743200" algn="l" defTabSz="914400" rtl="0" eaLnBrk="1" latinLnBrk="0" hangingPunct="1">
+              <a:defRPr sz="1800" kern="1200">
+                <a:solidFill>
+                  <a:schemeClr val="tx1"/>
+                </a:solidFill>
+                <a:latin typeface="+mn-lt"/>
+                <a:ea typeface="+mn-ea"/>
+                <a:cs typeface="+mn-cs"/>
+              </a:defRPr>
+            </a:lvl7pPr>
+            <a:lvl8pPr marL="3200400" algn="l" defTabSz="914400" rtl="0" eaLnBrk="1" latinLnBrk="0" hangingPunct="1">
+              <a:defRPr sz="1800" kern="1200">
+                <a:solidFill>
+                  <a:schemeClr val="tx1"/>
+                </a:solidFill>
+                <a:latin typeface="+mn-lt"/>
+                <a:ea typeface="+mn-ea"/>
+                <a:cs typeface="+mn-cs"/>
+              </a:defRPr>
+            </a:lvl8pPr>
+            <a:lvl9pPr marL="3657600" algn="l" defTabSz="914400" rtl="0" eaLnBrk="1" latinLnBrk="0" hangingPunct="1">
+              <a:defRPr sz="1800" kern="1200">
+                <a:solidFill>
+                  <a:schemeClr val="tx1"/>
+                </a:solidFill>
+                <a:latin typeface="+mn-lt"/>
+                <a:ea typeface="+mn-ea"/>
+                <a:cs typeface="+mn-cs"/>
+              </a:defRPr>
+            </a:lvl9pPr>
+          </a:lstStyle>
+          <a:p>
+            <a:pPr algn="ctr" defTabSz="914309">
+              <a:defRPr/>
+            </a:pPr>
+            <a:r>
+              <a:rPr lang="de-AT" sz="1600" kern="0" dirty="0">
+                <a:solidFill>
+                  <a:sysClr val="window" lastClr="FFFFFF"/>
+                </a:solidFill>
+                <a:latin typeface="Calibri"/>
+              </a:rPr>
+              <a:t>PEPPOL </a:t>
+            </a:r>
+            <a:r>
+              <a:rPr lang="de-AT" sz="1600" kern="0" dirty="0" smtClean="0">
+                <a:solidFill>
+                  <a:sysClr val="window" lastClr="FFFFFF"/>
+                </a:solidFill>
+                <a:latin typeface="Calibri"/>
+              </a:rPr>
+              <a:t>Pilot </a:t>
+            </a:r>
+            <a:r>
+              <a:rPr lang="de-AT" sz="1600" kern="0" dirty="0">
+                <a:solidFill>
+                  <a:sysClr val="window" lastClr="FFFFFF"/>
+                </a:solidFill>
+                <a:latin typeface="Calibri"/>
+              </a:rPr>
+              <a:t>AP CA</a:t>
+            </a:r>
+          </a:p>
+        </p:txBody>
+      </p:sp>
+      <p:cxnSp>
+        <p:nvCxnSpPr>
+          <p:cNvPr id="10" name="Gewinkelte Verbindung 9"/>
+          <p:cNvCxnSpPr>
+            <a:stCxn id="5" idx="2"/>
+            <a:endCxn id="8" idx="0"/>
+          </p:cNvCxnSpPr>
+          <p:nvPr/>
+        </p:nvCxnSpPr>
+        <p:spPr>
+          <a:xfrm rot="5400000">
+            <a:off x="1367645" y="2564300"/>
+            <a:ext cx="792088" cy="1440160"/>
+          </a:xfrm>
+          <a:prstGeom prst="bentConnector3">
+            <a:avLst>
+              <a:gd name="adj1" fmla="val 50000"/>
+            </a:avLst>
+          </a:prstGeom>
+          <a:noFill/>
+          <a:ln w="9525" cap="rnd" cmpd="sng" algn="ctr">
+            <a:solidFill>
+              <a:srgbClr val="4F81BD">
+                <a:shade val="95000"/>
+                <a:satMod val="105000"/>
+              </a:srgbClr>
+            </a:solidFill>
+            <a:prstDash val="solid"/>
+            <a:tailEnd type="arrow"/>
+          </a:ln>
+          <a:effectLst/>
+        </p:spPr>
+      </p:cxnSp>
+      <p:cxnSp>
+        <p:nvCxnSpPr>
+          <p:cNvPr id="11" name="Gewinkelte Verbindung 10"/>
+          <p:cNvCxnSpPr>
+            <a:stCxn id="5" idx="2"/>
+            <a:endCxn id="6" idx="0"/>
+          </p:cNvCxnSpPr>
+          <p:nvPr/>
+        </p:nvCxnSpPr>
+        <p:spPr>
+          <a:xfrm rot="16200000" flipH="1">
+            <a:off x="2807805" y="2564300"/>
+            <a:ext cx="792088" cy="1440160"/>
+          </a:xfrm>
+          <a:prstGeom prst="bentConnector3">
+            <a:avLst>
+              <a:gd name="adj1" fmla="val 50000"/>
+            </a:avLst>
+          </a:prstGeom>
+          <a:noFill/>
+          <a:ln w="9525" cap="rnd" cmpd="sng" algn="ctr">
+            <a:solidFill>
+              <a:srgbClr val="4F81BD">
+                <a:shade val="95000"/>
+                <a:satMod val="105000"/>
+              </a:srgbClr>
+            </a:solidFill>
+            <a:prstDash val="solid"/>
+            <a:tailEnd type="arrow"/>
+          </a:ln>
+          <a:effectLst/>
+        </p:spPr>
+      </p:cxnSp>
+      <p:cxnSp>
+        <p:nvCxnSpPr>
+          <p:cNvPr id="12" name="Gerade Verbindung mit Pfeil 11"/>
+          <p:cNvCxnSpPr>
+            <a:stCxn id="5" idx="2"/>
+            <a:endCxn id="7" idx="0"/>
+          </p:cNvCxnSpPr>
+          <p:nvPr/>
+        </p:nvCxnSpPr>
+        <p:spPr>
+          <a:xfrm>
+            <a:off x="2483769" y="2888336"/>
+            <a:ext cx="0" cy="792088"/>
+          </a:xfrm>
+          <a:prstGeom prst="straightConnector1">
+            <a:avLst/>
+          </a:prstGeom>
+          <a:noFill/>
+          <a:ln w="9525" cap="rnd" cmpd="sng" algn="ctr">
+            <a:solidFill>
+              <a:srgbClr val="4F81BD">
+                <a:shade val="95000"/>
+                <a:satMod val="105000"/>
+              </a:srgbClr>
+            </a:solidFill>
+            <a:prstDash val="solid"/>
+            <a:tailEnd type="arrow"/>
+          </a:ln>
+          <a:effectLst/>
+        </p:spPr>
+      </p:cxnSp>
+      <p:sp>
+        <p:nvSpPr>
+          <p:cNvPr id="13" name="Rechteck 12"/>
+          <p:cNvSpPr/>
+          <p:nvPr/>
+        </p:nvSpPr>
+        <p:spPr>
+          <a:xfrm>
+            <a:off x="395536" y="4653136"/>
+            <a:ext cx="1296145" cy="576064"/>
+          </a:xfrm>
+          <a:prstGeom prst="rect">
+            <a:avLst/>
+          </a:prstGeom>
+          <a:ln/>
+        </p:spPr>
+        <p:style>
+          <a:lnRef idx="2">
+            <a:schemeClr val="accent2">
+              <a:shade val="50000"/>
+            </a:schemeClr>
+          </a:lnRef>
+          <a:fillRef idx="1">
+            <a:schemeClr val="accent2"/>
+          </a:fillRef>
+          <a:effectRef idx="0">
+            <a:schemeClr val="accent2"/>
+          </a:effectRef>
+          <a:fontRef idx="minor">
+            <a:schemeClr val="lt1"/>
+          </a:fontRef>
+        </p:style>
+        <p:txBody>
+          <a:bodyPr lIns="91431" tIns="45715" rIns="91431" bIns="45715" rtlCol="0" anchor="ctr"/>
+          <a:lstStyle>
+            <a:defPPr>
+              <a:defRPr lang="en-US"/>
+            </a:defPPr>
+            <a:lvl1pPr marL="0" algn="l" defTabSz="914400" rtl="0" eaLnBrk="1" latinLnBrk="0" hangingPunct="1">
+              <a:defRPr sz="1800" kern="1200">
+                <a:solidFill>
+                  <a:schemeClr val="tx1"/>
+                </a:solidFill>
+                <a:latin typeface="+mn-lt"/>
+                <a:ea typeface="+mn-ea"/>
+                <a:cs typeface="+mn-cs"/>
+              </a:defRPr>
+            </a:lvl1pPr>
+            <a:lvl2pPr marL="457200" algn="l" defTabSz="914400" rtl="0" eaLnBrk="1" latinLnBrk="0" hangingPunct="1">
+              <a:defRPr sz="1800" kern="1200">
+                <a:solidFill>
+                  <a:schemeClr val="tx1"/>
+                </a:solidFill>
+                <a:latin typeface="+mn-lt"/>
+                <a:ea typeface="+mn-ea"/>
+                <a:cs typeface="+mn-cs"/>
+              </a:defRPr>
+            </a:lvl2pPr>
+            <a:lvl3pPr marL="914400" algn="l" defTabSz="914400" rtl="0" eaLnBrk="1" latinLnBrk="0" hangingPunct="1">
+              <a:defRPr sz="1800" kern="1200">
+                <a:solidFill>
+                  <a:schemeClr val="tx1"/>
+                </a:solidFill>
+                <a:latin typeface="+mn-lt"/>
+                <a:ea typeface="+mn-ea"/>
+                <a:cs typeface="+mn-cs"/>
+              </a:defRPr>
+            </a:lvl3pPr>
+            <a:lvl4pPr marL="1371600" algn="l" defTabSz="914400" rtl="0" eaLnBrk="1" latinLnBrk="0" hangingPunct="1">
+              <a:defRPr sz="1800" kern="1200">
+                <a:solidFill>
+                  <a:schemeClr val="tx1"/>
+                </a:solidFill>
+                <a:latin typeface="+mn-lt"/>
+                <a:ea typeface="+mn-ea"/>
+                <a:cs typeface="+mn-cs"/>
+              </a:defRPr>
+            </a:lvl4pPr>
+            <a:lvl5pPr marL="1828800" algn="l" defTabSz="914400" rtl="0" eaLnBrk="1" latinLnBrk="0" hangingPunct="1">
+              <a:defRPr sz="1800" kern="1200">
+                <a:solidFill>
+                  <a:schemeClr val="tx1"/>
+                </a:solidFill>
+                <a:latin typeface="+mn-lt"/>
+                <a:ea typeface="+mn-ea"/>
+                <a:cs typeface="+mn-cs"/>
+              </a:defRPr>
+            </a:lvl5pPr>
+            <a:lvl6pPr marL="2286000" algn="l" defTabSz="914400" rtl="0" eaLnBrk="1" latinLnBrk="0" hangingPunct="1">
+              <a:defRPr sz="1800" kern="1200">
+                <a:solidFill>
+                  <a:schemeClr val="tx1"/>
+                </a:solidFill>
+                <a:latin typeface="+mn-lt"/>
+                <a:ea typeface="+mn-ea"/>
+                <a:cs typeface="+mn-cs"/>
+              </a:defRPr>
+            </a:lvl6pPr>
+            <a:lvl7pPr marL="2743200" algn="l" defTabSz="914400" rtl="0" eaLnBrk="1" latinLnBrk="0" hangingPunct="1">
+              <a:defRPr sz="1800" kern="1200">
+                <a:solidFill>
+                  <a:schemeClr val="tx1"/>
+                </a:solidFill>
+                <a:latin typeface="+mn-lt"/>
+                <a:ea typeface="+mn-ea"/>
+                <a:cs typeface="+mn-cs"/>
+              </a:defRPr>
+            </a:lvl7pPr>
+            <a:lvl8pPr marL="3200400" algn="l" defTabSz="914400" rtl="0" eaLnBrk="1" latinLnBrk="0" hangingPunct="1">
+              <a:defRPr sz="1800" kern="1200">
+                <a:solidFill>
+                  <a:schemeClr val="tx1"/>
+                </a:solidFill>
+                <a:latin typeface="+mn-lt"/>
+                <a:ea typeface="+mn-ea"/>
+                <a:cs typeface="+mn-cs"/>
+              </a:defRPr>
+            </a:lvl8pPr>
+            <a:lvl9pPr marL="3657600" algn="l" defTabSz="914400" rtl="0" eaLnBrk="1" latinLnBrk="0" hangingPunct="1">
+              <a:defRPr sz="1800" kern="1200">
+                <a:solidFill>
+                  <a:schemeClr val="tx1"/>
+                </a:solidFill>
+                <a:latin typeface="+mn-lt"/>
+                <a:ea typeface="+mn-ea"/>
+                <a:cs typeface="+mn-cs"/>
+              </a:defRPr>
+            </a:lvl9pPr>
+          </a:lstStyle>
+          <a:p>
+            <a:pPr algn="ctr" defTabSz="914309">
+              <a:defRPr/>
+            </a:pPr>
+            <a:r>
+              <a:rPr lang="de-AT" sz="1600" kern="0" dirty="0">
+                <a:solidFill>
+                  <a:sysClr val="window" lastClr="FFFFFF"/>
+                </a:solidFill>
+                <a:latin typeface="Calibri"/>
+              </a:rPr>
+              <a:t>AP Pilot Cert</a:t>
+            </a:r>
+          </a:p>
+        </p:txBody>
+      </p:sp>
+      <p:sp>
+        <p:nvSpPr>
+          <p:cNvPr id="14" name="Rechteck 13"/>
+          <p:cNvSpPr/>
+          <p:nvPr/>
+        </p:nvSpPr>
+        <p:spPr>
+          <a:xfrm>
+            <a:off x="1835696" y="4653136"/>
+            <a:ext cx="1296145" cy="576064"/>
+          </a:xfrm>
+          <a:prstGeom prst="rect">
+            <a:avLst/>
+          </a:prstGeom>
+          <a:ln/>
+        </p:spPr>
+        <p:style>
+          <a:lnRef idx="2">
+            <a:schemeClr val="accent2">
+              <a:shade val="50000"/>
+            </a:schemeClr>
+          </a:lnRef>
+          <a:fillRef idx="1">
+            <a:schemeClr val="accent2"/>
+          </a:fillRef>
+          <a:effectRef idx="0">
+            <a:schemeClr val="accent2"/>
+          </a:effectRef>
+          <a:fontRef idx="minor">
+            <a:schemeClr val="lt1"/>
+          </a:fontRef>
+        </p:style>
+        <p:txBody>
+          <a:bodyPr lIns="91431" tIns="45715" rIns="91431" bIns="45715" rtlCol="0" anchor="ctr"/>
+          <a:lstStyle>
+            <a:defPPr>
+              <a:defRPr lang="en-US"/>
+            </a:defPPr>
+            <a:lvl1pPr marL="0" algn="l" defTabSz="914400" rtl="0" eaLnBrk="1" latinLnBrk="0" hangingPunct="1">
+              <a:defRPr sz="1800" kern="1200">
+                <a:solidFill>
+                  <a:schemeClr val="tx1"/>
+                </a:solidFill>
+                <a:latin typeface="+mn-lt"/>
+                <a:ea typeface="+mn-ea"/>
+                <a:cs typeface="+mn-cs"/>
+              </a:defRPr>
+            </a:lvl1pPr>
+            <a:lvl2pPr marL="457200" algn="l" defTabSz="914400" rtl="0" eaLnBrk="1" latinLnBrk="0" hangingPunct="1">
+              <a:defRPr sz="1800" kern="1200">
+                <a:solidFill>
+                  <a:schemeClr val="tx1"/>
+                </a:solidFill>
+                <a:latin typeface="+mn-lt"/>
+                <a:ea typeface="+mn-ea"/>
+                <a:cs typeface="+mn-cs"/>
+              </a:defRPr>
+            </a:lvl2pPr>
+            <a:lvl3pPr marL="914400" algn="l" defTabSz="914400" rtl="0" eaLnBrk="1" latinLnBrk="0" hangingPunct="1">
+              <a:defRPr sz="1800" kern="1200">
+                <a:solidFill>
+                  <a:schemeClr val="tx1"/>
+                </a:solidFill>
+                <a:latin typeface="+mn-lt"/>
+                <a:ea typeface="+mn-ea"/>
+                <a:cs typeface="+mn-cs"/>
+              </a:defRPr>
+            </a:lvl3pPr>
+            <a:lvl4pPr marL="1371600" algn="l" defTabSz="914400" rtl="0" eaLnBrk="1" latinLnBrk="0" hangingPunct="1">
+              <a:defRPr sz="1800" kern="1200">
+                <a:solidFill>
+                  <a:schemeClr val="tx1"/>
+                </a:solidFill>
+                <a:latin typeface="+mn-lt"/>
+                <a:ea typeface="+mn-ea"/>
+                <a:cs typeface="+mn-cs"/>
+              </a:defRPr>
+            </a:lvl4pPr>
+            <a:lvl5pPr marL="1828800" algn="l" defTabSz="914400" rtl="0" eaLnBrk="1" latinLnBrk="0" hangingPunct="1">
+              <a:defRPr sz="1800" kern="1200">
+                <a:solidFill>
+                  <a:schemeClr val="tx1"/>
+                </a:solidFill>
+                <a:latin typeface="+mn-lt"/>
+                <a:ea typeface="+mn-ea"/>
+                <a:cs typeface="+mn-cs"/>
+              </a:defRPr>
+            </a:lvl5pPr>
+            <a:lvl6pPr marL="2286000" algn="l" defTabSz="914400" rtl="0" eaLnBrk="1" latinLnBrk="0" hangingPunct="1">
+              <a:defRPr sz="1800" kern="1200">
+                <a:solidFill>
+                  <a:schemeClr val="tx1"/>
+                </a:solidFill>
+                <a:latin typeface="+mn-lt"/>
+                <a:ea typeface="+mn-ea"/>
+                <a:cs typeface="+mn-cs"/>
+              </a:defRPr>
+            </a:lvl6pPr>
+            <a:lvl7pPr marL="2743200" algn="l" defTabSz="914400" rtl="0" eaLnBrk="1" latinLnBrk="0" hangingPunct="1">
+              <a:defRPr sz="1800" kern="1200">
+                <a:solidFill>
+                  <a:schemeClr val="tx1"/>
+                </a:solidFill>
+                <a:latin typeface="+mn-lt"/>
+                <a:ea typeface="+mn-ea"/>
+                <a:cs typeface="+mn-cs"/>
+              </a:defRPr>
+            </a:lvl7pPr>
+            <a:lvl8pPr marL="3200400" algn="l" defTabSz="914400" rtl="0" eaLnBrk="1" latinLnBrk="0" hangingPunct="1">
+              <a:defRPr sz="1800" kern="1200">
+                <a:solidFill>
+                  <a:schemeClr val="tx1"/>
+                </a:solidFill>
+                <a:latin typeface="+mn-lt"/>
+                <a:ea typeface="+mn-ea"/>
+                <a:cs typeface="+mn-cs"/>
+              </a:defRPr>
+            </a:lvl8pPr>
+            <a:lvl9pPr marL="3657600" algn="l" defTabSz="914400" rtl="0" eaLnBrk="1" latinLnBrk="0" hangingPunct="1">
+              <a:defRPr sz="1800" kern="1200">
+                <a:solidFill>
+                  <a:schemeClr val="tx1"/>
+                </a:solidFill>
+                <a:latin typeface="+mn-lt"/>
+                <a:ea typeface="+mn-ea"/>
+                <a:cs typeface="+mn-cs"/>
+              </a:defRPr>
+            </a:lvl9pPr>
+          </a:lstStyle>
+          <a:p>
+            <a:pPr algn="ctr" defTabSz="914309">
+              <a:defRPr/>
+            </a:pPr>
+            <a:r>
+              <a:rPr lang="de-AT" sz="1600" kern="0" dirty="0">
+                <a:solidFill>
+                  <a:sysClr val="window" lastClr="FFFFFF"/>
+                </a:solidFill>
+                <a:latin typeface="Calibri"/>
+              </a:rPr>
+              <a:t>SMP Pilot Cert</a:t>
+            </a:r>
+          </a:p>
+        </p:txBody>
+      </p:sp>
+      <p:cxnSp>
+        <p:nvCxnSpPr>
+          <p:cNvPr id="19" name="Gerade Verbindung mit Pfeil 18"/>
+          <p:cNvCxnSpPr>
+            <a:stCxn id="8" idx="2"/>
+            <a:endCxn id="13" idx="0"/>
+          </p:cNvCxnSpPr>
+          <p:nvPr/>
+        </p:nvCxnSpPr>
+        <p:spPr>
+          <a:xfrm>
+            <a:off x="1043609" y="4256488"/>
+            <a:ext cx="0" cy="396648"/>
+          </a:xfrm>
+          <a:prstGeom prst="straightConnector1">
+            <a:avLst/>
+          </a:prstGeom>
+          <a:ln>
+            <a:tailEnd type="arrow"/>
+          </a:ln>
+        </p:spPr>
+        <p:style>
+          <a:lnRef idx="1">
+            <a:schemeClr val="accent1"/>
+          </a:lnRef>
+          <a:fillRef idx="0">
+            <a:schemeClr val="accent1"/>
+          </a:fillRef>
+          <a:effectRef idx="0">
+            <a:schemeClr val="accent1"/>
+          </a:effectRef>
+          <a:fontRef idx="minor">
+            <a:schemeClr val="tx1"/>
+          </a:fontRef>
+        </p:style>
+      </p:cxnSp>
+      <p:cxnSp>
+        <p:nvCxnSpPr>
+          <p:cNvPr id="21" name="Gerade Verbindung mit Pfeil 20"/>
+          <p:cNvCxnSpPr>
+            <a:stCxn id="7" idx="2"/>
+            <a:endCxn id="14" idx="0"/>
+          </p:cNvCxnSpPr>
+          <p:nvPr/>
+        </p:nvCxnSpPr>
+        <p:spPr>
+          <a:xfrm>
+            <a:off x="2483769" y="4256488"/>
+            <a:ext cx="0" cy="396648"/>
+          </a:xfrm>
+          <a:prstGeom prst="straightConnector1">
+            <a:avLst/>
+          </a:prstGeom>
+          <a:ln>
+            <a:tailEnd type="arrow"/>
+          </a:ln>
+        </p:spPr>
+        <p:style>
+          <a:lnRef idx="1">
+            <a:schemeClr val="accent1"/>
+          </a:lnRef>
+          <a:fillRef idx="0">
+            <a:schemeClr val="accent1"/>
+          </a:fillRef>
+          <a:effectRef idx="0">
+            <a:schemeClr val="accent1"/>
+          </a:effectRef>
+          <a:fontRef idx="minor">
+            <a:schemeClr val="tx1"/>
+          </a:fontRef>
+        </p:style>
+      </p:cxnSp>
+      <p:sp>
+        <p:nvSpPr>
+          <p:cNvPr id="33" name="Rechteck 32"/>
+          <p:cNvSpPr/>
+          <p:nvPr/>
+        </p:nvSpPr>
+        <p:spPr>
+          <a:xfrm>
+            <a:off x="6156177" y="2302101"/>
+            <a:ext cx="1296145" cy="576064"/>
+          </a:xfrm>
+          <a:prstGeom prst="rect">
+            <a:avLst/>
+          </a:prstGeom>
+          <a:solidFill>
+            <a:srgbClr val="9BBB59"/>
+          </a:solidFill>
+          <a:ln w="25400" cap="rnd" cmpd="sng" algn="ctr">
+            <a:solidFill>
+              <a:srgbClr val="9BBB59">
+                <a:shade val="50000"/>
+              </a:srgbClr>
+            </a:solidFill>
+            <a:prstDash val="solid"/>
+          </a:ln>
+          <a:effectLst/>
+        </p:spPr>
+        <p:txBody>
+          <a:bodyPr lIns="91431" tIns="45715" rIns="91431" bIns="45715" rtlCol="0" anchor="ctr"/>
+          <a:lstStyle>
+            <a:defPPr>
+              <a:defRPr lang="en-US"/>
+            </a:defPPr>
+            <a:lvl1pPr marL="0" algn="l" defTabSz="914400" rtl="0" eaLnBrk="1" latinLnBrk="0" hangingPunct="1">
+              <a:defRPr sz="1800" kern="1200">
+                <a:solidFill>
+                  <a:schemeClr val="tx1"/>
+                </a:solidFill>
+                <a:latin typeface="+mn-lt"/>
+                <a:ea typeface="+mn-ea"/>
+                <a:cs typeface="+mn-cs"/>
+              </a:defRPr>
+            </a:lvl1pPr>
+            <a:lvl2pPr marL="457200" algn="l" defTabSz="914400" rtl="0" eaLnBrk="1" latinLnBrk="0" hangingPunct="1">
+              <a:defRPr sz="1800" kern="1200">
+                <a:solidFill>
+                  <a:schemeClr val="tx1"/>
+                </a:solidFill>
+                <a:latin typeface="+mn-lt"/>
+                <a:ea typeface="+mn-ea"/>
+                <a:cs typeface="+mn-cs"/>
+              </a:defRPr>
+            </a:lvl2pPr>
+            <a:lvl3pPr marL="914400" algn="l" defTabSz="914400" rtl="0" eaLnBrk="1" latinLnBrk="0" hangingPunct="1">
+              <a:defRPr sz="1800" kern="1200">
+                <a:solidFill>
+                  <a:schemeClr val="tx1"/>
+                </a:solidFill>
+                <a:latin typeface="+mn-lt"/>
+                <a:ea typeface="+mn-ea"/>
+                <a:cs typeface="+mn-cs"/>
+              </a:defRPr>
+            </a:lvl3pPr>
+            <a:lvl4pPr marL="1371600" algn="l" defTabSz="914400" rtl="0" eaLnBrk="1" latinLnBrk="0" hangingPunct="1">
+              <a:defRPr sz="1800" kern="1200">
+                <a:solidFill>
+                  <a:schemeClr val="tx1"/>
+                </a:solidFill>
+                <a:latin typeface="+mn-lt"/>
+                <a:ea typeface="+mn-ea"/>
+                <a:cs typeface="+mn-cs"/>
+              </a:defRPr>
+            </a:lvl4pPr>
+            <a:lvl5pPr marL="1828800" algn="l" defTabSz="914400" rtl="0" eaLnBrk="1" latinLnBrk="0" hangingPunct="1">
+              <a:defRPr sz="1800" kern="1200">
+                <a:solidFill>
+                  <a:schemeClr val="tx1"/>
+                </a:solidFill>
+                <a:latin typeface="+mn-lt"/>
+                <a:ea typeface="+mn-ea"/>
+                <a:cs typeface="+mn-cs"/>
+              </a:defRPr>
+            </a:lvl5pPr>
+            <a:lvl6pPr marL="2286000" algn="l" defTabSz="914400" rtl="0" eaLnBrk="1" latinLnBrk="0" hangingPunct="1">
+              <a:defRPr sz="1800" kern="1200">
+                <a:solidFill>
+                  <a:schemeClr val="tx1"/>
+                </a:solidFill>
+                <a:latin typeface="+mn-lt"/>
+                <a:ea typeface="+mn-ea"/>
+                <a:cs typeface="+mn-cs"/>
+              </a:defRPr>
+            </a:lvl6pPr>
+            <a:lvl7pPr marL="2743200" algn="l" defTabSz="914400" rtl="0" eaLnBrk="1" latinLnBrk="0" hangingPunct="1">
+              <a:defRPr sz="1800" kern="1200">
+                <a:solidFill>
+                  <a:schemeClr val="tx1"/>
+                </a:solidFill>
+                <a:latin typeface="+mn-lt"/>
+                <a:ea typeface="+mn-ea"/>
+                <a:cs typeface="+mn-cs"/>
+              </a:defRPr>
+            </a:lvl7pPr>
+            <a:lvl8pPr marL="3200400" algn="l" defTabSz="914400" rtl="0" eaLnBrk="1" latinLnBrk="0" hangingPunct="1">
+              <a:defRPr sz="1800" kern="1200">
+                <a:solidFill>
+                  <a:schemeClr val="tx1"/>
+                </a:solidFill>
+                <a:latin typeface="+mn-lt"/>
+                <a:ea typeface="+mn-ea"/>
+                <a:cs typeface="+mn-cs"/>
+              </a:defRPr>
+            </a:lvl8pPr>
+            <a:lvl9pPr marL="3657600" algn="l" defTabSz="914400" rtl="0" eaLnBrk="1" latinLnBrk="0" hangingPunct="1">
+              <a:defRPr sz="1800" kern="1200">
+                <a:solidFill>
+                  <a:schemeClr val="tx1"/>
+                </a:solidFill>
+                <a:latin typeface="+mn-lt"/>
+                <a:ea typeface="+mn-ea"/>
+                <a:cs typeface="+mn-cs"/>
+              </a:defRPr>
+            </a:lvl9pPr>
+          </a:lstStyle>
+          <a:p>
+            <a:pPr algn="ctr" defTabSz="914309">
+              <a:defRPr/>
+            </a:pPr>
+            <a:r>
+              <a:rPr lang="de-AT" sz="1600" kern="0" dirty="0">
+                <a:solidFill>
+                  <a:sysClr val="window" lastClr="FFFFFF"/>
+                </a:solidFill>
+                <a:latin typeface="Calibri"/>
+              </a:rPr>
+              <a:t>PEPPOL </a:t>
+            </a:r>
+            <a:r>
+              <a:rPr lang="de-AT" sz="1600" kern="0" dirty="0" err="1" smtClean="0">
+                <a:solidFill>
+                  <a:sysClr val="window" lastClr="FFFFFF"/>
+                </a:solidFill>
+                <a:latin typeface="Calibri"/>
+              </a:rPr>
+              <a:t>Prod</a:t>
+            </a:r>
+            <a:r>
+              <a:rPr lang="de-AT" sz="1600" kern="0" dirty="0" smtClean="0">
+                <a:solidFill>
+                  <a:sysClr val="window" lastClr="FFFFFF"/>
+                </a:solidFill>
+                <a:latin typeface="Calibri"/>
+              </a:rPr>
+              <a:t> Root </a:t>
+            </a:r>
+            <a:r>
+              <a:rPr lang="de-AT" sz="1600" kern="0" dirty="0">
+                <a:solidFill>
+                  <a:sysClr val="window" lastClr="FFFFFF"/>
+                </a:solidFill>
+                <a:latin typeface="Calibri"/>
+              </a:rPr>
+              <a:t>CA</a:t>
+            </a:r>
+          </a:p>
+        </p:txBody>
+      </p:sp>
+      <p:sp>
+        <p:nvSpPr>
+          <p:cNvPr id="34" name="Rechteck 33"/>
+          <p:cNvSpPr/>
+          <p:nvPr/>
+        </p:nvSpPr>
+        <p:spPr>
+          <a:xfrm>
+            <a:off x="7596336" y="3670253"/>
+            <a:ext cx="1296145" cy="576064"/>
+          </a:xfrm>
+          <a:prstGeom prst="rect">
+            <a:avLst/>
+          </a:prstGeom>
+          <a:gradFill rotWithShape="1">
+            <a:gsLst>
+              <a:gs pos="0">
+                <a:srgbClr val="9BBB59">
+                  <a:tint val="50000"/>
+                  <a:satMod val="300000"/>
+                </a:srgbClr>
+              </a:gs>
+              <a:gs pos="35000">
+                <a:srgbClr val="9BBB59">
+                  <a:tint val="37000"/>
+                  <a:satMod val="300000"/>
+                </a:srgbClr>
+              </a:gs>
+              <a:gs pos="100000">
+                <a:srgbClr val="9BBB59">
+                  <a:tint val="15000"/>
+                  <a:satMod val="350000"/>
+                </a:srgbClr>
+              </a:gs>
+            </a:gsLst>
+            <a:lin ang="16200000" scaled="1"/>
+          </a:gradFill>
+          <a:ln w="9525" cap="rnd" cmpd="sng" algn="ctr">
+            <a:solidFill>
+              <a:srgbClr val="9BBB59">
+                <a:shade val="95000"/>
+                <a:satMod val="105000"/>
+              </a:srgbClr>
+            </a:solidFill>
+            <a:prstDash val="solid"/>
+          </a:ln>
+          <a:effectLst>
+            <a:outerShdw blurRad="40000" dist="20000" dir="5400000">
+              <a:srgbClr val="000000">
+                <a:alpha val="38000"/>
+              </a:srgbClr>
+            </a:outerShdw>
+          </a:effectLst>
+        </p:spPr>
+        <p:txBody>
+          <a:bodyPr lIns="91431" tIns="45715" rIns="91431" bIns="45715" rtlCol="0" anchor="ctr"/>
+          <a:lstStyle>
+            <a:defPPr>
+              <a:defRPr lang="en-US"/>
+            </a:defPPr>
+            <a:lvl1pPr marL="0" algn="l" defTabSz="914400" rtl="0" eaLnBrk="1" latinLnBrk="0" hangingPunct="1">
+              <a:defRPr sz="1800" kern="1200">
+                <a:solidFill>
+                  <a:schemeClr val="tx1"/>
+                </a:solidFill>
+                <a:latin typeface="+mn-lt"/>
+                <a:ea typeface="+mn-ea"/>
+                <a:cs typeface="+mn-cs"/>
+              </a:defRPr>
+            </a:lvl1pPr>
+            <a:lvl2pPr marL="457200" algn="l" defTabSz="914400" rtl="0" eaLnBrk="1" latinLnBrk="0" hangingPunct="1">
+              <a:defRPr sz="1800" kern="1200">
+                <a:solidFill>
+                  <a:schemeClr val="tx1"/>
+                </a:solidFill>
+                <a:latin typeface="+mn-lt"/>
+                <a:ea typeface="+mn-ea"/>
+                <a:cs typeface="+mn-cs"/>
+              </a:defRPr>
+            </a:lvl2pPr>
+            <a:lvl3pPr marL="914400" algn="l" defTabSz="914400" rtl="0" eaLnBrk="1" latinLnBrk="0" hangingPunct="1">
+              <a:defRPr sz="1800" kern="1200">
+                <a:solidFill>
+                  <a:schemeClr val="tx1"/>
+                </a:solidFill>
+                <a:latin typeface="+mn-lt"/>
+                <a:ea typeface="+mn-ea"/>
+                <a:cs typeface="+mn-cs"/>
+              </a:defRPr>
+            </a:lvl3pPr>
+            <a:lvl4pPr marL="1371600" algn="l" defTabSz="914400" rtl="0" eaLnBrk="1" latinLnBrk="0" hangingPunct="1">
+              <a:defRPr sz="1800" kern="1200">
+                <a:solidFill>
+                  <a:schemeClr val="tx1"/>
+                </a:solidFill>
+                <a:latin typeface="+mn-lt"/>
+                <a:ea typeface="+mn-ea"/>
+                <a:cs typeface="+mn-cs"/>
+              </a:defRPr>
+            </a:lvl4pPr>
+            <a:lvl5pPr marL="1828800" algn="l" defTabSz="914400" rtl="0" eaLnBrk="1" latinLnBrk="0" hangingPunct="1">
+              <a:defRPr sz="1800" kern="1200">
+                <a:solidFill>
+                  <a:schemeClr val="tx1"/>
+                </a:solidFill>
+                <a:latin typeface="+mn-lt"/>
+                <a:ea typeface="+mn-ea"/>
+                <a:cs typeface="+mn-cs"/>
+              </a:defRPr>
+            </a:lvl5pPr>
+            <a:lvl6pPr marL="2286000" algn="l" defTabSz="914400" rtl="0" eaLnBrk="1" latinLnBrk="0" hangingPunct="1">
+              <a:defRPr sz="1800" kern="1200">
+                <a:solidFill>
+                  <a:schemeClr val="tx1"/>
+                </a:solidFill>
+                <a:latin typeface="+mn-lt"/>
+                <a:ea typeface="+mn-ea"/>
+                <a:cs typeface="+mn-cs"/>
+              </a:defRPr>
+            </a:lvl6pPr>
+            <a:lvl7pPr marL="2743200" algn="l" defTabSz="914400" rtl="0" eaLnBrk="1" latinLnBrk="0" hangingPunct="1">
+              <a:defRPr sz="1800" kern="1200">
+                <a:solidFill>
+                  <a:schemeClr val="tx1"/>
+                </a:solidFill>
+                <a:latin typeface="+mn-lt"/>
+                <a:ea typeface="+mn-ea"/>
+                <a:cs typeface="+mn-cs"/>
+              </a:defRPr>
+            </a:lvl7pPr>
+            <a:lvl8pPr marL="3200400" algn="l" defTabSz="914400" rtl="0" eaLnBrk="1" latinLnBrk="0" hangingPunct="1">
+              <a:defRPr sz="1800" kern="1200">
+                <a:solidFill>
+                  <a:schemeClr val="tx1"/>
+                </a:solidFill>
+                <a:latin typeface="+mn-lt"/>
+                <a:ea typeface="+mn-ea"/>
+                <a:cs typeface="+mn-cs"/>
+              </a:defRPr>
+            </a:lvl8pPr>
+            <a:lvl9pPr marL="3657600" algn="l" defTabSz="914400" rtl="0" eaLnBrk="1" latinLnBrk="0" hangingPunct="1">
+              <a:defRPr sz="1800" kern="1200">
+                <a:solidFill>
+                  <a:schemeClr val="tx1"/>
+                </a:solidFill>
+                <a:latin typeface="+mn-lt"/>
+                <a:ea typeface="+mn-ea"/>
+                <a:cs typeface="+mn-cs"/>
+              </a:defRPr>
+            </a:lvl9pPr>
+          </a:lstStyle>
+          <a:p>
+            <a:pPr algn="ctr" defTabSz="914309">
+              <a:defRPr/>
+            </a:pPr>
+            <a:r>
+              <a:rPr lang="de-AT" sz="1600" kern="0" dirty="0">
+                <a:solidFill>
+                  <a:sysClr val="windowText" lastClr="000000"/>
+                </a:solidFill>
+                <a:latin typeface="Calibri"/>
+              </a:rPr>
+              <a:t>PEPPOL </a:t>
+            </a:r>
+            <a:r>
+              <a:rPr lang="de-AT" sz="1600" kern="0" dirty="0" err="1" smtClean="0">
+                <a:solidFill>
+                  <a:sysClr val="windowText" lastClr="000000"/>
+                </a:solidFill>
+                <a:latin typeface="Calibri"/>
+              </a:rPr>
+              <a:t>Prod</a:t>
+            </a:r>
+            <a:r>
+              <a:rPr lang="de-AT" sz="1600" kern="0" dirty="0" smtClean="0">
+                <a:solidFill>
+                  <a:sysClr val="windowText" lastClr="000000"/>
+                </a:solidFill>
+                <a:latin typeface="Calibri"/>
+              </a:rPr>
+              <a:t> STS CA</a:t>
+            </a:r>
+            <a:endParaRPr lang="de-AT" sz="1600" kern="0" dirty="0">
+              <a:solidFill>
+                <a:sysClr val="windowText" lastClr="000000"/>
+              </a:solidFill>
+              <a:latin typeface="Calibri"/>
+            </a:endParaRPr>
+          </a:p>
+        </p:txBody>
+      </p:sp>
+      <p:sp>
+        <p:nvSpPr>
+          <p:cNvPr id="35" name="Rechteck 34"/>
+          <p:cNvSpPr/>
+          <p:nvPr/>
+        </p:nvSpPr>
+        <p:spPr>
+          <a:xfrm>
+            <a:off x="6156177" y="3670253"/>
+            <a:ext cx="1296145" cy="576064"/>
+          </a:xfrm>
+          <a:prstGeom prst="rect">
+            <a:avLst/>
+          </a:prstGeom>
+          <a:solidFill>
+            <a:srgbClr val="9BBB59"/>
+          </a:solidFill>
+          <a:ln w="25400" cap="rnd" cmpd="sng" algn="ctr">
+            <a:solidFill>
+              <a:srgbClr val="9BBB59">
+                <a:shade val="50000"/>
+              </a:srgbClr>
+            </a:solidFill>
+            <a:prstDash val="solid"/>
+          </a:ln>
+          <a:effectLst/>
+        </p:spPr>
+        <p:txBody>
+          <a:bodyPr lIns="91431" tIns="45715" rIns="91431" bIns="45715" rtlCol="0" anchor="ctr"/>
+          <a:lstStyle>
+            <a:defPPr>
+              <a:defRPr lang="en-US"/>
+            </a:defPPr>
+            <a:lvl1pPr marL="0" algn="l" defTabSz="914400" rtl="0" eaLnBrk="1" latinLnBrk="0" hangingPunct="1">
+              <a:defRPr sz="1800" kern="1200">
+                <a:solidFill>
+                  <a:schemeClr val="tx1"/>
+                </a:solidFill>
+                <a:latin typeface="+mn-lt"/>
+                <a:ea typeface="+mn-ea"/>
+                <a:cs typeface="+mn-cs"/>
+              </a:defRPr>
+            </a:lvl1pPr>
+            <a:lvl2pPr marL="457200" algn="l" defTabSz="914400" rtl="0" eaLnBrk="1" latinLnBrk="0" hangingPunct="1">
+              <a:defRPr sz="1800" kern="1200">
+                <a:solidFill>
+                  <a:schemeClr val="tx1"/>
+                </a:solidFill>
+                <a:latin typeface="+mn-lt"/>
+                <a:ea typeface="+mn-ea"/>
+                <a:cs typeface="+mn-cs"/>
+              </a:defRPr>
+            </a:lvl2pPr>
+            <a:lvl3pPr marL="914400" algn="l" defTabSz="914400" rtl="0" eaLnBrk="1" latinLnBrk="0" hangingPunct="1">
+              <a:defRPr sz="1800" kern="1200">
+                <a:solidFill>
+                  <a:schemeClr val="tx1"/>
+                </a:solidFill>
+                <a:latin typeface="+mn-lt"/>
+                <a:ea typeface="+mn-ea"/>
+                <a:cs typeface="+mn-cs"/>
+              </a:defRPr>
+            </a:lvl3pPr>
+            <a:lvl4pPr marL="1371600" algn="l" defTabSz="914400" rtl="0" eaLnBrk="1" latinLnBrk="0" hangingPunct="1">
+              <a:defRPr sz="1800" kern="1200">
+                <a:solidFill>
+                  <a:schemeClr val="tx1"/>
+                </a:solidFill>
+                <a:latin typeface="+mn-lt"/>
+                <a:ea typeface="+mn-ea"/>
+                <a:cs typeface="+mn-cs"/>
+              </a:defRPr>
+            </a:lvl4pPr>
+            <a:lvl5pPr marL="1828800" algn="l" defTabSz="914400" rtl="0" eaLnBrk="1" latinLnBrk="0" hangingPunct="1">
+              <a:defRPr sz="1800" kern="1200">
+                <a:solidFill>
+                  <a:schemeClr val="tx1"/>
+                </a:solidFill>
+                <a:latin typeface="+mn-lt"/>
+                <a:ea typeface="+mn-ea"/>
+                <a:cs typeface="+mn-cs"/>
+              </a:defRPr>
+            </a:lvl5pPr>
+            <a:lvl6pPr marL="2286000" algn="l" defTabSz="914400" rtl="0" eaLnBrk="1" latinLnBrk="0" hangingPunct="1">
+              <a:defRPr sz="1800" kern="1200">
+                <a:solidFill>
+                  <a:schemeClr val="tx1"/>
+                </a:solidFill>
+                <a:latin typeface="+mn-lt"/>
+                <a:ea typeface="+mn-ea"/>
+                <a:cs typeface="+mn-cs"/>
+              </a:defRPr>
+            </a:lvl6pPr>
+            <a:lvl7pPr marL="2743200" algn="l" defTabSz="914400" rtl="0" eaLnBrk="1" latinLnBrk="0" hangingPunct="1">
+              <a:defRPr sz="1800" kern="1200">
+                <a:solidFill>
+                  <a:schemeClr val="tx1"/>
+                </a:solidFill>
+                <a:latin typeface="+mn-lt"/>
+                <a:ea typeface="+mn-ea"/>
+                <a:cs typeface="+mn-cs"/>
+              </a:defRPr>
+            </a:lvl7pPr>
+            <a:lvl8pPr marL="3200400" algn="l" defTabSz="914400" rtl="0" eaLnBrk="1" latinLnBrk="0" hangingPunct="1">
+              <a:defRPr sz="1800" kern="1200">
+                <a:solidFill>
+                  <a:schemeClr val="tx1"/>
+                </a:solidFill>
+                <a:latin typeface="+mn-lt"/>
+                <a:ea typeface="+mn-ea"/>
+                <a:cs typeface="+mn-cs"/>
+              </a:defRPr>
+            </a:lvl8pPr>
+            <a:lvl9pPr marL="3657600" algn="l" defTabSz="914400" rtl="0" eaLnBrk="1" latinLnBrk="0" hangingPunct="1">
+              <a:defRPr sz="1800" kern="1200">
+                <a:solidFill>
+                  <a:schemeClr val="tx1"/>
+                </a:solidFill>
+                <a:latin typeface="+mn-lt"/>
+                <a:ea typeface="+mn-ea"/>
+                <a:cs typeface="+mn-cs"/>
+              </a:defRPr>
+            </a:lvl9pPr>
+          </a:lstStyle>
+          <a:p>
+            <a:pPr algn="ctr" defTabSz="914309">
+              <a:defRPr/>
+            </a:pPr>
+            <a:r>
+              <a:rPr lang="de-AT" sz="1600" kern="0" dirty="0">
+                <a:solidFill>
+                  <a:sysClr val="window" lastClr="FFFFFF"/>
+                </a:solidFill>
+                <a:latin typeface="Calibri"/>
+              </a:rPr>
+              <a:t>PEPPOL </a:t>
+            </a:r>
+            <a:r>
+              <a:rPr lang="de-AT" sz="1600" kern="0" dirty="0" err="1" smtClean="0">
+                <a:solidFill>
+                  <a:sysClr val="window" lastClr="FFFFFF"/>
+                </a:solidFill>
+                <a:latin typeface="Calibri"/>
+              </a:rPr>
+              <a:t>Prod</a:t>
+            </a:r>
+            <a:r>
+              <a:rPr lang="de-AT" sz="1600" kern="0" dirty="0" smtClean="0">
+                <a:solidFill>
+                  <a:sysClr val="window" lastClr="FFFFFF"/>
+                </a:solidFill>
+                <a:latin typeface="Calibri"/>
+              </a:rPr>
+              <a:t> </a:t>
+            </a:r>
+            <a:r>
+              <a:rPr lang="de-AT" sz="1600" kern="0" dirty="0">
+                <a:solidFill>
+                  <a:sysClr val="window" lastClr="FFFFFF"/>
+                </a:solidFill>
+                <a:latin typeface="Calibri"/>
+              </a:rPr>
+              <a:t>SMP CA</a:t>
+            </a:r>
+          </a:p>
+        </p:txBody>
+      </p:sp>
+      <p:sp>
+        <p:nvSpPr>
+          <p:cNvPr id="36" name="Rechteck 35"/>
+          <p:cNvSpPr/>
+          <p:nvPr/>
+        </p:nvSpPr>
+        <p:spPr>
+          <a:xfrm>
+            <a:off x="4716017" y="3670253"/>
+            <a:ext cx="1296145" cy="576064"/>
+          </a:xfrm>
+          <a:prstGeom prst="rect">
+            <a:avLst/>
+          </a:prstGeom>
+          <a:solidFill>
+            <a:srgbClr val="9BBB59"/>
+          </a:solidFill>
+          <a:ln w="25400" cap="rnd" cmpd="sng" algn="ctr">
+            <a:solidFill>
+              <a:srgbClr val="9BBB59">
+                <a:shade val="50000"/>
+              </a:srgbClr>
+            </a:solidFill>
+            <a:prstDash val="solid"/>
+          </a:ln>
+          <a:effectLst/>
+        </p:spPr>
+        <p:txBody>
+          <a:bodyPr lIns="91431" tIns="45715" rIns="91431" bIns="45715" rtlCol="0" anchor="ctr"/>
+          <a:lstStyle>
+            <a:defPPr>
+              <a:defRPr lang="en-US"/>
+            </a:defPPr>
+            <a:lvl1pPr marL="0" algn="l" defTabSz="914400" rtl="0" eaLnBrk="1" latinLnBrk="0" hangingPunct="1">
+              <a:defRPr sz="1800" kern="1200">
+                <a:solidFill>
+                  <a:schemeClr val="tx1"/>
+                </a:solidFill>
+                <a:latin typeface="+mn-lt"/>
+                <a:ea typeface="+mn-ea"/>
+                <a:cs typeface="+mn-cs"/>
+              </a:defRPr>
+            </a:lvl1pPr>
+            <a:lvl2pPr marL="457200" algn="l" defTabSz="914400" rtl="0" eaLnBrk="1" latinLnBrk="0" hangingPunct="1">
+              <a:defRPr sz="1800" kern="1200">
+                <a:solidFill>
+                  <a:schemeClr val="tx1"/>
+                </a:solidFill>
+                <a:latin typeface="+mn-lt"/>
+                <a:ea typeface="+mn-ea"/>
+                <a:cs typeface="+mn-cs"/>
+              </a:defRPr>
+            </a:lvl2pPr>
+            <a:lvl3pPr marL="914400" algn="l" defTabSz="914400" rtl="0" eaLnBrk="1" latinLnBrk="0" hangingPunct="1">
+              <a:defRPr sz="1800" kern="1200">
+                <a:solidFill>
+                  <a:schemeClr val="tx1"/>
+                </a:solidFill>
+                <a:latin typeface="+mn-lt"/>
+                <a:ea typeface="+mn-ea"/>
+                <a:cs typeface="+mn-cs"/>
+              </a:defRPr>
+            </a:lvl3pPr>
+            <a:lvl4pPr marL="1371600" algn="l" defTabSz="914400" rtl="0" eaLnBrk="1" latinLnBrk="0" hangingPunct="1">
+              <a:defRPr sz="1800" kern="1200">
+                <a:solidFill>
+                  <a:schemeClr val="tx1"/>
+                </a:solidFill>
+                <a:latin typeface="+mn-lt"/>
+                <a:ea typeface="+mn-ea"/>
+                <a:cs typeface="+mn-cs"/>
+              </a:defRPr>
+            </a:lvl4pPr>
+            <a:lvl5pPr marL="1828800" algn="l" defTabSz="914400" rtl="0" eaLnBrk="1" latinLnBrk="0" hangingPunct="1">
+              <a:defRPr sz="1800" kern="1200">
+                <a:solidFill>
+                  <a:schemeClr val="tx1"/>
+                </a:solidFill>
+                <a:latin typeface="+mn-lt"/>
+                <a:ea typeface="+mn-ea"/>
+                <a:cs typeface="+mn-cs"/>
+              </a:defRPr>
+            </a:lvl5pPr>
+            <a:lvl6pPr marL="2286000" algn="l" defTabSz="914400" rtl="0" eaLnBrk="1" latinLnBrk="0" hangingPunct="1">
+              <a:defRPr sz="1800" kern="1200">
+                <a:solidFill>
+                  <a:schemeClr val="tx1"/>
+                </a:solidFill>
+                <a:latin typeface="+mn-lt"/>
+                <a:ea typeface="+mn-ea"/>
+                <a:cs typeface="+mn-cs"/>
+              </a:defRPr>
+            </a:lvl6pPr>
+            <a:lvl7pPr marL="2743200" algn="l" defTabSz="914400" rtl="0" eaLnBrk="1" latinLnBrk="0" hangingPunct="1">
+              <a:defRPr sz="1800" kern="1200">
+                <a:solidFill>
+                  <a:schemeClr val="tx1"/>
+                </a:solidFill>
+                <a:latin typeface="+mn-lt"/>
+                <a:ea typeface="+mn-ea"/>
+                <a:cs typeface="+mn-cs"/>
+              </a:defRPr>
+            </a:lvl7pPr>
+            <a:lvl8pPr marL="3200400" algn="l" defTabSz="914400" rtl="0" eaLnBrk="1" latinLnBrk="0" hangingPunct="1">
+              <a:defRPr sz="1800" kern="1200">
+                <a:solidFill>
+                  <a:schemeClr val="tx1"/>
+                </a:solidFill>
+                <a:latin typeface="+mn-lt"/>
+                <a:ea typeface="+mn-ea"/>
+                <a:cs typeface="+mn-cs"/>
+              </a:defRPr>
+            </a:lvl8pPr>
+            <a:lvl9pPr marL="3657600" algn="l" defTabSz="914400" rtl="0" eaLnBrk="1" latinLnBrk="0" hangingPunct="1">
+              <a:defRPr sz="1800" kern="1200">
+                <a:solidFill>
+                  <a:schemeClr val="tx1"/>
+                </a:solidFill>
+                <a:latin typeface="+mn-lt"/>
+                <a:ea typeface="+mn-ea"/>
+                <a:cs typeface="+mn-cs"/>
+              </a:defRPr>
+            </a:lvl9pPr>
+          </a:lstStyle>
+          <a:p>
+            <a:pPr algn="ctr" defTabSz="914309">
+              <a:defRPr/>
+            </a:pPr>
+            <a:r>
+              <a:rPr lang="de-AT" sz="1600" kern="0" dirty="0">
+                <a:solidFill>
+                  <a:sysClr val="window" lastClr="FFFFFF"/>
+                </a:solidFill>
+                <a:latin typeface="Calibri"/>
+              </a:rPr>
+              <a:t>PEPPOL </a:t>
+            </a:r>
+            <a:r>
+              <a:rPr lang="de-AT" sz="1600" kern="0" dirty="0" err="1" smtClean="0">
+                <a:solidFill>
+                  <a:sysClr val="window" lastClr="FFFFFF"/>
+                </a:solidFill>
+                <a:latin typeface="Calibri"/>
+              </a:rPr>
+              <a:t>Prod</a:t>
+            </a:r>
+            <a:r>
+              <a:rPr lang="de-AT" sz="1600" kern="0" dirty="0" smtClean="0">
+                <a:solidFill>
+                  <a:sysClr val="window" lastClr="FFFFFF"/>
+                </a:solidFill>
+                <a:latin typeface="Calibri"/>
+              </a:rPr>
+              <a:t> </a:t>
+            </a:r>
+            <a:r>
+              <a:rPr lang="de-AT" sz="1600" kern="0" dirty="0">
+                <a:solidFill>
+                  <a:sysClr val="window" lastClr="FFFFFF"/>
+                </a:solidFill>
+                <a:latin typeface="Calibri"/>
+              </a:rPr>
+              <a:t>AP CA</a:t>
+            </a:r>
+          </a:p>
+        </p:txBody>
+      </p:sp>
+      <p:cxnSp>
+        <p:nvCxnSpPr>
+          <p:cNvPr id="37" name="Gewinkelte Verbindung 36"/>
+          <p:cNvCxnSpPr>
+            <a:stCxn id="33" idx="2"/>
+            <a:endCxn id="36" idx="0"/>
+          </p:cNvCxnSpPr>
+          <p:nvPr/>
+        </p:nvCxnSpPr>
+        <p:spPr>
+          <a:xfrm rot="5400000">
+            <a:off x="5688126" y="2554129"/>
+            <a:ext cx="792088" cy="1440160"/>
+          </a:xfrm>
+          <a:prstGeom prst="bentConnector3">
+            <a:avLst>
+              <a:gd name="adj1" fmla="val 50000"/>
+            </a:avLst>
+          </a:prstGeom>
+          <a:noFill/>
+          <a:ln w="9525" cap="rnd" cmpd="sng" algn="ctr">
+            <a:solidFill>
+              <a:srgbClr val="4F81BD">
+                <a:shade val="95000"/>
+                <a:satMod val="105000"/>
+              </a:srgbClr>
+            </a:solidFill>
+            <a:prstDash val="solid"/>
+            <a:tailEnd type="arrow"/>
+          </a:ln>
+          <a:effectLst/>
+        </p:spPr>
+      </p:cxnSp>
+      <p:cxnSp>
+        <p:nvCxnSpPr>
+          <p:cNvPr id="38" name="Gewinkelte Verbindung 37"/>
+          <p:cNvCxnSpPr>
+            <a:stCxn id="33" idx="2"/>
+            <a:endCxn id="34" idx="0"/>
+          </p:cNvCxnSpPr>
+          <p:nvPr/>
+        </p:nvCxnSpPr>
+        <p:spPr>
+          <a:xfrm rot="16200000" flipH="1">
+            <a:off x="7128285" y="2554129"/>
+            <a:ext cx="792088" cy="1440159"/>
+          </a:xfrm>
+          <a:prstGeom prst="bentConnector3">
+            <a:avLst>
+              <a:gd name="adj1" fmla="val 50000"/>
+            </a:avLst>
+          </a:prstGeom>
+          <a:noFill/>
+          <a:ln w="9525" cap="rnd" cmpd="sng" algn="ctr">
+            <a:solidFill>
+              <a:srgbClr val="4F81BD">
+                <a:shade val="95000"/>
+                <a:satMod val="105000"/>
+              </a:srgbClr>
+            </a:solidFill>
+            <a:prstDash val="solid"/>
+            <a:tailEnd type="arrow"/>
+          </a:ln>
+          <a:effectLst/>
+        </p:spPr>
+      </p:cxnSp>
+      <p:cxnSp>
+        <p:nvCxnSpPr>
+          <p:cNvPr id="39" name="Gerade Verbindung mit Pfeil 38"/>
+          <p:cNvCxnSpPr>
+            <a:stCxn id="33" idx="2"/>
+            <a:endCxn id="35" idx="0"/>
+          </p:cNvCxnSpPr>
+          <p:nvPr/>
+        </p:nvCxnSpPr>
+        <p:spPr>
+          <a:xfrm>
+            <a:off x="6804250" y="2878165"/>
+            <a:ext cx="0" cy="792088"/>
+          </a:xfrm>
+          <a:prstGeom prst="straightConnector1">
+            <a:avLst/>
+          </a:prstGeom>
+          <a:noFill/>
+          <a:ln w="9525" cap="rnd" cmpd="sng" algn="ctr">
+            <a:solidFill>
+              <a:srgbClr val="4F81BD">
+                <a:shade val="95000"/>
+                <a:satMod val="105000"/>
+              </a:srgbClr>
+            </a:solidFill>
+            <a:prstDash val="solid"/>
+            <a:tailEnd type="arrow"/>
+          </a:ln>
+          <a:effectLst/>
+        </p:spPr>
+      </p:cxnSp>
+      <p:sp>
+        <p:nvSpPr>
+          <p:cNvPr id="40" name="Rechteck 39"/>
+          <p:cNvSpPr/>
+          <p:nvPr/>
+        </p:nvSpPr>
+        <p:spPr>
+          <a:xfrm>
+            <a:off x="4716017" y="4642965"/>
+            <a:ext cx="1296145" cy="576064"/>
+          </a:xfrm>
+          <a:prstGeom prst="rect">
+            <a:avLst/>
+          </a:prstGeom>
+          <a:ln/>
+        </p:spPr>
+        <p:style>
+          <a:lnRef idx="2">
+            <a:schemeClr val="accent2">
+              <a:shade val="50000"/>
+            </a:schemeClr>
+          </a:lnRef>
+          <a:fillRef idx="1">
+            <a:schemeClr val="accent2"/>
+          </a:fillRef>
+          <a:effectRef idx="0">
+            <a:schemeClr val="accent2"/>
+          </a:effectRef>
+          <a:fontRef idx="minor">
+            <a:schemeClr val="lt1"/>
+          </a:fontRef>
+        </p:style>
+        <p:txBody>
+          <a:bodyPr lIns="91431" tIns="45715" rIns="91431" bIns="45715" rtlCol="0" anchor="ctr"/>
+          <a:lstStyle>
+            <a:defPPr>
+              <a:defRPr lang="en-US"/>
+            </a:defPPr>
+            <a:lvl1pPr marL="0" algn="l" defTabSz="914400" rtl="0" eaLnBrk="1" latinLnBrk="0" hangingPunct="1">
+              <a:defRPr sz="1800" kern="1200">
+                <a:solidFill>
+                  <a:schemeClr val="tx1"/>
+                </a:solidFill>
+                <a:latin typeface="+mn-lt"/>
+                <a:ea typeface="+mn-ea"/>
+                <a:cs typeface="+mn-cs"/>
+              </a:defRPr>
+            </a:lvl1pPr>
+            <a:lvl2pPr marL="457200" algn="l" defTabSz="914400" rtl="0" eaLnBrk="1" latinLnBrk="0" hangingPunct="1">
+              <a:defRPr sz="1800" kern="1200">
+                <a:solidFill>
+                  <a:schemeClr val="tx1"/>
+                </a:solidFill>
+                <a:latin typeface="+mn-lt"/>
+                <a:ea typeface="+mn-ea"/>
+                <a:cs typeface="+mn-cs"/>
+              </a:defRPr>
+            </a:lvl2pPr>
+            <a:lvl3pPr marL="914400" algn="l" defTabSz="914400" rtl="0" eaLnBrk="1" latinLnBrk="0" hangingPunct="1">
+              <a:defRPr sz="1800" kern="1200">
+                <a:solidFill>
+                  <a:schemeClr val="tx1"/>
+                </a:solidFill>
+                <a:latin typeface="+mn-lt"/>
+                <a:ea typeface="+mn-ea"/>
+                <a:cs typeface="+mn-cs"/>
+              </a:defRPr>
+            </a:lvl3pPr>
+            <a:lvl4pPr marL="1371600" algn="l" defTabSz="914400" rtl="0" eaLnBrk="1" latinLnBrk="0" hangingPunct="1">
+              <a:defRPr sz="1800" kern="1200">
+                <a:solidFill>
+                  <a:schemeClr val="tx1"/>
+                </a:solidFill>
+                <a:latin typeface="+mn-lt"/>
+                <a:ea typeface="+mn-ea"/>
+                <a:cs typeface="+mn-cs"/>
+              </a:defRPr>
+            </a:lvl4pPr>
+            <a:lvl5pPr marL="1828800" algn="l" defTabSz="914400" rtl="0" eaLnBrk="1" latinLnBrk="0" hangingPunct="1">
+              <a:defRPr sz="1800" kern="1200">
+                <a:solidFill>
+                  <a:schemeClr val="tx1"/>
+                </a:solidFill>
+                <a:latin typeface="+mn-lt"/>
+                <a:ea typeface="+mn-ea"/>
+                <a:cs typeface="+mn-cs"/>
+              </a:defRPr>
+            </a:lvl5pPr>
+            <a:lvl6pPr marL="2286000" algn="l" defTabSz="914400" rtl="0" eaLnBrk="1" latinLnBrk="0" hangingPunct="1">
+              <a:defRPr sz="1800" kern="1200">
+                <a:solidFill>
+                  <a:schemeClr val="tx1"/>
+                </a:solidFill>
+                <a:latin typeface="+mn-lt"/>
+                <a:ea typeface="+mn-ea"/>
+                <a:cs typeface="+mn-cs"/>
+              </a:defRPr>
+            </a:lvl6pPr>
+            <a:lvl7pPr marL="2743200" algn="l" defTabSz="914400" rtl="0" eaLnBrk="1" latinLnBrk="0" hangingPunct="1">
+              <a:defRPr sz="1800" kern="1200">
+                <a:solidFill>
+                  <a:schemeClr val="tx1"/>
+                </a:solidFill>
+                <a:latin typeface="+mn-lt"/>
+                <a:ea typeface="+mn-ea"/>
+                <a:cs typeface="+mn-cs"/>
+              </a:defRPr>
+            </a:lvl7pPr>
+            <a:lvl8pPr marL="3200400" algn="l" defTabSz="914400" rtl="0" eaLnBrk="1" latinLnBrk="0" hangingPunct="1">
+              <a:defRPr sz="1800" kern="1200">
+                <a:solidFill>
+                  <a:schemeClr val="tx1"/>
+                </a:solidFill>
+                <a:latin typeface="+mn-lt"/>
+                <a:ea typeface="+mn-ea"/>
+                <a:cs typeface="+mn-cs"/>
+              </a:defRPr>
+            </a:lvl8pPr>
+            <a:lvl9pPr marL="3657600" algn="l" defTabSz="914400" rtl="0" eaLnBrk="1" latinLnBrk="0" hangingPunct="1">
+              <a:defRPr sz="1800" kern="1200">
+                <a:solidFill>
+                  <a:schemeClr val="tx1"/>
+                </a:solidFill>
+                <a:latin typeface="+mn-lt"/>
+                <a:ea typeface="+mn-ea"/>
+                <a:cs typeface="+mn-cs"/>
+              </a:defRPr>
+            </a:lvl9pPr>
+          </a:lstStyle>
+          <a:p>
+            <a:pPr algn="ctr" defTabSz="914309">
+              <a:defRPr/>
+            </a:pPr>
+            <a:r>
+              <a:rPr lang="de-AT" sz="1600" kern="0" dirty="0">
+                <a:solidFill>
+                  <a:sysClr val="window" lastClr="FFFFFF"/>
+                </a:solidFill>
+                <a:latin typeface="Calibri"/>
+              </a:rPr>
+              <a:t>AP </a:t>
+            </a:r>
+            <a:r>
+              <a:rPr lang="de-AT" sz="1600" kern="0" dirty="0" err="1" smtClean="0">
+                <a:solidFill>
+                  <a:sysClr val="window" lastClr="FFFFFF"/>
+                </a:solidFill>
+                <a:latin typeface="Calibri"/>
+              </a:rPr>
+              <a:t>Prod</a:t>
+            </a:r>
+            <a:r>
+              <a:rPr lang="de-AT" sz="1600" kern="0" dirty="0" smtClean="0">
+                <a:solidFill>
+                  <a:sysClr val="window" lastClr="FFFFFF"/>
+                </a:solidFill>
+                <a:latin typeface="Calibri"/>
+              </a:rPr>
+              <a:t> </a:t>
+            </a:r>
+            <a:r>
+              <a:rPr lang="de-AT" sz="1600" kern="0" dirty="0">
+                <a:solidFill>
+                  <a:sysClr val="window" lastClr="FFFFFF"/>
+                </a:solidFill>
+                <a:latin typeface="Calibri"/>
+              </a:rPr>
+              <a:t>Cert</a:t>
+            </a:r>
+          </a:p>
+        </p:txBody>
+      </p:sp>
+      <p:sp>
+        <p:nvSpPr>
+          <p:cNvPr id="41" name="Rechteck 40"/>
+          <p:cNvSpPr/>
+          <p:nvPr/>
+        </p:nvSpPr>
+        <p:spPr>
+          <a:xfrm>
+            <a:off x="6156177" y="4642965"/>
+            <a:ext cx="1296145" cy="576064"/>
+          </a:xfrm>
+          <a:prstGeom prst="rect">
+            <a:avLst/>
+          </a:prstGeom>
+          <a:ln/>
+        </p:spPr>
+        <p:style>
+          <a:lnRef idx="2">
+            <a:schemeClr val="accent2">
+              <a:shade val="50000"/>
+            </a:schemeClr>
+          </a:lnRef>
+          <a:fillRef idx="1">
+            <a:schemeClr val="accent2"/>
+          </a:fillRef>
+          <a:effectRef idx="0">
+            <a:schemeClr val="accent2"/>
+          </a:effectRef>
+          <a:fontRef idx="minor">
+            <a:schemeClr val="lt1"/>
+          </a:fontRef>
+        </p:style>
+        <p:txBody>
+          <a:bodyPr lIns="91431" tIns="45715" rIns="91431" bIns="45715" rtlCol="0" anchor="ctr"/>
+          <a:lstStyle>
+            <a:defPPr>
+              <a:defRPr lang="en-US"/>
+            </a:defPPr>
+            <a:lvl1pPr marL="0" algn="l" defTabSz="914400" rtl="0" eaLnBrk="1" latinLnBrk="0" hangingPunct="1">
+              <a:defRPr sz="1800" kern="1200">
+                <a:solidFill>
+                  <a:schemeClr val="tx1"/>
+                </a:solidFill>
+                <a:latin typeface="+mn-lt"/>
+                <a:ea typeface="+mn-ea"/>
+                <a:cs typeface="+mn-cs"/>
+              </a:defRPr>
+            </a:lvl1pPr>
+            <a:lvl2pPr marL="457200" algn="l" defTabSz="914400" rtl="0" eaLnBrk="1" latinLnBrk="0" hangingPunct="1">
+              <a:defRPr sz="1800" kern="1200">
+                <a:solidFill>
+                  <a:schemeClr val="tx1"/>
+                </a:solidFill>
+                <a:latin typeface="+mn-lt"/>
+                <a:ea typeface="+mn-ea"/>
+                <a:cs typeface="+mn-cs"/>
+              </a:defRPr>
+            </a:lvl2pPr>
+            <a:lvl3pPr marL="914400" algn="l" defTabSz="914400" rtl="0" eaLnBrk="1" latinLnBrk="0" hangingPunct="1">
+              <a:defRPr sz="1800" kern="1200">
+                <a:solidFill>
+                  <a:schemeClr val="tx1"/>
+                </a:solidFill>
+                <a:latin typeface="+mn-lt"/>
+                <a:ea typeface="+mn-ea"/>
+                <a:cs typeface="+mn-cs"/>
+              </a:defRPr>
+            </a:lvl3pPr>
+            <a:lvl4pPr marL="1371600" algn="l" defTabSz="914400" rtl="0" eaLnBrk="1" latinLnBrk="0" hangingPunct="1">
+              <a:defRPr sz="1800" kern="1200">
+                <a:solidFill>
+                  <a:schemeClr val="tx1"/>
+                </a:solidFill>
+                <a:latin typeface="+mn-lt"/>
+                <a:ea typeface="+mn-ea"/>
+                <a:cs typeface="+mn-cs"/>
+              </a:defRPr>
+            </a:lvl4pPr>
+            <a:lvl5pPr marL="1828800" algn="l" defTabSz="914400" rtl="0" eaLnBrk="1" latinLnBrk="0" hangingPunct="1">
+              <a:defRPr sz="1800" kern="1200">
+                <a:solidFill>
+                  <a:schemeClr val="tx1"/>
+                </a:solidFill>
+                <a:latin typeface="+mn-lt"/>
+                <a:ea typeface="+mn-ea"/>
+                <a:cs typeface="+mn-cs"/>
+              </a:defRPr>
+            </a:lvl5pPr>
+            <a:lvl6pPr marL="2286000" algn="l" defTabSz="914400" rtl="0" eaLnBrk="1" latinLnBrk="0" hangingPunct="1">
+              <a:defRPr sz="1800" kern="1200">
+                <a:solidFill>
+                  <a:schemeClr val="tx1"/>
+                </a:solidFill>
+                <a:latin typeface="+mn-lt"/>
+                <a:ea typeface="+mn-ea"/>
+                <a:cs typeface="+mn-cs"/>
+              </a:defRPr>
+            </a:lvl6pPr>
+            <a:lvl7pPr marL="2743200" algn="l" defTabSz="914400" rtl="0" eaLnBrk="1" latinLnBrk="0" hangingPunct="1">
+              <a:defRPr sz="1800" kern="1200">
+                <a:solidFill>
+                  <a:schemeClr val="tx1"/>
+                </a:solidFill>
+                <a:latin typeface="+mn-lt"/>
+                <a:ea typeface="+mn-ea"/>
+                <a:cs typeface="+mn-cs"/>
+              </a:defRPr>
+            </a:lvl7pPr>
+            <a:lvl8pPr marL="3200400" algn="l" defTabSz="914400" rtl="0" eaLnBrk="1" latinLnBrk="0" hangingPunct="1">
+              <a:defRPr sz="1800" kern="1200">
+                <a:solidFill>
+                  <a:schemeClr val="tx1"/>
+                </a:solidFill>
+                <a:latin typeface="+mn-lt"/>
+                <a:ea typeface="+mn-ea"/>
+                <a:cs typeface="+mn-cs"/>
+              </a:defRPr>
+            </a:lvl8pPr>
+            <a:lvl9pPr marL="3657600" algn="l" defTabSz="914400" rtl="0" eaLnBrk="1" latinLnBrk="0" hangingPunct="1">
+              <a:defRPr sz="1800" kern="1200">
+                <a:solidFill>
+                  <a:schemeClr val="tx1"/>
+                </a:solidFill>
+                <a:latin typeface="+mn-lt"/>
+                <a:ea typeface="+mn-ea"/>
+                <a:cs typeface="+mn-cs"/>
+              </a:defRPr>
+            </a:lvl9pPr>
+          </a:lstStyle>
+          <a:p>
+            <a:pPr algn="ctr" defTabSz="914309">
+              <a:defRPr/>
+            </a:pPr>
+            <a:r>
+              <a:rPr lang="de-AT" sz="1600" kern="0" dirty="0">
+                <a:solidFill>
+                  <a:sysClr val="window" lastClr="FFFFFF"/>
+                </a:solidFill>
+                <a:latin typeface="Calibri"/>
+              </a:rPr>
+              <a:t>SMP </a:t>
+            </a:r>
+            <a:r>
+              <a:rPr lang="de-AT" sz="1600" kern="0" dirty="0" err="1" smtClean="0">
+                <a:solidFill>
+                  <a:sysClr val="window" lastClr="FFFFFF"/>
+                </a:solidFill>
+                <a:latin typeface="Calibri"/>
+              </a:rPr>
+              <a:t>Prod</a:t>
+            </a:r>
+            <a:r>
+              <a:rPr lang="de-AT" sz="1600" kern="0" dirty="0" smtClean="0">
+                <a:solidFill>
+                  <a:sysClr val="window" lastClr="FFFFFF"/>
+                </a:solidFill>
+                <a:latin typeface="Calibri"/>
+              </a:rPr>
+              <a:t> Cert</a:t>
+            </a:r>
+            <a:endParaRPr lang="de-AT" sz="1600" kern="0" dirty="0">
+              <a:solidFill>
+                <a:sysClr val="window" lastClr="FFFFFF"/>
+              </a:solidFill>
+              <a:latin typeface="Calibri"/>
+            </a:endParaRPr>
+          </a:p>
+        </p:txBody>
+      </p:sp>
+      <p:cxnSp>
+        <p:nvCxnSpPr>
+          <p:cNvPr id="42" name="Gerade Verbindung mit Pfeil 41"/>
+          <p:cNvCxnSpPr>
+            <a:stCxn id="36" idx="2"/>
+            <a:endCxn id="40" idx="0"/>
+          </p:cNvCxnSpPr>
+          <p:nvPr/>
+        </p:nvCxnSpPr>
+        <p:spPr>
+          <a:xfrm>
+            <a:off x="5364090" y="4246317"/>
+            <a:ext cx="0" cy="396648"/>
+          </a:xfrm>
+          <a:prstGeom prst="straightConnector1">
+            <a:avLst/>
+          </a:prstGeom>
+          <a:ln>
+            <a:tailEnd type="arrow"/>
+          </a:ln>
+        </p:spPr>
+        <p:style>
+          <a:lnRef idx="1">
+            <a:schemeClr val="accent1"/>
+          </a:lnRef>
+          <a:fillRef idx="0">
+            <a:schemeClr val="accent1"/>
+          </a:fillRef>
+          <a:effectRef idx="0">
+            <a:schemeClr val="accent1"/>
+          </a:effectRef>
+          <a:fontRef idx="minor">
+            <a:schemeClr val="tx1"/>
+          </a:fontRef>
+        </p:style>
+      </p:cxnSp>
+      <p:cxnSp>
+        <p:nvCxnSpPr>
+          <p:cNvPr id="43" name="Gerade Verbindung mit Pfeil 42"/>
+          <p:cNvCxnSpPr>
+            <a:stCxn id="35" idx="2"/>
+            <a:endCxn id="41" idx="0"/>
+          </p:cNvCxnSpPr>
+          <p:nvPr/>
+        </p:nvCxnSpPr>
+        <p:spPr>
+          <a:xfrm>
+            <a:off x="6804250" y="4246317"/>
+            <a:ext cx="0" cy="396648"/>
+          </a:xfrm>
+          <a:prstGeom prst="straightConnector1">
+            <a:avLst/>
+          </a:prstGeom>
+          <a:ln>
+            <a:tailEnd type="arrow"/>
+          </a:ln>
+        </p:spPr>
+        <p:style>
+          <a:lnRef idx="1">
+            <a:schemeClr val="accent1"/>
+          </a:lnRef>
+          <a:fillRef idx="0">
+            <a:schemeClr val="accent1"/>
+          </a:fillRef>
+          <a:effectRef idx="0">
+            <a:schemeClr val="accent1"/>
+          </a:effectRef>
+          <a:fontRef idx="minor">
+            <a:schemeClr val="tx1"/>
+          </a:fontRef>
+        </p:style>
+      </p:cxnSp>
+    </p:spTree>
+    <p:extLst>
+      <p:ext uri="{BB962C8B-B14F-4D97-AF65-F5344CB8AC3E}">
+        <p14:creationId xmlns:p14="http://schemas.microsoft.com/office/powerpoint/2010/main" val="2109585359"/>
+      </p:ext>
+    </p:extLst>
+  </p:cSld>
+  <p:clrMapOvr>
+    <a:masterClrMapping/>
+  </p:clrMapOvr>
+  <p:timing>
+    <p:tnLst>
+      <p:par>
+        <p:cTn id="1" dur="indefinite" restart="never" nodeType="tmRoot"/>
+      </p:par>
+    </p:tnLst>
+  </p:timing>
+</p:sld>
+</file>
+
 <file path=ppt/theme/theme1.xml><?xml version="1.0" encoding="utf-8"?>
 <a:theme xmlns:a="http://schemas.openxmlformats.org/drawingml/2006/main" name="Larissa-Design">
   <a:themeElements>

</xml_diff>

<commit_message>
Added new PKI information
</commit_message>
<xml_diff>
--- a/docs/PEPPOL practical.pptx
+++ b/docs/PEPPOL practical.pptx
@@ -8,9 +8,7 @@
     <p:sldId id="256" r:id="rId2"/>
     <p:sldId id="257" r:id="rId3"/>
     <p:sldId id="258" r:id="rId4"/>
-    <p:sldId id="261" r:id="rId5"/>
-    <p:sldId id="260" r:id="rId6"/>
-    <p:sldId id="259" r:id="rId7"/>
+    <p:sldId id="262" r:id="rId5"/>
   </p:sldIdLst>
   <p:sldSz cx="9144000" cy="6858000" type="screen4x3"/>
   <p:notesSz cx="6858000" cy="9144000"/>
@@ -294,7 +292,7 @@
             <a:fld id="{80F9A3F1-91AA-4A03-9A50-C623FA2DD738}" type="datetimeFigureOut">
               <a:rPr lang="de-AT" smtClean="0"/>
               <a:pPr/>
-              <a:t>04.12.2017</a:t>
+              <a:t>23.04.2018</a:t>
             </a:fld>
             <a:endParaRPr lang="de-AT"/>
           </a:p>
@@ -461,7 +459,7 @@
             <a:fld id="{80F9A3F1-91AA-4A03-9A50-C623FA2DD738}" type="datetimeFigureOut">
               <a:rPr lang="de-AT" smtClean="0"/>
               <a:pPr/>
-              <a:t>04.12.2017</a:t>
+              <a:t>23.04.2018</a:t>
             </a:fld>
             <a:endParaRPr lang="de-AT"/>
           </a:p>
@@ -638,7 +636,7 @@
             <a:fld id="{80F9A3F1-91AA-4A03-9A50-C623FA2DD738}" type="datetimeFigureOut">
               <a:rPr lang="de-AT" smtClean="0"/>
               <a:pPr/>
-              <a:t>04.12.2017</a:t>
+              <a:t>23.04.2018</a:t>
             </a:fld>
             <a:endParaRPr lang="de-AT"/>
           </a:p>
@@ -805,7 +803,7 @@
             <a:fld id="{80F9A3F1-91AA-4A03-9A50-C623FA2DD738}" type="datetimeFigureOut">
               <a:rPr lang="de-AT" smtClean="0"/>
               <a:pPr/>
-              <a:t>04.12.2017</a:t>
+              <a:t>23.04.2018</a:t>
             </a:fld>
             <a:endParaRPr lang="de-AT"/>
           </a:p>
@@ -1048,7 +1046,7 @@
             <a:fld id="{80F9A3F1-91AA-4A03-9A50-C623FA2DD738}" type="datetimeFigureOut">
               <a:rPr lang="de-AT" smtClean="0"/>
               <a:pPr/>
-              <a:t>04.12.2017</a:t>
+              <a:t>23.04.2018</a:t>
             </a:fld>
             <a:endParaRPr lang="de-AT"/>
           </a:p>
@@ -1333,7 +1331,7 @@
             <a:fld id="{80F9A3F1-91AA-4A03-9A50-C623FA2DD738}" type="datetimeFigureOut">
               <a:rPr lang="de-AT" smtClean="0"/>
               <a:pPr/>
-              <a:t>04.12.2017</a:t>
+              <a:t>23.04.2018</a:t>
             </a:fld>
             <a:endParaRPr lang="de-AT"/>
           </a:p>
@@ -1752,7 +1750,7 @@
             <a:fld id="{80F9A3F1-91AA-4A03-9A50-C623FA2DD738}" type="datetimeFigureOut">
               <a:rPr lang="de-AT" smtClean="0"/>
               <a:pPr/>
-              <a:t>04.12.2017</a:t>
+              <a:t>23.04.2018</a:t>
             </a:fld>
             <a:endParaRPr lang="de-AT"/>
           </a:p>
@@ -1867,7 +1865,7 @@
             <a:fld id="{80F9A3F1-91AA-4A03-9A50-C623FA2DD738}" type="datetimeFigureOut">
               <a:rPr lang="de-AT" smtClean="0"/>
               <a:pPr/>
-              <a:t>04.12.2017</a:t>
+              <a:t>23.04.2018</a:t>
             </a:fld>
             <a:endParaRPr lang="de-AT"/>
           </a:p>
@@ -1959,7 +1957,7 @@
             <a:fld id="{80F9A3F1-91AA-4A03-9A50-C623FA2DD738}" type="datetimeFigureOut">
               <a:rPr lang="de-AT" smtClean="0"/>
               <a:pPr/>
-              <a:t>04.12.2017</a:t>
+              <a:t>23.04.2018</a:t>
             </a:fld>
             <a:endParaRPr lang="de-AT"/>
           </a:p>
@@ -2233,7 +2231,7 @@
             <a:fld id="{80F9A3F1-91AA-4A03-9A50-C623FA2DD738}" type="datetimeFigureOut">
               <a:rPr lang="de-AT" smtClean="0"/>
               <a:pPr/>
-              <a:t>04.12.2017</a:t>
+              <a:t>23.04.2018</a:t>
             </a:fld>
             <a:endParaRPr lang="de-AT"/>
           </a:p>
@@ -2483,7 +2481,7 @@
             <a:fld id="{80F9A3F1-91AA-4A03-9A50-C623FA2DD738}" type="datetimeFigureOut">
               <a:rPr lang="de-AT" smtClean="0"/>
               <a:pPr/>
-              <a:t>04.12.2017</a:t>
+              <a:t>23.04.2018</a:t>
             </a:fld>
             <a:endParaRPr lang="de-AT"/>
           </a:p>
@@ -2693,7 +2691,7 @@
             <a:fld id="{80F9A3F1-91AA-4A03-9A50-C623FA2DD738}" type="datetimeFigureOut">
               <a:rPr lang="de-AT" smtClean="0"/>
               <a:pPr/>
-              <a:t>04.12.2017</a:t>
+              <a:t>23.04.2018</a:t>
             </a:fld>
             <a:endParaRPr lang="de-AT"/>
           </a:p>
@@ -5649,6 +5647,29 @@
           </a:fontRef>
         </p:style>
       </p:cxnSp>
+      <p:sp>
+        <p:nvSpPr>
+          <p:cNvPr id="24" name="Titel 23"/>
+          <p:cNvSpPr>
+            <a:spLocks noGrp="1"/>
+          </p:cNvSpPr>
+          <p:nvPr>
+            <p:ph type="title"/>
+          </p:nvPr>
+        </p:nvSpPr>
+        <p:spPr/>
+        <p:txBody>
+          <a:bodyPr/>
+          <a:lstStyle/>
+          <a:p>
+            <a:r>
+              <a:rPr lang="en-GB" dirty="0" smtClean="0"/>
+              <a:t>OpenPEPPOL PKI v2</a:t>
+            </a:r>
+            <a:endParaRPr lang="en-GB" dirty="0"/>
+          </a:p>
+        </p:txBody>
+      </p:sp>
     </p:spTree>
     <p:extLst>
       <p:ext uri="{BB962C8B-B14F-4D97-AF65-F5344CB8AC3E}">
@@ -5694,7 +5715,7 @@
         </p:nvSpPr>
         <p:spPr>
           <a:xfrm>
-            <a:off x="2195735" y="2312272"/>
+            <a:off x="2267743" y="2312272"/>
             <a:ext cx="1296145" cy="576064"/>
           </a:xfrm>
           <a:prstGeom prst="rect">
@@ -5834,7 +5855,7 @@
         </p:nvSpPr>
         <p:spPr>
           <a:xfrm>
-            <a:off x="2987823" y="3680424"/>
+            <a:off x="2987824" y="3680424"/>
             <a:ext cx="1296145" cy="576064"/>
           </a:xfrm>
           <a:prstGeom prst="rect">
@@ -5974,7 +5995,7 @@
         </p:nvSpPr>
         <p:spPr>
           <a:xfrm>
-            <a:off x="1547663" y="3680424"/>
+            <a:off x="1547664" y="3680424"/>
             <a:ext cx="1296145" cy="576064"/>
           </a:xfrm>
           <a:prstGeom prst="rect">
@@ -6135,8 +6156,8 @@
         </p:nvCxnSpPr>
         <p:spPr>
           <a:xfrm rot="5400000">
-            <a:off x="2123728" y="2960344"/>
-            <a:ext cx="792088" cy="648072"/>
+            <a:off x="2159733" y="2924341"/>
+            <a:ext cx="792088" cy="720079"/>
           </a:xfrm>
           <a:prstGeom prst="bentConnector3">
             <a:avLst>
@@ -6157,6 +6178,39 @@
           <a:effectLst/>
         </p:spPr>
       </p:cxnSp>
+      <p:cxnSp>
+        <p:nvCxnSpPr>
+          <p:cNvPr id="12" name="Gerade Verbindung mit Pfeil 11"/>
+          <p:cNvCxnSpPr>
+            <a:stCxn id="5" idx="2"/>
+            <a:endCxn id="7" idx="0"/>
+          </p:cNvCxnSpPr>
+          <p:nvPr/>
+        </p:nvCxnSpPr>
+        <p:spPr>
+          <a:xfrm rot="16200000" flipH="1">
+            <a:off x="2879812" y="2924339"/>
+            <a:ext cx="792088" cy="720081"/>
+          </a:xfrm>
+          <a:prstGeom prst="bentConnector3">
+            <a:avLst>
+              <a:gd name="adj1" fmla="val 50000"/>
+            </a:avLst>
+          </a:prstGeom>
+          <a:noFill/>
+          <a:ln w="9525" cap="rnd" cmpd="sng" algn="ctr">
+            <a:solidFill>
+              <a:srgbClr val="4F81BD">
+                <a:shade val="95000"/>
+                <a:satMod val="105000"/>
+              </a:srgbClr>
+            </a:solidFill>
+            <a:prstDash val="solid"/>
+            <a:tailEnd type="arrow"/>
+          </a:ln>
+          <a:effectLst/>
+        </p:spPr>
+      </p:cxnSp>
       <p:sp>
         <p:nvSpPr>
           <p:cNvPr id="13" name="Rechteck 12"/>
@@ -6165,7 +6219,7 @@
         </p:nvSpPr>
         <p:spPr>
           <a:xfrm>
-            <a:off x="1547663" y="4653136"/>
+            <a:off x="1547664" y="4653136"/>
             <a:ext cx="1296145" cy="576064"/>
           </a:xfrm>
           <a:prstGeom prst="rect">
@@ -6310,7 +6364,7 @@
         </p:nvSpPr>
         <p:spPr>
           <a:xfrm>
-            <a:off x="2987823" y="4653136"/>
+            <a:off x="2987824" y="4653136"/>
             <a:ext cx="1296145" cy="576064"/>
           </a:xfrm>
           <a:prstGeom prst="rect">
@@ -6458,7 +6512,7 @@
         </p:nvCxnSpPr>
         <p:spPr>
           <a:xfrm>
-            <a:off x="2195736" y="4256488"/>
+            <a:off x="2195737" y="4256488"/>
             <a:ext cx="0" cy="396648"/>
           </a:xfrm>
           <a:prstGeom prst="straightConnector1">
@@ -6494,7 +6548,7 @@
         </p:nvCxnSpPr>
         <p:spPr>
           <a:xfrm>
-            <a:off x="3635896" y="4256488"/>
+            <a:off x="3635897" y="4256488"/>
             <a:ext cx="0" cy="396648"/>
           </a:xfrm>
           <a:prstGeom prst="straightConnector1">
@@ -7033,6 +7087,39 @@
           <a:xfrm rot="5400000">
             <a:off x="5328085" y="2914170"/>
             <a:ext cx="792088" cy="720078"/>
+          </a:xfrm>
+          <a:prstGeom prst="bentConnector3">
+            <a:avLst>
+              <a:gd name="adj1" fmla="val 50000"/>
+            </a:avLst>
+          </a:prstGeom>
+          <a:noFill/>
+          <a:ln w="9525" cap="rnd" cmpd="sng" algn="ctr">
+            <a:solidFill>
+              <a:srgbClr val="4F81BD">
+                <a:shade val="95000"/>
+                <a:satMod val="105000"/>
+              </a:srgbClr>
+            </a:solidFill>
+            <a:prstDash val="solid"/>
+            <a:tailEnd type="arrow"/>
+          </a:ln>
+          <a:effectLst/>
+        </p:spPr>
+      </p:cxnSp>
+      <p:cxnSp>
+        <p:nvCxnSpPr>
+          <p:cNvPr id="39" name="Gerade Verbindung mit Pfeil 38"/>
+          <p:cNvCxnSpPr>
+            <a:stCxn id="33" idx="2"/>
+            <a:endCxn id="35" idx="0"/>
+          </p:cNvCxnSpPr>
+          <p:nvPr/>
+        </p:nvCxnSpPr>
+        <p:spPr>
+          <a:xfrm rot="16200000" flipH="1">
+            <a:off x="6048165" y="2914168"/>
+            <a:ext cx="792088" cy="720082"/>
           </a:xfrm>
           <a:prstGeom prst="bentConnector3">
             <a:avLst>
@@ -7466,3280 +7553,29 @@
           </a:fontRef>
         </p:style>
       </p:cxnSp>
-      <p:cxnSp>
-        <p:nvCxnSpPr>
-          <p:cNvPr id="25" name="Gewinkelte Verbindung 24"/>
-          <p:cNvCxnSpPr>
-            <a:stCxn id="5" idx="2"/>
-            <a:endCxn id="7" idx="0"/>
-          </p:cNvCxnSpPr>
-          <p:nvPr/>
-        </p:nvCxnSpPr>
-        <p:spPr>
-          <a:xfrm rot="16200000" flipH="1">
-            <a:off x="2843808" y="2888336"/>
-            <a:ext cx="792088" cy="792088"/>
-          </a:xfrm>
-          <a:prstGeom prst="bentConnector3">
-            <a:avLst>
-              <a:gd name="adj1" fmla="val 50000"/>
-            </a:avLst>
-          </a:prstGeom>
-          <a:ln>
-            <a:tailEnd type="arrow"/>
-          </a:ln>
-        </p:spPr>
-        <p:style>
-          <a:lnRef idx="1">
-            <a:schemeClr val="accent1"/>
-          </a:lnRef>
-          <a:fillRef idx="0">
-            <a:schemeClr val="accent1"/>
-          </a:fillRef>
-          <a:effectRef idx="0">
-            <a:schemeClr val="accent1"/>
-          </a:effectRef>
-          <a:fontRef idx="minor">
-            <a:schemeClr val="tx1"/>
-          </a:fontRef>
-        </p:style>
-      </p:cxnSp>
-      <p:cxnSp>
-        <p:nvCxnSpPr>
-          <p:cNvPr id="27" name="Gewinkelte Verbindung 26"/>
-          <p:cNvCxnSpPr>
-            <a:stCxn id="33" idx="2"/>
-            <a:endCxn id="35" idx="0"/>
-          </p:cNvCxnSpPr>
-          <p:nvPr/>
-        </p:nvCxnSpPr>
-        <p:spPr>
-          <a:xfrm rot="16200000" flipH="1">
-            <a:off x="6048165" y="2914168"/>
-            <a:ext cx="792088" cy="720082"/>
-          </a:xfrm>
-          <a:prstGeom prst="bentConnector3">
-            <a:avLst>
-              <a:gd name="adj1" fmla="val 50000"/>
-            </a:avLst>
-          </a:prstGeom>
-          <a:ln>
-            <a:tailEnd type="arrow"/>
-          </a:ln>
-        </p:spPr>
-        <p:style>
-          <a:lnRef idx="1">
-            <a:schemeClr val="accent1"/>
-          </a:lnRef>
-          <a:fillRef idx="0">
-            <a:schemeClr val="accent1"/>
-          </a:fillRef>
-          <a:effectRef idx="0">
-            <a:schemeClr val="accent1"/>
-          </a:effectRef>
-          <a:fontRef idx="minor">
-            <a:schemeClr val="tx1"/>
-          </a:fontRef>
-        </p:style>
-      </p:cxnSp>
-    </p:spTree>
-    <p:extLst>
-      <p:ext uri="{BB962C8B-B14F-4D97-AF65-F5344CB8AC3E}">
-        <p14:creationId xmlns="" xmlns:p14="http://schemas.microsoft.com/office/powerpoint/2010/main" val="2109585359"/>
-      </p:ext>
-    </p:extLst>
-  </p:cSld>
-  <p:clrMapOvr>
-    <a:masterClrMapping/>
-  </p:clrMapOvr>
-  <p:timing>
-    <p:tnLst>
-      <p:par>
-        <p:cTn id="1" dur="indefinite" restart="never" nodeType="tmRoot"/>
-      </p:par>
-    </p:tnLst>
-  </p:timing>
-</p:sld>
-</file>
-
-<file path=ppt/slides/slide5.xml><?xml version="1.0" encoding="utf-8"?>
-<p:sld xmlns:a="http://schemas.openxmlformats.org/drawingml/2006/main" xmlns:r="http://schemas.openxmlformats.org/officeDocument/2006/relationships" xmlns:p="http://schemas.openxmlformats.org/presentationml/2006/main">
-  <p:cSld>
-    <p:spTree>
-      <p:nvGrpSpPr>
-        <p:cNvPr id="1" name=""/>
-        <p:cNvGrpSpPr/>
-        <p:nvPr/>
-      </p:nvGrpSpPr>
-      <p:grpSpPr>
-        <a:xfrm>
-          <a:off x="0" y="0"/>
-          <a:ext cx="0" cy="0"/>
-          <a:chOff x="0" y="0"/>
-          <a:chExt cx="0" cy="0"/>
-        </a:xfrm>
-      </p:grpSpPr>
-      <p:sp>
-        <p:nvSpPr>
-          <p:cNvPr id="7" name="Rechteck 6"/>
-          <p:cNvSpPr/>
-          <p:nvPr/>
-        </p:nvSpPr>
-        <p:spPr>
-          <a:xfrm>
-            <a:off x="2555775" y="3680424"/>
-            <a:ext cx="1296145" cy="576064"/>
-          </a:xfrm>
-          <a:prstGeom prst="rect">
-            <a:avLst/>
-          </a:prstGeom>
-          <a:solidFill>
-            <a:srgbClr val="9BBB59"/>
-          </a:solidFill>
-          <a:ln w="25400" cap="rnd" cmpd="sng" algn="ctr">
-            <a:solidFill>
-              <a:srgbClr val="9BBB59">
-                <a:shade val="50000"/>
-              </a:srgbClr>
-            </a:solidFill>
-            <a:prstDash val="solid"/>
-          </a:ln>
-          <a:effectLst/>
-        </p:spPr>
-        <p:txBody>
-          <a:bodyPr lIns="91431" tIns="45715" rIns="91431" bIns="45715" rtlCol="0" anchor="ctr"/>
-          <a:lstStyle>
-            <a:defPPr>
-              <a:defRPr lang="en-US"/>
-            </a:defPPr>
-            <a:lvl1pPr marL="0" algn="l" defTabSz="914400" rtl="0" eaLnBrk="1" latinLnBrk="0" hangingPunct="1">
-              <a:defRPr sz="1800" kern="1200">
-                <a:solidFill>
-                  <a:schemeClr val="tx1"/>
-                </a:solidFill>
-                <a:latin typeface="+mn-lt"/>
-                <a:ea typeface="+mn-ea"/>
-                <a:cs typeface="+mn-cs"/>
-              </a:defRPr>
-            </a:lvl1pPr>
-            <a:lvl2pPr marL="457200" algn="l" defTabSz="914400" rtl="0" eaLnBrk="1" latinLnBrk="0" hangingPunct="1">
-              <a:defRPr sz="1800" kern="1200">
-                <a:solidFill>
-                  <a:schemeClr val="tx1"/>
-                </a:solidFill>
-                <a:latin typeface="+mn-lt"/>
-                <a:ea typeface="+mn-ea"/>
-                <a:cs typeface="+mn-cs"/>
-              </a:defRPr>
-            </a:lvl2pPr>
-            <a:lvl3pPr marL="914400" algn="l" defTabSz="914400" rtl="0" eaLnBrk="1" latinLnBrk="0" hangingPunct="1">
-              <a:defRPr sz="1800" kern="1200">
-                <a:solidFill>
-                  <a:schemeClr val="tx1"/>
-                </a:solidFill>
-                <a:latin typeface="+mn-lt"/>
-                <a:ea typeface="+mn-ea"/>
-                <a:cs typeface="+mn-cs"/>
-              </a:defRPr>
-            </a:lvl3pPr>
-            <a:lvl4pPr marL="1371600" algn="l" defTabSz="914400" rtl="0" eaLnBrk="1" latinLnBrk="0" hangingPunct="1">
-              <a:defRPr sz="1800" kern="1200">
-                <a:solidFill>
-                  <a:schemeClr val="tx1"/>
-                </a:solidFill>
-                <a:latin typeface="+mn-lt"/>
-                <a:ea typeface="+mn-ea"/>
-                <a:cs typeface="+mn-cs"/>
-              </a:defRPr>
-            </a:lvl4pPr>
-            <a:lvl5pPr marL="1828800" algn="l" defTabSz="914400" rtl="0" eaLnBrk="1" latinLnBrk="0" hangingPunct="1">
-              <a:defRPr sz="1800" kern="1200">
-                <a:solidFill>
-                  <a:schemeClr val="tx1"/>
-                </a:solidFill>
-                <a:latin typeface="+mn-lt"/>
-                <a:ea typeface="+mn-ea"/>
-                <a:cs typeface="+mn-cs"/>
-              </a:defRPr>
-            </a:lvl5pPr>
-            <a:lvl6pPr marL="2286000" algn="l" defTabSz="914400" rtl="0" eaLnBrk="1" latinLnBrk="0" hangingPunct="1">
-              <a:defRPr sz="1800" kern="1200">
-                <a:solidFill>
-                  <a:schemeClr val="tx1"/>
-                </a:solidFill>
-                <a:latin typeface="+mn-lt"/>
-                <a:ea typeface="+mn-ea"/>
-                <a:cs typeface="+mn-cs"/>
-              </a:defRPr>
-            </a:lvl6pPr>
-            <a:lvl7pPr marL="2743200" algn="l" defTabSz="914400" rtl="0" eaLnBrk="1" latinLnBrk="0" hangingPunct="1">
-              <a:defRPr sz="1800" kern="1200">
-                <a:solidFill>
-                  <a:schemeClr val="tx1"/>
-                </a:solidFill>
-                <a:latin typeface="+mn-lt"/>
-                <a:ea typeface="+mn-ea"/>
-                <a:cs typeface="+mn-cs"/>
-              </a:defRPr>
-            </a:lvl7pPr>
-            <a:lvl8pPr marL="3200400" algn="l" defTabSz="914400" rtl="0" eaLnBrk="1" latinLnBrk="0" hangingPunct="1">
-              <a:defRPr sz="1800" kern="1200">
-                <a:solidFill>
-                  <a:schemeClr val="tx1"/>
-                </a:solidFill>
-                <a:latin typeface="+mn-lt"/>
-                <a:ea typeface="+mn-ea"/>
-                <a:cs typeface="+mn-cs"/>
-              </a:defRPr>
-            </a:lvl8pPr>
-            <a:lvl9pPr marL="3657600" algn="l" defTabSz="914400" rtl="0" eaLnBrk="1" latinLnBrk="0" hangingPunct="1">
-              <a:defRPr sz="1800" kern="1200">
-                <a:solidFill>
-                  <a:schemeClr val="tx1"/>
-                </a:solidFill>
-                <a:latin typeface="+mn-lt"/>
-                <a:ea typeface="+mn-ea"/>
-                <a:cs typeface="+mn-cs"/>
-              </a:defRPr>
-            </a:lvl9pPr>
-          </a:lstStyle>
-          <a:p>
-            <a:pPr algn="ctr" defTabSz="914309">
-              <a:defRPr/>
-            </a:pPr>
-            <a:r>
-              <a:rPr lang="de-AT" sz="1600" kern="0" dirty="0">
-                <a:solidFill>
-                  <a:sysClr val="window" lastClr="FFFFFF"/>
-                </a:solidFill>
-                <a:latin typeface="Calibri"/>
-              </a:rPr>
-              <a:t>PEPPOL Pilot SMP CA</a:t>
-            </a:r>
-          </a:p>
-        </p:txBody>
-      </p:sp>
-      <p:sp>
-        <p:nvSpPr>
-          <p:cNvPr id="8" name="Rechteck 7"/>
-          <p:cNvSpPr/>
-          <p:nvPr/>
-        </p:nvSpPr>
-        <p:spPr>
-          <a:xfrm>
-            <a:off x="1115615" y="3680424"/>
-            <a:ext cx="1296145" cy="576064"/>
-          </a:xfrm>
-          <a:prstGeom prst="rect">
-            <a:avLst/>
-          </a:prstGeom>
-          <a:solidFill>
-            <a:srgbClr val="9BBB59"/>
-          </a:solidFill>
-          <a:ln w="25400" cap="rnd" cmpd="sng" algn="ctr">
-            <a:solidFill>
-              <a:srgbClr val="9BBB59">
-                <a:shade val="50000"/>
-              </a:srgbClr>
-            </a:solidFill>
-            <a:prstDash val="solid"/>
-          </a:ln>
-          <a:effectLst/>
-        </p:spPr>
-        <p:txBody>
-          <a:bodyPr lIns="91431" tIns="45715" rIns="91431" bIns="45715" rtlCol="0" anchor="ctr"/>
-          <a:lstStyle>
-            <a:defPPr>
-              <a:defRPr lang="en-US"/>
-            </a:defPPr>
-            <a:lvl1pPr marL="0" algn="l" defTabSz="914400" rtl="0" eaLnBrk="1" latinLnBrk="0" hangingPunct="1">
-              <a:defRPr sz="1800" kern="1200">
-                <a:solidFill>
-                  <a:schemeClr val="tx1"/>
-                </a:solidFill>
-                <a:latin typeface="+mn-lt"/>
-                <a:ea typeface="+mn-ea"/>
-                <a:cs typeface="+mn-cs"/>
-              </a:defRPr>
-            </a:lvl1pPr>
-            <a:lvl2pPr marL="457200" algn="l" defTabSz="914400" rtl="0" eaLnBrk="1" latinLnBrk="0" hangingPunct="1">
-              <a:defRPr sz="1800" kern="1200">
-                <a:solidFill>
-                  <a:schemeClr val="tx1"/>
-                </a:solidFill>
-                <a:latin typeface="+mn-lt"/>
-                <a:ea typeface="+mn-ea"/>
-                <a:cs typeface="+mn-cs"/>
-              </a:defRPr>
-            </a:lvl2pPr>
-            <a:lvl3pPr marL="914400" algn="l" defTabSz="914400" rtl="0" eaLnBrk="1" latinLnBrk="0" hangingPunct="1">
-              <a:defRPr sz="1800" kern="1200">
-                <a:solidFill>
-                  <a:schemeClr val="tx1"/>
-                </a:solidFill>
-                <a:latin typeface="+mn-lt"/>
-                <a:ea typeface="+mn-ea"/>
-                <a:cs typeface="+mn-cs"/>
-              </a:defRPr>
-            </a:lvl3pPr>
-            <a:lvl4pPr marL="1371600" algn="l" defTabSz="914400" rtl="0" eaLnBrk="1" latinLnBrk="0" hangingPunct="1">
-              <a:defRPr sz="1800" kern="1200">
-                <a:solidFill>
-                  <a:schemeClr val="tx1"/>
-                </a:solidFill>
-                <a:latin typeface="+mn-lt"/>
-                <a:ea typeface="+mn-ea"/>
-                <a:cs typeface="+mn-cs"/>
-              </a:defRPr>
-            </a:lvl4pPr>
-            <a:lvl5pPr marL="1828800" algn="l" defTabSz="914400" rtl="0" eaLnBrk="1" latinLnBrk="0" hangingPunct="1">
-              <a:defRPr sz="1800" kern="1200">
-                <a:solidFill>
-                  <a:schemeClr val="tx1"/>
-                </a:solidFill>
-                <a:latin typeface="+mn-lt"/>
-                <a:ea typeface="+mn-ea"/>
-                <a:cs typeface="+mn-cs"/>
-              </a:defRPr>
-            </a:lvl5pPr>
-            <a:lvl6pPr marL="2286000" algn="l" defTabSz="914400" rtl="0" eaLnBrk="1" latinLnBrk="0" hangingPunct="1">
-              <a:defRPr sz="1800" kern="1200">
-                <a:solidFill>
-                  <a:schemeClr val="tx1"/>
-                </a:solidFill>
-                <a:latin typeface="+mn-lt"/>
-                <a:ea typeface="+mn-ea"/>
-                <a:cs typeface="+mn-cs"/>
-              </a:defRPr>
-            </a:lvl6pPr>
-            <a:lvl7pPr marL="2743200" algn="l" defTabSz="914400" rtl="0" eaLnBrk="1" latinLnBrk="0" hangingPunct="1">
-              <a:defRPr sz="1800" kern="1200">
-                <a:solidFill>
-                  <a:schemeClr val="tx1"/>
-                </a:solidFill>
-                <a:latin typeface="+mn-lt"/>
-                <a:ea typeface="+mn-ea"/>
-                <a:cs typeface="+mn-cs"/>
-              </a:defRPr>
-            </a:lvl7pPr>
-            <a:lvl8pPr marL="3200400" algn="l" defTabSz="914400" rtl="0" eaLnBrk="1" latinLnBrk="0" hangingPunct="1">
-              <a:defRPr sz="1800" kern="1200">
-                <a:solidFill>
-                  <a:schemeClr val="tx1"/>
-                </a:solidFill>
-                <a:latin typeface="+mn-lt"/>
-                <a:ea typeface="+mn-ea"/>
-                <a:cs typeface="+mn-cs"/>
-              </a:defRPr>
-            </a:lvl8pPr>
-            <a:lvl9pPr marL="3657600" algn="l" defTabSz="914400" rtl="0" eaLnBrk="1" latinLnBrk="0" hangingPunct="1">
-              <a:defRPr sz="1800" kern="1200">
-                <a:solidFill>
-                  <a:schemeClr val="tx1"/>
-                </a:solidFill>
-                <a:latin typeface="+mn-lt"/>
-                <a:ea typeface="+mn-ea"/>
-                <a:cs typeface="+mn-cs"/>
-              </a:defRPr>
-            </a:lvl9pPr>
-          </a:lstStyle>
-          <a:p>
-            <a:pPr algn="ctr" defTabSz="914309">
-              <a:defRPr/>
-            </a:pPr>
-            <a:r>
-              <a:rPr lang="de-AT" sz="1600" kern="0" dirty="0">
-                <a:solidFill>
-                  <a:sysClr val="window" lastClr="FFFFFF"/>
-                </a:solidFill>
-                <a:latin typeface="Calibri"/>
-              </a:rPr>
-              <a:t>PEPPOL </a:t>
-            </a:r>
-            <a:r>
-              <a:rPr lang="de-AT" sz="1600" kern="0" dirty="0" smtClean="0">
-                <a:solidFill>
-                  <a:sysClr val="window" lastClr="FFFFFF"/>
-                </a:solidFill>
-                <a:latin typeface="Calibri"/>
-              </a:rPr>
-              <a:t>Pilot </a:t>
-            </a:r>
-            <a:r>
-              <a:rPr lang="de-AT" sz="1600" kern="0" dirty="0">
-                <a:solidFill>
-                  <a:sysClr val="window" lastClr="FFFFFF"/>
-                </a:solidFill>
-                <a:latin typeface="Calibri"/>
-              </a:rPr>
-              <a:t>AP CA</a:t>
-            </a:r>
-          </a:p>
-        </p:txBody>
-      </p:sp>
-      <p:sp>
-        <p:nvSpPr>
-          <p:cNvPr id="13" name="Rechteck 12"/>
-          <p:cNvSpPr/>
-          <p:nvPr/>
-        </p:nvSpPr>
-        <p:spPr>
-          <a:xfrm>
-            <a:off x="1115615" y="4653136"/>
-            <a:ext cx="1296145" cy="576064"/>
-          </a:xfrm>
-          <a:prstGeom prst="rect">
-            <a:avLst/>
-          </a:prstGeom>
-          <a:ln/>
-        </p:spPr>
-        <p:style>
-          <a:lnRef idx="2">
-            <a:schemeClr val="accent2">
-              <a:shade val="50000"/>
-            </a:schemeClr>
-          </a:lnRef>
-          <a:fillRef idx="1">
-            <a:schemeClr val="accent2"/>
-          </a:fillRef>
-          <a:effectRef idx="0">
-            <a:schemeClr val="accent2"/>
-          </a:effectRef>
-          <a:fontRef idx="minor">
-            <a:schemeClr val="lt1"/>
-          </a:fontRef>
-        </p:style>
-        <p:txBody>
-          <a:bodyPr lIns="91431" tIns="45715" rIns="91431" bIns="45715" rtlCol="0" anchor="ctr"/>
-          <a:lstStyle>
-            <a:defPPr>
-              <a:defRPr lang="en-US"/>
-            </a:defPPr>
-            <a:lvl1pPr marL="0" algn="l" defTabSz="914400" rtl="0" eaLnBrk="1" latinLnBrk="0" hangingPunct="1">
-              <a:defRPr sz="1800" kern="1200">
-                <a:solidFill>
-                  <a:schemeClr val="tx1"/>
-                </a:solidFill>
-                <a:latin typeface="+mn-lt"/>
-                <a:ea typeface="+mn-ea"/>
-                <a:cs typeface="+mn-cs"/>
-              </a:defRPr>
-            </a:lvl1pPr>
-            <a:lvl2pPr marL="457200" algn="l" defTabSz="914400" rtl="0" eaLnBrk="1" latinLnBrk="0" hangingPunct="1">
-              <a:defRPr sz="1800" kern="1200">
-                <a:solidFill>
-                  <a:schemeClr val="tx1"/>
-                </a:solidFill>
-                <a:latin typeface="+mn-lt"/>
-                <a:ea typeface="+mn-ea"/>
-                <a:cs typeface="+mn-cs"/>
-              </a:defRPr>
-            </a:lvl2pPr>
-            <a:lvl3pPr marL="914400" algn="l" defTabSz="914400" rtl="0" eaLnBrk="1" latinLnBrk="0" hangingPunct="1">
-              <a:defRPr sz="1800" kern="1200">
-                <a:solidFill>
-                  <a:schemeClr val="tx1"/>
-                </a:solidFill>
-                <a:latin typeface="+mn-lt"/>
-                <a:ea typeface="+mn-ea"/>
-                <a:cs typeface="+mn-cs"/>
-              </a:defRPr>
-            </a:lvl3pPr>
-            <a:lvl4pPr marL="1371600" algn="l" defTabSz="914400" rtl="0" eaLnBrk="1" latinLnBrk="0" hangingPunct="1">
-              <a:defRPr sz="1800" kern="1200">
-                <a:solidFill>
-                  <a:schemeClr val="tx1"/>
-                </a:solidFill>
-                <a:latin typeface="+mn-lt"/>
-                <a:ea typeface="+mn-ea"/>
-                <a:cs typeface="+mn-cs"/>
-              </a:defRPr>
-            </a:lvl4pPr>
-            <a:lvl5pPr marL="1828800" algn="l" defTabSz="914400" rtl="0" eaLnBrk="1" latinLnBrk="0" hangingPunct="1">
-              <a:defRPr sz="1800" kern="1200">
-                <a:solidFill>
-                  <a:schemeClr val="tx1"/>
-                </a:solidFill>
-                <a:latin typeface="+mn-lt"/>
-                <a:ea typeface="+mn-ea"/>
-                <a:cs typeface="+mn-cs"/>
-              </a:defRPr>
-            </a:lvl5pPr>
-            <a:lvl6pPr marL="2286000" algn="l" defTabSz="914400" rtl="0" eaLnBrk="1" latinLnBrk="0" hangingPunct="1">
-              <a:defRPr sz="1800" kern="1200">
-                <a:solidFill>
-                  <a:schemeClr val="tx1"/>
-                </a:solidFill>
-                <a:latin typeface="+mn-lt"/>
-                <a:ea typeface="+mn-ea"/>
-                <a:cs typeface="+mn-cs"/>
-              </a:defRPr>
-            </a:lvl6pPr>
-            <a:lvl7pPr marL="2743200" algn="l" defTabSz="914400" rtl="0" eaLnBrk="1" latinLnBrk="0" hangingPunct="1">
-              <a:defRPr sz="1800" kern="1200">
-                <a:solidFill>
-                  <a:schemeClr val="tx1"/>
-                </a:solidFill>
-                <a:latin typeface="+mn-lt"/>
-                <a:ea typeface="+mn-ea"/>
-                <a:cs typeface="+mn-cs"/>
-              </a:defRPr>
-            </a:lvl7pPr>
-            <a:lvl8pPr marL="3200400" algn="l" defTabSz="914400" rtl="0" eaLnBrk="1" latinLnBrk="0" hangingPunct="1">
-              <a:defRPr sz="1800" kern="1200">
-                <a:solidFill>
-                  <a:schemeClr val="tx1"/>
-                </a:solidFill>
-                <a:latin typeface="+mn-lt"/>
-                <a:ea typeface="+mn-ea"/>
-                <a:cs typeface="+mn-cs"/>
-              </a:defRPr>
-            </a:lvl8pPr>
-            <a:lvl9pPr marL="3657600" algn="l" defTabSz="914400" rtl="0" eaLnBrk="1" latinLnBrk="0" hangingPunct="1">
-              <a:defRPr sz="1800" kern="1200">
-                <a:solidFill>
-                  <a:schemeClr val="tx1"/>
-                </a:solidFill>
-                <a:latin typeface="+mn-lt"/>
-                <a:ea typeface="+mn-ea"/>
-                <a:cs typeface="+mn-cs"/>
-              </a:defRPr>
-            </a:lvl9pPr>
-          </a:lstStyle>
-          <a:p>
-            <a:pPr algn="ctr" defTabSz="914309">
-              <a:defRPr/>
-            </a:pPr>
-            <a:r>
-              <a:rPr lang="de-AT" sz="1600" kern="0" dirty="0">
-                <a:solidFill>
-                  <a:sysClr val="window" lastClr="FFFFFF"/>
-                </a:solidFill>
-                <a:latin typeface="Calibri"/>
-              </a:rPr>
-              <a:t>AP Pilot Cert</a:t>
-            </a:r>
-          </a:p>
-        </p:txBody>
-      </p:sp>
-      <p:sp>
-        <p:nvSpPr>
-          <p:cNvPr id="14" name="Rechteck 13"/>
-          <p:cNvSpPr/>
-          <p:nvPr/>
-        </p:nvSpPr>
-        <p:spPr>
-          <a:xfrm>
-            <a:off x="2555775" y="4653136"/>
-            <a:ext cx="1296145" cy="576064"/>
-          </a:xfrm>
-          <a:prstGeom prst="rect">
-            <a:avLst/>
-          </a:prstGeom>
-          <a:ln/>
-        </p:spPr>
-        <p:style>
-          <a:lnRef idx="2">
-            <a:schemeClr val="accent2">
-              <a:shade val="50000"/>
-            </a:schemeClr>
-          </a:lnRef>
-          <a:fillRef idx="1">
-            <a:schemeClr val="accent2"/>
-          </a:fillRef>
-          <a:effectRef idx="0">
-            <a:schemeClr val="accent2"/>
-          </a:effectRef>
-          <a:fontRef idx="minor">
-            <a:schemeClr val="lt1"/>
-          </a:fontRef>
-        </p:style>
-        <p:txBody>
-          <a:bodyPr lIns="91431" tIns="45715" rIns="91431" bIns="45715" rtlCol="0" anchor="ctr"/>
-          <a:lstStyle>
-            <a:defPPr>
-              <a:defRPr lang="en-US"/>
-            </a:defPPr>
-            <a:lvl1pPr marL="0" algn="l" defTabSz="914400" rtl="0" eaLnBrk="1" latinLnBrk="0" hangingPunct="1">
-              <a:defRPr sz="1800" kern="1200">
-                <a:solidFill>
-                  <a:schemeClr val="tx1"/>
-                </a:solidFill>
-                <a:latin typeface="+mn-lt"/>
-                <a:ea typeface="+mn-ea"/>
-                <a:cs typeface="+mn-cs"/>
-              </a:defRPr>
-            </a:lvl1pPr>
-            <a:lvl2pPr marL="457200" algn="l" defTabSz="914400" rtl="0" eaLnBrk="1" latinLnBrk="0" hangingPunct="1">
-              <a:defRPr sz="1800" kern="1200">
-                <a:solidFill>
-                  <a:schemeClr val="tx1"/>
-                </a:solidFill>
-                <a:latin typeface="+mn-lt"/>
-                <a:ea typeface="+mn-ea"/>
-                <a:cs typeface="+mn-cs"/>
-              </a:defRPr>
-            </a:lvl2pPr>
-            <a:lvl3pPr marL="914400" algn="l" defTabSz="914400" rtl="0" eaLnBrk="1" latinLnBrk="0" hangingPunct="1">
-              <a:defRPr sz="1800" kern="1200">
-                <a:solidFill>
-                  <a:schemeClr val="tx1"/>
-                </a:solidFill>
-                <a:latin typeface="+mn-lt"/>
-                <a:ea typeface="+mn-ea"/>
-                <a:cs typeface="+mn-cs"/>
-              </a:defRPr>
-            </a:lvl3pPr>
-            <a:lvl4pPr marL="1371600" algn="l" defTabSz="914400" rtl="0" eaLnBrk="1" latinLnBrk="0" hangingPunct="1">
-              <a:defRPr sz="1800" kern="1200">
-                <a:solidFill>
-                  <a:schemeClr val="tx1"/>
-                </a:solidFill>
-                <a:latin typeface="+mn-lt"/>
-                <a:ea typeface="+mn-ea"/>
-                <a:cs typeface="+mn-cs"/>
-              </a:defRPr>
-            </a:lvl4pPr>
-            <a:lvl5pPr marL="1828800" algn="l" defTabSz="914400" rtl="0" eaLnBrk="1" latinLnBrk="0" hangingPunct="1">
-              <a:defRPr sz="1800" kern="1200">
-                <a:solidFill>
-                  <a:schemeClr val="tx1"/>
-                </a:solidFill>
-                <a:latin typeface="+mn-lt"/>
-                <a:ea typeface="+mn-ea"/>
-                <a:cs typeface="+mn-cs"/>
-              </a:defRPr>
-            </a:lvl5pPr>
-            <a:lvl6pPr marL="2286000" algn="l" defTabSz="914400" rtl="0" eaLnBrk="1" latinLnBrk="0" hangingPunct="1">
-              <a:defRPr sz="1800" kern="1200">
-                <a:solidFill>
-                  <a:schemeClr val="tx1"/>
-                </a:solidFill>
-                <a:latin typeface="+mn-lt"/>
-                <a:ea typeface="+mn-ea"/>
-                <a:cs typeface="+mn-cs"/>
-              </a:defRPr>
-            </a:lvl6pPr>
-            <a:lvl7pPr marL="2743200" algn="l" defTabSz="914400" rtl="0" eaLnBrk="1" latinLnBrk="0" hangingPunct="1">
-              <a:defRPr sz="1800" kern="1200">
-                <a:solidFill>
-                  <a:schemeClr val="tx1"/>
-                </a:solidFill>
-                <a:latin typeface="+mn-lt"/>
-                <a:ea typeface="+mn-ea"/>
-                <a:cs typeface="+mn-cs"/>
-              </a:defRPr>
-            </a:lvl7pPr>
-            <a:lvl8pPr marL="3200400" algn="l" defTabSz="914400" rtl="0" eaLnBrk="1" latinLnBrk="0" hangingPunct="1">
-              <a:defRPr sz="1800" kern="1200">
-                <a:solidFill>
-                  <a:schemeClr val="tx1"/>
-                </a:solidFill>
-                <a:latin typeface="+mn-lt"/>
-                <a:ea typeface="+mn-ea"/>
-                <a:cs typeface="+mn-cs"/>
-              </a:defRPr>
-            </a:lvl8pPr>
-            <a:lvl9pPr marL="3657600" algn="l" defTabSz="914400" rtl="0" eaLnBrk="1" latinLnBrk="0" hangingPunct="1">
-              <a:defRPr sz="1800" kern="1200">
-                <a:solidFill>
-                  <a:schemeClr val="tx1"/>
-                </a:solidFill>
-                <a:latin typeface="+mn-lt"/>
-                <a:ea typeface="+mn-ea"/>
-                <a:cs typeface="+mn-cs"/>
-              </a:defRPr>
-            </a:lvl9pPr>
-          </a:lstStyle>
-          <a:p>
-            <a:pPr algn="ctr" defTabSz="914309">
-              <a:defRPr/>
-            </a:pPr>
-            <a:r>
-              <a:rPr lang="de-AT" sz="1600" kern="0" dirty="0">
-                <a:solidFill>
-                  <a:sysClr val="window" lastClr="FFFFFF"/>
-                </a:solidFill>
-                <a:latin typeface="Calibri"/>
-              </a:rPr>
-              <a:t>SMP Pilot Cert</a:t>
-            </a:r>
-          </a:p>
-        </p:txBody>
-      </p:sp>
-      <p:cxnSp>
-        <p:nvCxnSpPr>
-          <p:cNvPr id="19" name="Gerade Verbindung mit Pfeil 18"/>
-          <p:cNvCxnSpPr>
-            <a:stCxn id="8" idx="2"/>
-            <a:endCxn id="13" idx="0"/>
-          </p:cNvCxnSpPr>
-          <p:nvPr/>
-        </p:nvCxnSpPr>
-        <p:spPr>
-          <a:xfrm>
-            <a:off x="1763688" y="4256488"/>
-            <a:ext cx="0" cy="396648"/>
-          </a:xfrm>
-          <a:prstGeom prst="straightConnector1">
-            <a:avLst/>
-          </a:prstGeom>
-          <a:ln>
-            <a:tailEnd type="arrow"/>
-          </a:ln>
-        </p:spPr>
-        <p:style>
-          <a:lnRef idx="1">
-            <a:schemeClr val="accent1"/>
-          </a:lnRef>
-          <a:fillRef idx="0">
-            <a:schemeClr val="accent1"/>
-          </a:fillRef>
-          <a:effectRef idx="0">
-            <a:schemeClr val="accent1"/>
-          </a:effectRef>
-          <a:fontRef idx="minor">
-            <a:schemeClr val="tx1"/>
-          </a:fontRef>
-        </p:style>
-      </p:cxnSp>
-      <p:cxnSp>
-        <p:nvCxnSpPr>
-          <p:cNvPr id="21" name="Gerade Verbindung mit Pfeil 20"/>
-          <p:cNvCxnSpPr>
-            <a:stCxn id="7" idx="2"/>
-            <a:endCxn id="14" idx="0"/>
-          </p:cNvCxnSpPr>
-          <p:nvPr/>
-        </p:nvCxnSpPr>
-        <p:spPr>
-          <a:xfrm>
-            <a:off x="3203848" y="4256488"/>
-            <a:ext cx="0" cy="396648"/>
-          </a:xfrm>
-          <a:prstGeom prst="straightConnector1">
-            <a:avLst/>
-          </a:prstGeom>
-          <a:ln>
-            <a:tailEnd type="arrow"/>
-          </a:ln>
-        </p:spPr>
-        <p:style>
-          <a:lnRef idx="1">
-            <a:schemeClr val="accent1"/>
-          </a:lnRef>
-          <a:fillRef idx="0">
-            <a:schemeClr val="accent1"/>
-          </a:fillRef>
-          <a:effectRef idx="0">
-            <a:schemeClr val="accent1"/>
-          </a:effectRef>
-          <a:fontRef idx="minor">
-            <a:schemeClr val="tx1"/>
-          </a:fontRef>
-        </p:style>
-      </p:cxnSp>
-      <p:sp>
-        <p:nvSpPr>
-          <p:cNvPr id="35" name="Rechteck 34"/>
-          <p:cNvSpPr/>
-          <p:nvPr/>
-        </p:nvSpPr>
-        <p:spPr>
-          <a:xfrm>
-            <a:off x="5940152" y="3670253"/>
-            <a:ext cx="1296145" cy="576064"/>
-          </a:xfrm>
-          <a:prstGeom prst="rect">
-            <a:avLst/>
-          </a:prstGeom>
-          <a:solidFill>
-            <a:srgbClr val="9BBB59"/>
-          </a:solidFill>
-          <a:ln w="25400" cap="rnd" cmpd="sng" algn="ctr">
-            <a:solidFill>
-              <a:srgbClr val="9BBB59">
-                <a:shade val="50000"/>
-              </a:srgbClr>
-            </a:solidFill>
-            <a:prstDash val="solid"/>
-          </a:ln>
-          <a:effectLst/>
-        </p:spPr>
-        <p:txBody>
-          <a:bodyPr lIns="91431" tIns="45715" rIns="91431" bIns="45715" rtlCol="0" anchor="ctr"/>
-          <a:lstStyle>
-            <a:defPPr>
-              <a:defRPr lang="en-US"/>
-            </a:defPPr>
-            <a:lvl1pPr marL="0" algn="l" defTabSz="914400" rtl="0" eaLnBrk="1" latinLnBrk="0" hangingPunct="1">
-              <a:defRPr sz="1800" kern="1200">
-                <a:solidFill>
-                  <a:schemeClr val="tx1"/>
-                </a:solidFill>
-                <a:latin typeface="+mn-lt"/>
-                <a:ea typeface="+mn-ea"/>
-                <a:cs typeface="+mn-cs"/>
-              </a:defRPr>
-            </a:lvl1pPr>
-            <a:lvl2pPr marL="457200" algn="l" defTabSz="914400" rtl="0" eaLnBrk="1" latinLnBrk="0" hangingPunct="1">
-              <a:defRPr sz="1800" kern="1200">
-                <a:solidFill>
-                  <a:schemeClr val="tx1"/>
-                </a:solidFill>
-                <a:latin typeface="+mn-lt"/>
-                <a:ea typeface="+mn-ea"/>
-                <a:cs typeface="+mn-cs"/>
-              </a:defRPr>
-            </a:lvl2pPr>
-            <a:lvl3pPr marL="914400" algn="l" defTabSz="914400" rtl="0" eaLnBrk="1" latinLnBrk="0" hangingPunct="1">
-              <a:defRPr sz="1800" kern="1200">
-                <a:solidFill>
-                  <a:schemeClr val="tx1"/>
-                </a:solidFill>
-                <a:latin typeface="+mn-lt"/>
-                <a:ea typeface="+mn-ea"/>
-                <a:cs typeface="+mn-cs"/>
-              </a:defRPr>
-            </a:lvl3pPr>
-            <a:lvl4pPr marL="1371600" algn="l" defTabSz="914400" rtl="0" eaLnBrk="1" latinLnBrk="0" hangingPunct="1">
-              <a:defRPr sz="1800" kern="1200">
-                <a:solidFill>
-                  <a:schemeClr val="tx1"/>
-                </a:solidFill>
-                <a:latin typeface="+mn-lt"/>
-                <a:ea typeface="+mn-ea"/>
-                <a:cs typeface="+mn-cs"/>
-              </a:defRPr>
-            </a:lvl4pPr>
-            <a:lvl5pPr marL="1828800" algn="l" defTabSz="914400" rtl="0" eaLnBrk="1" latinLnBrk="0" hangingPunct="1">
-              <a:defRPr sz="1800" kern="1200">
-                <a:solidFill>
-                  <a:schemeClr val="tx1"/>
-                </a:solidFill>
-                <a:latin typeface="+mn-lt"/>
-                <a:ea typeface="+mn-ea"/>
-                <a:cs typeface="+mn-cs"/>
-              </a:defRPr>
-            </a:lvl5pPr>
-            <a:lvl6pPr marL="2286000" algn="l" defTabSz="914400" rtl="0" eaLnBrk="1" latinLnBrk="0" hangingPunct="1">
-              <a:defRPr sz="1800" kern="1200">
-                <a:solidFill>
-                  <a:schemeClr val="tx1"/>
-                </a:solidFill>
-                <a:latin typeface="+mn-lt"/>
-                <a:ea typeface="+mn-ea"/>
-                <a:cs typeface="+mn-cs"/>
-              </a:defRPr>
-            </a:lvl6pPr>
-            <a:lvl7pPr marL="2743200" algn="l" defTabSz="914400" rtl="0" eaLnBrk="1" latinLnBrk="0" hangingPunct="1">
-              <a:defRPr sz="1800" kern="1200">
-                <a:solidFill>
-                  <a:schemeClr val="tx1"/>
-                </a:solidFill>
-                <a:latin typeface="+mn-lt"/>
-                <a:ea typeface="+mn-ea"/>
-                <a:cs typeface="+mn-cs"/>
-              </a:defRPr>
-            </a:lvl7pPr>
-            <a:lvl8pPr marL="3200400" algn="l" defTabSz="914400" rtl="0" eaLnBrk="1" latinLnBrk="0" hangingPunct="1">
-              <a:defRPr sz="1800" kern="1200">
-                <a:solidFill>
-                  <a:schemeClr val="tx1"/>
-                </a:solidFill>
-                <a:latin typeface="+mn-lt"/>
-                <a:ea typeface="+mn-ea"/>
-                <a:cs typeface="+mn-cs"/>
-              </a:defRPr>
-            </a:lvl8pPr>
-            <a:lvl9pPr marL="3657600" algn="l" defTabSz="914400" rtl="0" eaLnBrk="1" latinLnBrk="0" hangingPunct="1">
-              <a:defRPr sz="1800" kern="1200">
-                <a:solidFill>
-                  <a:schemeClr val="tx1"/>
-                </a:solidFill>
-                <a:latin typeface="+mn-lt"/>
-                <a:ea typeface="+mn-ea"/>
-                <a:cs typeface="+mn-cs"/>
-              </a:defRPr>
-            </a:lvl9pPr>
-          </a:lstStyle>
-          <a:p>
-            <a:pPr algn="ctr" defTabSz="914309">
-              <a:defRPr/>
-            </a:pPr>
-            <a:r>
-              <a:rPr lang="de-AT" sz="1600" kern="0" dirty="0">
-                <a:solidFill>
-                  <a:sysClr val="window" lastClr="FFFFFF"/>
-                </a:solidFill>
-                <a:latin typeface="Calibri"/>
-              </a:rPr>
-              <a:t>PEPPOL </a:t>
-            </a:r>
-            <a:r>
-              <a:rPr lang="de-AT" sz="1600" kern="0" dirty="0" err="1" smtClean="0">
-                <a:solidFill>
-                  <a:sysClr val="window" lastClr="FFFFFF"/>
-                </a:solidFill>
-                <a:latin typeface="Calibri"/>
-              </a:rPr>
-              <a:t>Prod</a:t>
-            </a:r>
-            <a:r>
-              <a:rPr lang="de-AT" sz="1600" kern="0" dirty="0" smtClean="0">
-                <a:solidFill>
-                  <a:sysClr val="window" lastClr="FFFFFF"/>
-                </a:solidFill>
-                <a:latin typeface="Calibri"/>
-              </a:rPr>
-              <a:t> </a:t>
-            </a:r>
-            <a:r>
-              <a:rPr lang="de-AT" sz="1600" kern="0" dirty="0">
-                <a:solidFill>
-                  <a:sysClr val="window" lastClr="FFFFFF"/>
-                </a:solidFill>
-                <a:latin typeface="Calibri"/>
-              </a:rPr>
-              <a:t>SMP CA</a:t>
-            </a:r>
-          </a:p>
-        </p:txBody>
-      </p:sp>
-      <p:sp>
-        <p:nvSpPr>
-          <p:cNvPr id="36" name="Rechteck 35"/>
-          <p:cNvSpPr/>
-          <p:nvPr/>
-        </p:nvSpPr>
-        <p:spPr>
-          <a:xfrm>
-            <a:off x="4499992" y="3670253"/>
-            <a:ext cx="1296145" cy="576064"/>
-          </a:xfrm>
-          <a:prstGeom prst="rect">
-            <a:avLst/>
-          </a:prstGeom>
-          <a:solidFill>
-            <a:srgbClr val="9BBB59"/>
-          </a:solidFill>
-          <a:ln w="25400" cap="rnd" cmpd="sng" algn="ctr">
-            <a:solidFill>
-              <a:srgbClr val="9BBB59">
-                <a:shade val="50000"/>
-              </a:srgbClr>
-            </a:solidFill>
-            <a:prstDash val="solid"/>
-          </a:ln>
-          <a:effectLst/>
-        </p:spPr>
-        <p:txBody>
-          <a:bodyPr lIns="91431" tIns="45715" rIns="91431" bIns="45715" rtlCol="0" anchor="ctr"/>
-          <a:lstStyle>
-            <a:defPPr>
-              <a:defRPr lang="en-US"/>
-            </a:defPPr>
-            <a:lvl1pPr marL="0" algn="l" defTabSz="914400" rtl="0" eaLnBrk="1" latinLnBrk="0" hangingPunct="1">
-              <a:defRPr sz="1800" kern="1200">
-                <a:solidFill>
-                  <a:schemeClr val="tx1"/>
-                </a:solidFill>
-                <a:latin typeface="+mn-lt"/>
-                <a:ea typeface="+mn-ea"/>
-                <a:cs typeface="+mn-cs"/>
-              </a:defRPr>
-            </a:lvl1pPr>
-            <a:lvl2pPr marL="457200" algn="l" defTabSz="914400" rtl="0" eaLnBrk="1" latinLnBrk="0" hangingPunct="1">
-              <a:defRPr sz="1800" kern="1200">
-                <a:solidFill>
-                  <a:schemeClr val="tx1"/>
-                </a:solidFill>
-                <a:latin typeface="+mn-lt"/>
-                <a:ea typeface="+mn-ea"/>
-                <a:cs typeface="+mn-cs"/>
-              </a:defRPr>
-            </a:lvl2pPr>
-            <a:lvl3pPr marL="914400" algn="l" defTabSz="914400" rtl="0" eaLnBrk="1" latinLnBrk="0" hangingPunct="1">
-              <a:defRPr sz="1800" kern="1200">
-                <a:solidFill>
-                  <a:schemeClr val="tx1"/>
-                </a:solidFill>
-                <a:latin typeface="+mn-lt"/>
-                <a:ea typeface="+mn-ea"/>
-                <a:cs typeface="+mn-cs"/>
-              </a:defRPr>
-            </a:lvl3pPr>
-            <a:lvl4pPr marL="1371600" algn="l" defTabSz="914400" rtl="0" eaLnBrk="1" latinLnBrk="0" hangingPunct="1">
-              <a:defRPr sz="1800" kern="1200">
-                <a:solidFill>
-                  <a:schemeClr val="tx1"/>
-                </a:solidFill>
-                <a:latin typeface="+mn-lt"/>
-                <a:ea typeface="+mn-ea"/>
-                <a:cs typeface="+mn-cs"/>
-              </a:defRPr>
-            </a:lvl4pPr>
-            <a:lvl5pPr marL="1828800" algn="l" defTabSz="914400" rtl="0" eaLnBrk="1" latinLnBrk="0" hangingPunct="1">
-              <a:defRPr sz="1800" kern="1200">
-                <a:solidFill>
-                  <a:schemeClr val="tx1"/>
-                </a:solidFill>
-                <a:latin typeface="+mn-lt"/>
-                <a:ea typeface="+mn-ea"/>
-                <a:cs typeface="+mn-cs"/>
-              </a:defRPr>
-            </a:lvl5pPr>
-            <a:lvl6pPr marL="2286000" algn="l" defTabSz="914400" rtl="0" eaLnBrk="1" latinLnBrk="0" hangingPunct="1">
-              <a:defRPr sz="1800" kern="1200">
-                <a:solidFill>
-                  <a:schemeClr val="tx1"/>
-                </a:solidFill>
-                <a:latin typeface="+mn-lt"/>
-                <a:ea typeface="+mn-ea"/>
-                <a:cs typeface="+mn-cs"/>
-              </a:defRPr>
-            </a:lvl6pPr>
-            <a:lvl7pPr marL="2743200" algn="l" defTabSz="914400" rtl="0" eaLnBrk="1" latinLnBrk="0" hangingPunct="1">
-              <a:defRPr sz="1800" kern="1200">
-                <a:solidFill>
-                  <a:schemeClr val="tx1"/>
-                </a:solidFill>
-                <a:latin typeface="+mn-lt"/>
-                <a:ea typeface="+mn-ea"/>
-                <a:cs typeface="+mn-cs"/>
-              </a:defRPr>
-            </a:lvl7pPr>
-            <a:lvl8pPr marL="3200400" algn="l" defTabSz="914400" rtl="0" eaLnBrk="1" latinLnBrk="0" hangingPunct="1">
-              <a:defRPr sz="1800" kern="1200">
-                <a:solidFill>
-                  <a:schemeClr val="tx1"/>
-                </a:solidFill>
-                <a:latin typeface="+mn-lt"/>
-                <a:ea typeface="+mn-ea"/>
-                <a:cs typeface="+mn-cs"/>
-              </a:defRPr>
-            </a:lvl8pPr>
-            <a:lvl9pPr marL="3657600" algn="l" defTabSz="914400" rtl="0" eaLnBrk="1" latinLnBrk="0" hangingPunct="1">
-              <a:defRPr sz="1800" kern="1200">
-                <a:solidFill>
-                  <a:schemeClr val="tx1"/>
-                </a:solidFill>
-                <a:latin typeface="+mn-lt"/>
-                <a:ea typeface="+mn-ea"/>
-                <a:cs typeface="+mn-cs"/>
-              </a:defRPr>
-            </a:lvl9pPr>
-          </a:lstStyle>
-          <a:p>
-            <a:pPr algn="ctr" defTabSz="914309">
-              <a:defRPr/>
-            </a:pPr>
-            <a:r>
-              <a:rPr lang="de-AT" sz="1600" kern="0" dirty="0">
-                <a:solidFill>
-                  <a:sysClr val="window" lastClr="FFFFFF"/>
-                </a:solidFill>
-                <a:latin typeface="Calibri"/>
-              </a:rPr>
-              <a:t>PEPPOL </a:t>
-            </a:r>
-            <a:r>
-              <a:rPr lang="de-AT" sz="1600" kern="0" dirty="0" err="1" smtClean="0">
-                <a:solidFill>
-                  <a:sysClr val="window" lastClr="FFFFFF"/>
-                </a:solidFill>
-                <a:latin typeface="Calibri"/>
-              </a:rPr>
-              <a:t>Prod</a:t>
-            </a:r>
-            <a:r>
-              <a:rPr lang="de-AT" sz="1600" kern="0" dirty="0" smtClean="0">
-                <a:solidFill>
-                  <a:sysClr val="window" lastClr="FFFFFF"/>
-                </a:solidFill>
-                <a:latin typeface="Calibri"/>
-              </a:rPr>
-              <a:t> </a:t>
-            </a:r>
-            <a:r>
-              <a:rPr lang="de-AT" sz="1600" kern="0" dirty="0">
-                <a:solidFill>
-                  <a:sysClr val="window" lastClr="FFFFFF"/>
-                </a:solidFill>
-                <a:latin typeface="Calibri"/>
-              </a:rPr>
-              <a:t>AP CA</a:t>
-            </a:r>
-          </a:p>
-        </p:txBody>
-      </p:sp>
-      <p:sp>
-        <p:nvSpPr>
-          <p:cNvPr id="40" name="Rechteck 39"/>
-          <p:cNvSpPr/>
-          <p:nvPr/>
-        </p:nvSpPr>
-        <p:spPr>
-          <a:xfrm>
-            <a:off x="4499992" y="4642965"/>
-            <a:ext cx="1296145" cy="576064"/>
-          </a:xfrm>
-          <a:prstGeom prst="rect">
-            <a:avLst/>
-          </a:prstGeom>
-          <a:ln/>
-        </p:spPr>
-        <p:style>
-          <a:lnRef idx="2">
-            <a:schemeClr val="accent2">
-              <a:shade val="50000"/>
-            </a:schemeClr>
-          </a:lnRef>
-          <a:fillRef idx="1">
-            <a:schemeClr val="accent2"/>
-          </a:fillRef>
-          <a:effectRef idx="0">
-            <a:schemeClr val="accent2"/>
-          </a:effectRef>
-          <a:fontRef idx="minor">
-            <a:schemeClr val="lt1"/>
-          </a:fontRef>
-        </p:style>
-        <p:txBody>
-          <a:bodyPr lIns="91431" tIns="45715" rIns="91431" bIns="45715" rtlCol="0" anchor="ctr"/>
-          <a:lstStyle>
-            <a:defPPr>
-              <a:defRPr lang="en-US"/>
-            </a:defPPr>
-            <a:lvl1pPr marL="0" algn="l" defTabSz="914400" rtl="0" eaLnBrk="1" latinLnBrk="0" hangingPunct="1">
-              <a:defRPr sz="1800" kern="1200">
-                <a:solidFill>
-                  <a:schemeClr val="tx1"/>
-                </a:solidFill>
-                <a:latin typeface="+mn-lt"/>
-                <a:ea typeface="+mn-ea"/>
-                <a:cs typeface="+mn-cs"/>
-              </a:defRPr>
-            </a:lvl1pPr>
-            <a:lvl2pPr marL="457200" algn="l" defTabSz="914400" rtl="0" eaLnBrk="1" latinLnBrk="0" hangingPunct="1">
-              <a:defRPr sz="1800" kern="1200">
-                <a:solidFill>
-                  <a:schemeClr val="tx1"/>
-                </a:solidFill>
-                <a:latin typeface="+mn-lt"/>
-                <a:ea typeface="+mn-ea"/>
-                <a:cs typeface="+mn-cs"/>
-              </a:defRPr>
-            </a:lvl2pPr>
-            <a:lvl3pPr marL="914400" algn="l" defTabSz="914400" rtl="0" eaLnBrk="1" latinLnBrk="0" hangingPunct="1">
-              <a:defRPr sz="1800" kern="1200">
-                <a:solidFill>
-                  <a:schemeClr val="tx1"/>
-                </a:solidFill>
-                <a:latin typeface="+mn-lt"/>
-                <a:ea typeface="+mn-ea"/>
-                <a:cs typeface="+mn-cs"/>
-              </a:defRPr>
-            </a:lvl3pPr>
-            <a:lvl4pPr marL="1371600" algn="l" defTabSz="914400" rtl="0" eaLnBrk="1" latinLnBrk="0" hangingPunct="1">
-              <a:defRPr sz="1800" kern="1200">
-                <a:solidFill>
-                  <a:schemeClr val="tx1"/>
-                </a:solidFill>
-                <a:latin typeface="+mn-lt"/>
-                <a:ea typeface="+mn-ea"/>
-                <a:cs typeface="+mn-cs"/>
-              </a:defRPr>
-            </a:lvl4pPr>
-            <a:lvl5pPr marL="1828800" algn="l" defTabSz="914400" rtl="0" eaLnBrk="1" latinLnBrk="0" hangingPunct="1">
-              <a:defRPr sz="1800" kern="1200">
-                <a:solidFill>
-                  <a:schemeClr val="tx1"/>
-                </a:solidFill>
-                <a:latin typeface="+mn-lt"/>
-                <a:ea typeface="+mn-ea"/>
-                <a:cs typeface="+mn-cs"/>
-              </a:defRPr>
-            </a:lvl5pPr>
-            <a:lvl6pPr marL="2286000" algn="l" defTabSz="914400" rtl="0" eaLnBrk="1" latinLnBrk="0" hangingPunct="1">
-              <a:defRPr sz="1800" kern="1200">
-                <a:solidFill>
-                  <a:schemeClr val="tx1"/>
-                </a:solidFill>
-                <a:latin typeface="+mn-lt"/>
-                <a:ea typeface="+mn-ea"/>
-                <a:cs typeface="+mn-cs"/>
-              </a:defRPr>
-            </a:lvl6pPr>
-            <a:lvl7pPr marL="2743200" algn="l" defTabSz="914400" rtl="0" eaLnBrk="1" latinLnBrk="0" hangingPunct="1">
-              <a:defRPr sz="1800" kern="1200">
-                <a:solidFill>
-                  <a:schemeClr val="tx1"/>
-                </a:solidFill>
-                <a:latin typeface="+mn-lt"/>
-                <a:ea typeface="+mn-ea"/>
-                <a:cs typeface="+mn-cs"/>
-              </a:defRPr>
-            </a:lvl7pPr>
-            <a:lvl8pPr marL="3200400" algn="l" defTabSz="914400" rtl="0" eaLnBrk="1" latinLnBrk="0" hangingPunct="1">
-              <a:defRPr sz="1800" kern="1200">
-                <a:solidFill>
-                  <a:schemeClr val="tx1"/>
-                </a:solidFill>
-                <a:latin typeface="+mn-lt"/>
-                <a:ea typeface="+mn-ea"/>
-                <a:cs typeface="+mn-cs"/>
-              </a:defRPr>
-            </a:lvl8pPr>
-            <a:lvl9pPr marL="3657600" algn="l" defTabSz="914400" rtl="0" eaLnBrk="1" latinLnBrk="0" hangingPunct="1">
-              <a:defRPr sz="1800" kern="1200">
-                <a:solidFill>
-                  <a:schemeClr val="tx1"/>
-                </a:solidFill>
-                <a:latin typeface="+mn-lt"/>
-                <a:ea typeface="+mn-ea"/>
-                <a:cs typeface="+mn-cs"/>
-              </a:defRPr>
-            </a:lvl9pPr>
-          </a:lstStyle>
-          <a:p>
-            <a:pPr algn="ctr" defTabSz="914309">
-              <a:defRPr/>
-            </a:pPr>
-            <a:r>
-              <a:rPr lang="de-AT" sz="1600" kern="0" dirty="0">
-                <a:solidFill>
-                  <a:sysClr val="window" lastClr="FFFFFF"/>
-                </a:solidFill>
-                <a:latin typeface="Calibri"/>
-              </a:rPr>
-              <a:t>AP </a:t>
-            </a:r>
-            <a:r>
-              <a:rPr lang="de-AT" sz="1600" kern="0" dirty="0" err="1" smtClean="0">
-                <a:solidFill>
-                  <a:sysClr val="window" lastClr="FFFFFF"/>
-                </a:solidFill>
-                <a:latin typeface="Calibri"/>
-              </a:rPr>
-              <a:t>Prod</a:t>
-            </a:r>
-            <a:r>
-              <a:rPr lang="de-AT" sz="1600" kern="0" dirty="0" smtClean="0">
-                <a:solidFill>
-                  <a:sysClr val="window" lastClr="FFFFFF"/>
-                </a:solidFill>
-                <a:latin typeface="Calibri"/>
-              </a:rPr>
-              <a:t> </a:t>
-            </a:r>
-            <a:r>
-              <a:rPr lang="de-AT" sz="1600" kern="0" dirty="0">
-                <a:solidFill>
-                  <a:sysClr val="window" lastClr="FFFFFF"/>
-                </a:solidFill>
-                <a:latin typeface="Calibri"/>
-              </a:rPr>
-              <a:t>Cert</a:t>
-            </a:r>
-          </a:p>
-        </p:txBody>
-      </p:sp>
-      <p:sp>
-        <p:nvSpPr>
-          <p:cNvPr id="41" name="Rechteck 40"/>
-          <p:cNvSpPr/>
-          <p:nvPr/>
-        </p:nvSpPr>
-        <p:spPr>
-          <a:xfrm>
-            <a:off x="5940152" y="4642965"/>
-            <a:ext cx="1296145" cy="576064"/>
-          </a:xfrm>
-          <a:prstGeom prst="rect">
-            <a:avLst/>
-          </a:prstGeom>
-          <a:ln/>
-        </p:spPr>
-        <p:style>
-          <a:lnRef idx="2">
-            <a:schemeClr val="accent2">
-              <a:shade val="50000"/>
-            </a:schemeClr>
-          </a:lnRef>
-          <a:fillRef idx="1">
-            <a:schemeClr val="accent2"/>
-          </a:fillRef>
-          <a:effectRef idx="0">
-            <a:schemeClr val="accent2"/>
-          </a:effectRef>
-          <a:fontRef idx="minor">
-            <a:schemeClr val="lt1"/>
-          </a:fontRef>
-        </p:style>
-        <p:txBody>
-          <a:bodyPr lIns="91431" tIns="45715" rIns="91431" bIns="45715" rtlCol="0" anchor="ctr"/>
-          <a:lstStyle>
-            <a:defPPr>
-              <a:defRPr lang="en-US"/>
-            </a:defPPr>
-            <a:lvl1pPr marL="0" algn="l" defTabSz="914400" rtl="0" eaLnBrk="1" latinLnBrk="0" hangingPunct="1">
-              <a:defRPr sz="1800" kern="1200">
-                <a:solidFill>
-                  <a:schemeClr val="tx1"/>
-                </a:solidFill>
-                <a:latin typeface="+mn-lt"/>
-                <a:ea typeface="+mn-ea"/>
-                <a:cs typeface="+mn-cs"/>
-              </a:defRPr>
-            </a:lvl1pPr>
-            <a:lvl2pPr marL="457200" algn="l" defTabSz="914400" rtl="0" eaLnBrk="1" latinLnBrk="0" hangingPunct="1">
-              <a:defRPr sz="1800" kern="1200">
-                <a:solidFill>
-                  <a:schemeClr val="tx1"/>
-                </a:solidFill>
-                <a:latin typeface="+mn-lt"/>
-                <a:ea typeface="+mn-ea"/>
-                <a:cs typeface="+mn-cs"/>
-              </a:defRPr>
-            </a:lvl2pPr>
-            <a:lvl3pPr marL="914400" algn="l" defTabSz="914400" rtl="0" eaLnBrk="1" latinLnBrk="0" hangingPunct="1">
-              <a:defRPr sz="1800" kern="1200">
-                <a:solidFill>
-                  <a:schemeClr val="tx1"/>
-                </a:solidFill>
-                <a:latin typeface="+mn-lt"/>
-                <a:ea typeface="+mn-ea"/>
-                <a:cs typeface="+mn-cs"/>
-              </a:defRPr>
-            </a:lvl3pPr>
-            <a:lvl4pPr marL="1371600" algn="l" defTabSz="914400" rtl="0" eaLnBrk="1" latinLnBrk="0" hangingPunct="1">
-              <a:defRPr sz="1800" kern="1200">
-                <a:solidFill>
-                  <a:schemeClr val="tx1"/>
-                </a:solidFill>
-                <a:latin typeface="+mn-lt"/>
-                <a:ea typeface="+mn-ea"/>
-                <a:cs typeface="+mn-cs"/>
-              </a:defRPr>
-            </a:lvl4pPr>
-            <a:lvl5pPr marL="1828800" algn="l" defTabSz="914400" rtl="0" eaLnBrk="1" latinLnBrk="0" hangingPunct="1">
-              <a:defRPr sz="1800" kern="1200">
-                <a:solidFill>
-                  <a:schemeClr val="tx1"/>
-                </a:solidFill>
-                <a:latin typeface="+mn-lt"/>
-                <a:ea typeface="+mn-ea"/>
-                <a:cs typeface="+mn-cs"/>
-              </a:defRPr>
-            </a:lvl5pPr>
-            <a:lvl6pPr marL="2286000" algn="l" defTabSz="914400" rtl="0" eaLnBrk="1" latinLnBrk="0" hangingPunct="1">
-              <a:defRPr sz="1800" kern="1200">
-                <a:solidFill>
-                  <a:schemeClr val="tx1"/>
-                </a:solidFill>
-                <a:latin typeface="+mn-lt"/>
-                <a:ea typeface="+mn-ea"/>
-                <a:cs typeface="+mn-cs"/>
-              </a:defRPr>
-            </a:lvl6pPr>
-            <a:lvl7pPr marL="2743200" algn="l" defTabSz="914400" rtl="0" eaLnBrk="1" latinLnBrk="0" hangingPunct="1">
-              <a:defRPr sz="1800" kern="1200">
-                <a:solidFill>
-                  <a:schemeClr val="tx1"/>
-                </a:solidFill>
-                <a:latin typeface="+mn-lt"/>
-                <a:ea typeface="+mn-ea"/>
-                <a:cs typeface="+mn-cs"/>
-              </a:defRPr>
-            </a:lvl7pPr>
-            <a:lvl8pPr marL="3200400" algn="l" defTabSz="914400" rtl="0" eaLnBrk="1" latinLnBrk="0" hangingPunct="1">
-              <a:defRPr sz="1800" kern="1200">
-                <a:solidFill>
-                  <a:schemeClr val="tx1"/>
-                </a:solidFill>
-                <a:latin typeface="+mn-lt"/>
-                <a:ea typeface="+mn-ea"/>
-                <a:cs typeface="+mn-cs"/>
-              </a:defRPr>
-            </a:lvl8pPr>
-            <a:lvl9pPr marL="3657600" algn="l" defTabSz="914400" rtl="0" eaLnBrk="1" latinLnBrk="0" hangingPunct="1">
-              <a:defRPr sz="1800" kern="1200">
-                <a:solidFill>
-                  <a:schemeClr val="tx1"/>
-                </a:solidFill>
-                <a:latin typeface="+mn-lt"/>
-                <a:ea typeface="+mn-ea"/>
-                <a:cs typeface="+mn-cs"/>
-              </a:defRPr>
-            </a:lvl9pPr>
-          </a:lstStyle>
-          <a:p>
-            <a:pPr algn="ctr" defTabSz="914309">
-              <a:defRPr/>
-            </a:pPr>
-            <a:r>
-              <a:rPr lang="de-AT" sz="1600" kern="0" dirty="0">
-                <a:solidFill>
-                  <a:sysClr val="window" lastClr="FFFFFF"/>
-                </a:solidFill>
-                <a:latin typeface="Calibri"/>
-              </a:rPr>
-              <a:t>SMP </a:t>
-            </a:r>
-            <a:r>
-              <a:rPr lang="de-AT" sz="1600" kern="0" dirty="0" err="1" smtClean="0">
-                <a:solidFill>
-                  <a:sysClr val="window" lastClr="FFFFFF"/>
-                </a:solidFill>
-                <a:latin typeface="Calibri"/>
-              </a:rPr>
-              <a:t>Prod</a:t>
-            </a:r>
-            <a:r>
-              <a:rPr lang="de-AT" sz="1600" kern="0" dirty="0" smtClean="0">
-                <a:solidFill>
-                  <a:sysClr val="window" lastClr="FFFFFF"/>
-                </a:solidFill>
-                <a:latin typeface="Calibri"/>
-              </a:rPr>
-              <a:t> Cert</a:t>
-            </a:r>
-            <a:endParaRPr lang="de-AT" sz="1600" kern="0" dirty="0">
-              <a:solidFill>
-                <a:sysClr val="window" lastClr="FFFFFF"/>
-              </a:solidFill>
-              <a:latin typeface="Calibri"/>
-            </a:endParaRPr>
-          </a:p>
-        </p:txBody>
-      </p:sp>
-      <p:cxnSp>
-        <p:nvCxnSpPr>
-          <p:cNvPr id="42" name="Gerade Verbindung mit Pfeil 41"/>
-          <p:cNvCxnSpPr>
-            <a:stCxn id="36" idx="2"/>
-            <a:endCxn id="40" idx="0"/>
-          </p:cNvCxnSpPr>
-          <p:nvPr/>
-        </p:nvCxnSpPr>
-        <p:spPr>
-          <a:xfrm>
-            <a:off x="5148065" y="4246317"/>
-            <a:ext cx="0" cy="396648"/>
-          </a:xfrm>
-          <a:prstGeom prst="straightConnector1">
-            <a:avLst/>
-          </a:prstGeom>
-          <a:ln>
-            <a:tailEnd type="arrow"/>
-          </a:ln>
-        </p:spPr>
-        <p:style>
-          <a:lnRef idx="1">
-            <a:schemeClr val="accent1"/>
-          </a:lnRef>
-          <a:fillRef idx="0">
-            <a:schemeClr val="accent1"/>
-          </a:fillRef>
-          <a:effectRef idx="0">
-            <a:schemeClr val="accent1"/>
-          </a:effectRef>
-          <a:fontRef idx="minor">
-            <a:schemeClr val="tx1"/>
-          </a:fontRef>
-        </p:style>
-      </p:cxnSp>
-      <p:cxnSp>
-        <p:nvCxnSpPr>
-          <p:cNvPr id="43" name="Gerade Verbindung mit Pfeil 42"/>
-          <p:cNvCxnSpPr>
-            <a:stCxn id="35" idx="2"/>
-            <a:endCxn id="41" idx="0"/>
-          </p:cNvCxnSpPr>
-          <p:nvPr/>
-        </p:nvCxnSpPr>
-        <p:spPr>
-          <a:xfrm>
-            <a:off x="6588225" y="4246317"/>
-            <a:ext cx="0" cy="396648"/>
-          </a:xfrm>
-          <a:prstGeom prst="straightConnector1">
-            <a:avLst/>
-          </a:prstGeom>
-          <a:ln>
-            <a:tailEnd type="arrow"/>
-          </a:ln>
-        </p:spPr>
-        <p:style>
-          <a:lnRef idx="1">
-            <a:schemeClr val="accent1"/>
-          </a:lnRef>
-          <a:fillRef idx="0">
-            <a:schemeClr val="accent1"/>
-          </a:fillRef>
-          <a:effectRef idx="0">
-            <a:schemeClr val="accent1"/>
-          </a:effectRef>
-          <a:fontRef idx="minor">
-            <a:schemeClr val="tx1"/>
-          </a:fontRef>
-        </p:style>
-      </p:cxnSp>
-    </p:spTree>
-    <p:extLst>
-      <p:ext uri="{BB962C8B-B14F-4D97-AF65-F5344CB8AC3E}">
-        <p14:creationId xmlns="" xmlns:p14="http://schemas.microsoft.com/office/powerpoint/2010/main" val="2109585359"/>
-      </p:ext>
-    </p:extLst>
-  </p:cSld>
-  <p:clrMapOvr>
-    <a:masterClrMapping/>
-  </p:clrMapOvr>
-  <p:timing>
-    <p:tnLst>
-      <p:par>
-        <p:cTn id="1" dur="indefinite" restart="never" nodeType="tmRoot"/>
-      </p:par>
-    </p:tnLst>
-  </p:timing>
-</p:sld>
-</file>
-
-<file path=ppt/slides/slide6.xml><?xml version="1.0" encoding="utf-8"?>
-<p:sld xmlns:a="http://schemas.openxmlformats.org/drawingml/2006/main" xmlns:r="http://schemas.openxmlformats.org/officeDocument/2006/relationships" xmlns:p="http://schemas.openxmlformats.org/presentationml/2006/main">
-  <p:cSld>
-    <p:spTree>
-      <p:nvGrpSpPr>
-        <p:cNvPr id="1" name=""/>
-        <p:cNvGrpSpPr/>
-        <p:nvPr/>
-      </p:nvGrpSpPr>
-      <p:grpSpPr>
-        <a:xfrm>
-          <a:off x="0" y="0"/>
-          <a:ext cx="0" cy="0"/>
-          <a:chOff x="0" y="0"/>
-          <a:chExt cx="0" cy="0"/>
-        </a:xfrm>
-      </p:grpSpPr>
-      <p:sp>
-        <p:nvSpPr>
-          <p:cNvPr id="5" name="Rechteck 4"/>
-          <p:cNvSpPr/>
-          <p:nvPr/>
-        </p:nvSpPr>
-        <p:spPr>
-          <a:xfrm>
-            <a:off x="3995936" y="2312272"/>
-            <a:ext cx="1296145" cy="576064"/>
-          </a:xfrm>
-          <a:prstGeom prst="rect">
-            <a:avLst/>
-          </a:prstGeom>
-          <a:solidFill>
-            <a:srgbClr val="9BBB59"/>
-          </a:solidFill>
-          <a:ln w="25400" cap="rnd" cmpd="sng" algn="ctr">
-            <a:solidFill>
-              <a:srgbClr val="9BBB59">
-                <a:shade val="50000"/>
-              </a:srgbClr>
-            </a:solidFill>
-            <a:prstDash val="solid"/>
-          </a:ln>
-          <a:effectLst/>
-        </p:spPr>
-        <p:txBody>
-          <a:bodyPr lIns="91431" tIns="45715" rIns="91431" bIns="45715" rtlCol="0" anchor="ctr"/>
-          <a:lstStyle>
-            <a:defPPr>
-              <a:defRPr lang="en-US"/>
-            </a:defPPr>
-            <a:lvl1pPr marL="0" algn="l" defTabSz="914400" rtl="0" eaLnBrk="1" latinLnBrk="0" hangingPunct="1">
-              <a:defRPr sz="1800" kern="1200">
-                <a:solidFill>
-                  <a:schemeClr val="tx1"/>
-                </a:solidFill>
-                <a:latin typeface="+mn-lt"/>
-                <a:ea typeface="+mn-ea"/>
-                <a:cs typeface="+mn-cs"/>
-              </a:defRPr>
-            </a:lvl1pPr>
-            <a:lvl2pPr marL="457200" algn="l" defTabSz="914400" rtl="0" eaLnBrk="1" latinLnBrk="0" hangingPunct="1">
-              <a:defRPr sz="1800" kern="1200">
-                <a:solidFill>
-                  <a:schemeClr val="tx1"/>
-                </a:solidFill>
-                <a:latin typeface="+mn-lt"/>
-                <a:ea typeface="+mn-ea"/>
-                <a:cs typeface="+mn-cs"/>
-              </a:defRPr>
-            </a:lvl2pPr>
-            <a:lvl3pPr marL="914400" algn="l" defTabSz="914400" rtl="0" eaLnBrk="1" latinLnBrk="0" hangingPunct="1">
-              <a:defRPr sz="1800" kern="1200">
-                <a:solidFill>
-                  <a:schemeClr val="tx1"/>
-                </a:solidFill>
-                <a:latin typeface="+mn-lt"/>
-                <a:ea typeface="+mn-ea"/>
-                <a:cs typeface="+mn-cs"/>
-              </a:defRPr>
-            </a:lvl3pPr>
-            <a:lvl4pPr marL="1371600" algn="l" defTabSz="914400" rtl="0" eaLnBrk="1" latinLnBrk="0" hangingPunct="1">
-              <a:defRPr sz="1800" kern="1200">
-                <a:solidFill>
-                  <a:schemeClr val="tx1"/>
-                </a:solidFill>
-                <a:latin typeface="+mn-lt"/>
-                <a:ea typeface="+mn-ea"/>
-                <a:cs typeface="+mn-cs"/>
-              </a:defRPr>
-            </a:lvl4pPr>
-            <a:lvl5pPr marL="1828800" algn="l" defTabSz="914400" rtl="0" eaLnBrk="1" latinLnBrk="0" hangingPunct="1">
-              <a:defRPr sz="1800" kern="1200">
-                <a:solidFill>
-                  <a:schemeClr val="tx1"/>
-                </a:solidFill>
-                <a:latin typeface="+mn-lt"/>
-                <a:ea typeface="+mn-ea"/>
-                <a:cs typeface="+mn-cs"/>
-              </a:defRPr>
-            </a:lvl5pPr>
-            <a:lvl6pPr marL="2286000" algn="l" defTabSz="914400" rtl="0" eaLnBrk="1" latinLnBrk="0" hangingPunct="1">
-              <a:defRPr sz="1800" kern="1200">
-                <a:solidFill>
-                  <a:schemeClr val="tx1"/>
-                </a:solidFill>
-                <a:latin typeface="+mn-lt"/>
-                <a:ea typeface="+mn-ea"/>
-                <a:cs typeface="+mn-cs"/>
-              </a:defRPr>
-            </a:lvl6pPr>
-            <a:lvl7pPr marL="2743200" algn="l" defTabSz="914400" rtl="0" eaLnBrk="1" latinLnBrk="0" hangingPunct="1">
-              <a:defRPr sz="1800" kern="1200">
-                <a:solidFill>
-                  <a:schemeClr val="tx1"/>
-                </a:solidFill>
-                <a:latin typeface="+mn-lt"/>
-                <a:ea typeface="+mn-ea"/>
-                <a:cs typeface="+mn-cs"/>
-              </a:defRPr>
-            </a:lvl7pPr>
-            <a:lvl8pPr marL="3200400" algn="l" defTabSz="914400" rtl="0" eaLnBrk="1" latinLnBrk="0" hangingPunct="1">
-              <a:defRPr sz="1800" kern="1200">
-                <a:solidFill>
-                  <a:schemeClr val="tx1"/>
-                </a:solidFill>
-                <a:latin typeface="+mn-lt"/>
-                <a:ea typeface="+mn-ea"/>
-                <a:cs typeface="+mn-cs"/>
-              </a:defRPr>
-            </a:lvl8pPr>
-            <a:lvl9pPr marL="3657600" algn="l" defTabSz="914400" rtl="0" eaLnBrk="1" latinLnBrk="0" hangingPunct="1">
-              <a:defRPr sz="1800" kern="1200">
-                <a:solidFill>
-                  <a:schemeClr val="tx1"/>
-                </a:solidFill>
-                <a:latin typeface="+mn-lt"/>
-                <a:ea typeface="+mn-ea"/>
-                <a:cs typeface="+mn-cs"/>
-              </a:defRPr>
-            </a:lvl9pPr>
-          </a:lstStyle>
-          <a:p>
-            <a:pPr algn="ctr" defTabSz="914309">
-              <a:defRPr/>
-            </a:pPr>
-            <a:r>
-              <a:rPr lang="de-AT" sz="1600" kern="0" dirty="0" smtClean="0">
-                <a:solidFill>
-                  <a:sysClr val="window" lastClr="FFFFFF"/>
-                </a:solidFill>
-                <a:latin typeface="Calibri"/>
-              </a:rPr>
-              <a:t>PEPPOL</a:t>
-            </a:r>
-          </a:p>
-          <a:p>
-            <a:pPr algn="ctr" defTabSz="914309">
-              <a:defRPr/>
-            </a:pPr>
-            <a:r>
-              <a:rPr lang="de-AT" sz="1600" kern="0" dirty="0" smtClean="0">
-                <a:solidFill>
-                  <a:sysClr val="window" lastClr="FFFFFF"/>
-                </a:solidFill>
-                <a:latin typeface="Calibri"/>
-              </a:rPr>
-              <a:t>Root </a:t>
-            </a:r>
-            <a:r>
-              <a:rPr lang="de-AT" sz="1600" kern="0" dirty="0">
-                <a:solidFill>
-                  <a:sysClr val="window" lastClr="FFFFFF"/>
-                </a:solidFill>
-                <a:latin typeface="Calibri"/>
-              </a:rPr>
-              <a:t>CA</a:t>
-            </a:r>
-          </a:p>
-        </p:txBody>
-      </p:sp>
-      <p:sp>
-        <p:nvSpPr>
-          <p:cNvPr id="7" name="Rechteck 6"/>
-          <p:cNvSpPr/>
-          <p:nvPr/>
-        </p:nvSpPr>
-        <p:spPr>
-          <a:xfrm>
-            <a:off x="3275856" y="3645024"/>
-            <a:ext cx="1296145" cy="576064"/>
-          </a:xfrm>
-          <a:prstGeom prst="rect">
-            <a:avLst/>
-          </a:prstGeom>
-          <a:solidFill>
-            <a:srgbClr val="9BBB59"/>
-          </a:solidFill>
-          <a:ln w="25400" cap="rnd" cmpd="sng" algn="ctr">
-            <a:solidFill>
-              <a:srgbClr val="9BBB59">
-                <a:shade val="50000"/>
-              </a:srgbClr>
-            </a:solidFill>
-            <a:prstDash val="solid"/>
-          </a:ln>
-          <a:effectLst/>
-        </p:spPr>
-        <p:txBody>
-          <a:bodyPr lIns="91431" tIns="45715" rIns="91431" bIns="45715" rtlCol="0" anchor="ctr"/>
-          <a:lstStyle>
-            <a:defPPr>
-              <a:defRPr lang="en-US"/>
-            </a:defPPr>
-            <a:lvl1pPr marL="0" algn="l" defTabSz="914400" rtl="0" eaLnBrk="1" latinLnBrk="0" hangingPunct="1">
-              <a:defRPr sz="1800" kern="1200">
-                <a:solidFill>
-                  <a:schemeClr val="tx1"/>
-                </a:solidFill>
-                <a:latin typeface="+mn-lt"/>
-                <a:ea typeface="+mn-ea"/>
-                <a:cs typeface="+mn-cs"/>
-              </a:defRPr>
-            </a:lvl1pPr>
-            <a:lvl2pPr marL="457200" algn="l" defTabSz="914400" rtl="0" eaLnBrk="1" latinLnBrk="0" hangingPunct="1">
-              <a:defRPr sz="1800" kern="1200">
-                <a:solidFill>
-                  <a:schemeClr val="tx1"/>
-                </a:solidFill>
-                <a:latin typeface="+mn-lt"/>
-                <a:ea typeface="+mn-ea"/>
-                <a:cs typeface="+mn-cs"/>
-              </a:defRPr>
-            </a:lvl2pPr>
-            <a:lvl3pPr marL="914400" algn="l" defTabSz="914400" rtl="0" eaLnBrk="1" latinLnBrk="0" hangingPunct="1">
-              <a:defRPr sz="1800" kern="1200">
-                <a:solidFill>
-                  <a:schemeClr val="tx1"/>
-                </a:solidFill>
-                <a:latin typeface="+mn-lt"/>
-                <a:ea typeface="+mn-ea"/>
-                <a:cs typeface="+mn-cs"/>
-              </a:defRPr>
-            </a:lvl3pPr>
-            <a:lvl4pPr marL="1371600" algn="l" defTabSz="914400" rtl="0" eaLnBrk="1" latinLnBrk="0" hangingPunct="1">
-              <a:defRPr sz="1800" kern="1200">
-                <a:solidFill>
-                  <a:schemeClr val="tx1"/>
-                </a:solidFill>
-                <a:latin typeface="+mn-lt"/>
-                <a:ea typeface="+mn-ea"/>
-                <a:cs typeface="+mn-cs"/>
-              </a:defRPr>
-            </a:lvl4pPr>
-            <a:lvl5pPr marL="1828800" algn="l" defTabSz="914400" rtl="0" eaLnBrk="1" latinLnBrk="0" hangingPunct="1">
-              <a:defRPr sz="1800" kern="1200">
-                <a:solidFill>
-                  <a:schemeClr val="tx1"/>
-                </a:solidFill>
-                <a:latin typeface="+mn-lt"/>
-                <a:ea typeface="+mn-ea"/>
-                <a:cs typeface="+mn-cs"/>
-              </a:defRPr>
-            </a:lvl5pPr>
-            <a:lvl6pPr marL="2286000" algn="l" defTabSz="914400" rtl="0" eaLnBrk="1" latinLnBrk="0" hangingPunct="1">
-              <a:defRPr sz="1800" kern="1200">
-                <a:solidFill>
-                  <a:schemeClr val="tx1"/>
-                </a:solidFill>
-                <a:latin typeface="+mn-lt"/>
-                <a:ea typeface="+mn-ea"/>
-                <a:cs typeface="+mn-cs"/>
-              </a:defRPr>
-            </a:lvl6pPr>
-            <a:lvl7pPr marL="2743200" algn="l" defTabSz="914400" rtl="0" eaLnBrk="1" latinLnBrk="0" hangingPunct="1">
-              <a:defRPr sz="1800" kern="1200">
-                <a:solidFill>
-                  <a:schemeClr val="tx1"/>
-                </a:solidFill>
-                <a:latin typeface="+mn-lt"/>
-                <a:ea typeface="+mn-ea"/>
-                <a:cs typeface="+mn-cs"/>
-              </a:defRPr>
-            </a:lvl7pPr>
-            <a:lvl8pPr marL="3200400" algn="l" defTabSz="914400" rtl="0" eaLnBrk="1" latinLnBrk="0" hangingPunct="1">
-              <a:defRPr sz="1800" kern="1200">
-                <a:solidFill>
-                  <a:schemeClr val="tx1"/>
-                </a:solidFill>
-                <a:latin typeface="+mn-lt"/>
-                <a:ea typeface="+mn-ea"/>
-                <a:cs typeface="+mn-cs"/>
-              </a:defRPr>
-            </a:lvl8pPr>
-            <a:lvl9pPr marL="3657600" algn="l" defTabSz="914400" rtl="0" eaLnBrk="1" latinLnBrk="0" hangingPunct="1">
-              <a:defRPr sz="1800" kern="1200">
-                <a:solidFill>
-                  <a:schemeClr val="tx1"/>
-                </a:solidFill>
-                <a:latin typeface="+mn-lt"/>
-                <a:ea typeface="+mn-ea"/>
-                <a:cs typeface="+mn-cs"/>
-              </a:defRPr>
-            </a:lvl9pPr>
-          </a:lstStyle>
-          <a:p>
-            <a:pPr algn="ctr" defTabSz="914309">
-              <a:defRPr/>
-            </a:pPr>
-            <a:r>
-              <a:rPr lang="de-AT" sz="1600" kern="0" dirty="0">
-                <a:solidFill>
-                  <a:sysClr val="window" lastClr="FFFFFF"/>
-                </a:solidFill>
-                <a:latin typeface="Calibri"/>
-              </a:rPr>
-              <a:t>PEPPOL Pilot SMP CA</a:t>
-            </a:r>
-          </a:p>
-        </p:txBody>
-      </p:sp>
-      <p:sp>
-        <p:nvSpPr>
-          <p:cNvPr id="8" name="Rechteck 7"/>
-          <p:cNvSpPr/>
-          <p:nvPr/>
-        </p:nvSpPr>
-        <p:spPr>
-          <a:xfrm>
-            <a:off x="1835696" y="3645024"/>
-            <a:ext cx="1296145" cy="576064"/>
-          </a:xfrm>
-          <a:prstGeom prst="rect">
-            <a:avLst/>
-          </a:prstGeom>
-          <a:solidFill>
-            <a:srgbClr val="9BBB59"/>
-          </a:solidFill>
-          <a:ln w="25400" cap="rnd" cmpd="sng" algn="ctr">
-            <a:solidFill>
-              <a:srgbClr val="9BBB59">
-                <a:shade val="50000"/>
-              </a:srgbClr>
-            </a:solidFill>
-            <a:prstDash val="solid"/>
-          </a:ln>
-          <a:effectLst/>
-        </p:spPr>
-        <p:txBody>
-          <a:bodyPr lIns="91431" tIns="45715" rIns="91431" bIns="45715" rtlCol="0" anchor="ctr"/>
-          <a:lstStyle>
-            <a:defPPr>
-              <a:defRPr lang="en-US"/>
-            </a:defPPr>
-            <a:lvl1pPr marL="0" algn="l" defTabSz="914400" rtl="0" eaLnBrk="1" latinLnBrk="0" hangingPunct="1">
-              <a:defRPr sz="1800" kern="1200">
-                <a:solidFill>
-                  <a:schemeClr val="tx1"/>
-                </a:solidFill>
-                <a:latin typeface="+mn-lt"/>
-                <a:ea typeface="+mn-ea"/>
-                <a:cs typeface="+mn-cs"/>
-              </a:defRPr>
-            </a:lvl1pPr>
-            <a:lvl2pPr marL="457200" algn="l" defTabSz="914400" rtl="0" eaLnBrk="1" latinLnBrk="0" hangingPunct="1">
-              <a:defRPr sz="1800" kern="1200">
-                <a:solidFill>
-                  <a:schemeClr val="tx1"/>
-                </a:solidFill>
-                <a:latin typeface="+mn-lt"/>
-                <a:ea typeface="+mn-ea"/>
-                <a:cs typeface="+mn-cs"/>
-              </a:defRPr>
-            </a:lvl2pPr>
-            <a:lvl3pPr marL="914400" algn="l" defTabSz="914400" rtl="0" eaLnBrk="1" latinLnBrk="0" hangingPunct="1">
-              <a:defRPr sz="1800" kern="1200">
-                <a:solidFill>
-                  <a:schemeClr val="tx1"/>
-                </a:solidFill>
-                <a:latin typeface="+mn-lt"/>
-                <a:ea typeface="+mn-ea"/>
-                <a:cs typeface="+mn-cs"/>
-              </a:defRPr>
-            </a:lvl3pPr>
-            <a:lvl4pPr marL="1371600" algn="l" defTabSz="914400" rtl="0" eaLnBrk="1" latinLnBrk="0" hangingPunct="1">
-              <a:defRPr sz="1800" kern="1200">
-                <a:solidFill>
-                  <a:schemeClr val="tx1"/>
-                </a:solidFill>
-                <a:latin typeface="+mn-lt"/>
-                <a:ea typeface="+mn-ea"/>
-                <a:cs typeface="+mn-cs"/>
-              </a:defRPr>
-            </a:lvl4pPr>
-            <a:lvl5pPr marL="1828800" algn="l" defTabSz="914400" rtl="0" eaLnBrk="1" latinLnBrk="0" hangingPunct="1">
-              <a:defRPr sz="1800" kern="1200">
-                <a:solidFill>
-                  <a:schemeClr val="tx1"/>
-                </a:solidFill>
-                <a:latin typeface="+mn-lt"/>
-                <a:ea typeface="+mn-ea"/>
-                <a:cs typeface="+mn-cs"/>
-              </a:defRPr>
-            </a:lvl5pPr>
-            <a:lvl6pPr marL="2286000" algn="l" defTabSz="914400" rtl="0" eaLnBrk="1" latinLnBrk="0" hangingPunct="1">
-              <a:defRPr sz="1800" kern="1200">
-                <a:solidFill>
-                  <a:schemeClr val="tx1"/>
-                </a:solidFill>
-                <a:latin typeface="+mn-lt"/>
-                <a:ea typeface="+mn-ea"/>
-                <a:cs typeface="+mn-cs"/>
-              </a:defRPr>
-            </a:lvl6pPr>
-            <a:lvl7pPr marL="2743200" algn="l" defTabSz="914400" rtl="0" eaLnBrk="1" latinLnBrk="0" hangingPunct="1">
-              <a:defRPr sz="1800" kern="1200">
-                <a:solidFill>
-                  <a:schemeClr val="tx1"/>
-                </a:solidFill>
-                <a:latin typeface="+mn-lt"/>
-                <a:ea typeface="+mn-ea"/>
-                <a:cs typeface="+mn-cs"/>
-              </a:defRPr>
-            </a:lvl7pPr>
-            <a:lvl8pPr marL="3200400" algn="l" defTabSz="914400" rtl="0" eaLnBrk="1" latinLnBrk="0" hangingPunct="1">
-              <a:defRPr sz="1800" kern="1200">
-                <a:solidFill>
-                  <a:schemeClr val="tx1"/>
-                </a:solidFill>
-                <a:latin typeface="+mn-lt"/>
-                <a:ea typeface="+mn-ea"/>
-                <a:cs typeface="+mn-cs"/>
-              </a:defRPr>
-            </a:lvl8pPr>
-            <a:lvl9pPr marL="3657600" algn="l" defTabSz="914400" rtl="0" eaLnBrk="1" latinLnBrk="0" hangingPunct="1">
-              <a:defRPr sz="1800" kern="1200">
-                <a:solidFill>
-                  <a:schemeClr val="tx1"/>
-                </a:solidFill>
-                <a:latin typeface="+mn-lt"/>
-                <a:ea typeface="+mn-ea"/>
-                <a:cs typeface="+mn-cs"/>
-              </a:defRPr>
-            </a:lvl9pPr>
-          </a:lstStyle>
-          <a:p>
-            <a:pPr algn="ctr" defTabSz="914309">
-              <a:defRPr/>
-            </a:pPr>
-            <a:r>
-              <a:rPr lang="de-AT" sz="1600" kern="0" dirty="0">
-                <a:solidFill>
-                  <a:sysClr val="window" lastClr="FFFFFF"/>
-                </a:solidFill>
-                <a:latin typeface="Calibri"/>
-              </a:rPr>
-              <a:t>PEPPOL </a:t>
-            </a:r>
-            <a:r>
-              <a:rPr lang="de-AT" sz="1600" kern="0" dirty="0" smtClean="0">
-                <a:solidFill>
-                  <a:sysClr val="window" lastClr="FFFFFF"/>
-                </a:solidFill>
-                <a:latin typeface="Calibri"/>
-              </a:rPr>
-              <a:t>Pilot </a:t>
-            </a:r>
-            <a:r>
-              <a:rPr lang="de-AT" sz="1600" kern="0" dirty="0">
-                <a:solidFill>
-                  <a:sysClr val="window" lastClr="FFFFFF"/>
-                </a:solidFill>
-                <a:latin typeface="Calibri"/>
-              </a:rPr>
-              <a:t>AP CA</a:t>
-            </a:r>
-          </a:p>
-        </p:txBody>
-      </p:sp>
-      <p:cxnSp>
-        <p:nvCxnSpPr>
-          <p:cNvPr id="10" name="Gewinkelte Verbindung 9"/>
-          <p:cNvCxnSpPr>
-            <a:stCxn id="5" idx="2"/>
-            <a:endCxn id="8" idx="0"/>
-          </p:cNvCxnSpPr>
-          <p:nvPr/>
-        </p:nvCxnSpPr>
-        <p:spPr>
-          <a:xfrm rot="5400000">
-            <a:off x="3185545" y="2186560"/>
-            <a:ext cx="756688" cy="2160240"/>
-          </a:xfrm>
-          <a:prstGeom prst="bentConnector3">
-            <a:avLst>
-              <a:gd name="adj1" fmla="val 50000"/>
-            </a:avLst>
-          </a:prstGeom>
-          <a:noFill/>
-          <a:ln w="9525" cap="rnd" cmpd="sng" algn="ctr">
-            <a:solidFill>
-              <a:srgbClr val="4F81BD">
-                <a:shade val="95000"/>
-                <a:satMod val="105000"/>
-              </a:srgbClr>
-            </a:solidFill>
-            <a:prstDash val="solid"/>
-            <a:tailEnd type="arrow"/>
-          </a:ln>
-          <a:effectLst/>
-        </p:spPr>
-      </p:cxnSp>
-      <p:sp>
-        <p:nvSpPr>
-          <p:cNvPr id="13" name="Rechteck 12"/>
-          <p:cNvSpPr/>
-          <p:nvPr/>
-        </p:nvSpPr>
-        <p:spPr>
-          <a:xfrm>
-            <a:off x="1835696" y="4653136"/>
-            <a:ext cx="1296145" cy="576064"/>
-          </a:xfrm>
-          <a:prstGeom prst="rect">
-            <a:avLst/>
-          </a:prstGeom>
-          <a:ln/>
-        </p:spPr>
-        <p:style>
-          <a:lnRef idx="2">
-            <a:schemeClr val="accent2">
-              <a:shade val="50000"/>
-            </a:schemeClr>
-          </a:lnRef>
-          <a:fillRef idx="1">
-            <a:schemeClr val="accent2"/>
-          </a:fillRef>
-          <a:effectRef idx="0">
-            <a:schemeClr val="accent2"/>
-          </a:effectRef>
-          <a:fontRef idx="minor">
-            <a:schemeClr val="lt1"/>
-          </a:fontRef>
-        </p:style>
-        <p:txBody>
-          <a:bodyPr lIns="91431" tIns="45715" rIns="91431" bIns="45715" rtlCol="0" anchor="ctr"/>
-          <a:lstStyle>
-            <a:defPPr>
-              <a:defRPr lang="en-US"/>
-            </a:defPPr>
-            <a:lvl1pPr marL="0" algn="l" defTabSz="914400" rtl="0" eaLnBrk="1" latinLnBrk="0" hangingPunct="1">
-              <a:defRPr sz="1800" kern="1200">
-                <a:solidFill>
-                  <a:schemeClr val="tx1"/>
-                </a:solidFill>
-                <a:latin typeface="+mn-lt"/>
-                <a:ea typeface="+mn-ea"/>
-                <a:cs typeface="+mn-cs"/>
-              </a:defRPr>
-            </a:lvl1pPr>
-            <a:lvl2pPr marL="457200" algn="l" defTabSz="914400" rtl="0" eaLnBrk="1" latinLnBrk="0" hangingPunct="1">
-              <a:defRPr sz="1800" kern="1200">
-                <a:solidFill>
-                  <a:schemeClr val="tx1"/>
-                </a:solidFill>
-                <a:latin typeface="+mn-lt"/>
-                <a:ea typeface="+mn-ea"/>
-                <a:cs typeface="+mn-cs"/>
-              </a:defRPr>
-            </a:lvl2pPr>
-            <a:lvl3pPr marL="914400" algn="l" defTabSz="914400" rtl="0" eaLnBrk="1" latinLnBrk="0" hangingPunct="1">
-              <a:defRPr sz="1800" kern="1200">
-                <a:solidFill>
-                  <a:schemeClr val="tx1"/>
-                </a:solidFill>
-                <a:latin typeface="+mn-lt"/>
-                <a:ea typeface="+mn-ea"/>
-                <a:cs typeface="+mn-cs"/>
-              </a:defRPr>
-            </a:lvl3pPr>
-            <a:lvl4pPr marL="1371600" algn="l" defTabSz="914400" rtl="0" eaLnBrk="1" latinLnBrk="0" hangingPunct="1">
-              <a:defRPr sz="1800" kern="1200">
-                <a:solidFill>
-                  <a:schemeClr val="tx1"/>
-                </a:solidFill>
-                <a:latin typeface="+mn-lt"/>
-                <a:ea typeface="+mn-ea"/>
-                <a:cs typeface="+mn-cs"/>
-              </a:defRPr>
-            </a:lvl4pPr>
-            <a:lvl5pPr marL="1828800" algn="l" defTabSz="914400" rtl="0" eaLnBrk="1" latinLnBrk="0" hangingPunct="1">
-              <a:defRPr sz="1800" kern="1200">
-                <a:solidFill>
-                  <a:schemeClr val="tx1"/>
-                </a:solidFill>
-                <a:latin typeface="+mn-lt"/>
-                <a:ea typeface="+mn-ea"/>
-                <a:cs typeface="+mn-cs"/>
-              </a:defRPr>
-            </a:lvl5pPr>
-            <a:lvl6pPr marL="2286000" algn="l" defTabSz="914400" rtl="0" eaLnBrk="1" latinLnBrk="0" hangingPunct="1">
-              <a:defRPr sz="1800" kern="1200">
-                <a:solidFill>
-                  <a:schemeClr val="tx1"/>
-                </a:solidFill>
-                <a:latin typeface="+mn-lt"/>
-                <a:ea typeface="+mn-ea"/>
-                <a:cs typeface="+mn-cs"/>
-              </a:defRPr>
-            </a:lvl6pPr>
-            <a:lvl7pPr marL="2743200" algn="l" defTabSz="914400" rtl="0" eaLnBrk="1" latinLnBrk="0" hangingPunct="1">
-              <a:defRPr sz="1800" kern="1200">
-                <a:solidFill>
-                  <a:schemeClr val="tx1"/>
-                </a:solidFill>
-                <a:latin typeface="+mn-lt"/>
-                <a:ea typeface="+mn-ea"/>
-                <a:cs typeface="+mn-cs"/>
-              </a:defRPr>
-            </a:lvl7pPr>
-            <a:lvl8pPr marL="3200400" algn="l" defTabSz="914400" rtl="0" eaLnBrk="1" latinLnBrk="0" hangingPunct="1">
-              <a:defRPr sz="1800" kern="1200">
-                <a:solidFill>
-                  <a:schemeClr val="tx1"/>
-                </a:solidFill>
-                <a:latin typeface="+mn-lt"/>
-                <a:ea typeface="+mn-ea"/>
-                <a:cs typeface="+mn-cs"/>
-              </a:defRPr>
-            </a:lvl8pPr>
-            <a:lvl9pPr marL="3657600" algn="l" defTabSz="914400" rtl="0" eaLnBrk="1" latinLnBrk="0" hangingPunct="1">
-              <a:defRPr sz="1800" kern="1200">
-                <a:solidFill>
-                  <a:schemeClr val="tx1"/>
-                </a:solidFill>
-                <a:latin typeface="+mn-lt"/>
-                <a:ea typeface="+mn-ea"/>
-                <a:cs typeface="+mn-cs"/>
-              </a:defRPr>
-            </a:lvl9pPr>
-          </a:lstStyle>
-          <a:p>
-            <a:pPr algn="ctr" defTabSz="914309">
-              <a:defRPr/>
-            </a:pPr>
-            <a:r>
-              <a:rPr lang="de-AT" sz="1600" i="1" kern="0" dirty="0">
-                <a:solidFill>
-                  <a:sysClr val="window" lastClr="FFFFFF"/>
-                </a:solidFill>
-                <a:latin typeface="Calibri"/>
-              </a:rPr>
-              <a:t>AP Pilot Cert</a:t>
-            </a:r>
-          </a:p>
-        </p:txBody>
-      </p:sp>
-      <p:sp>
-        <p:nvSpPr>
-          <p:cNvPr id="14" name="Rechteck 13"/>
-          <p:cNvSpPr/>
-          <p:nvPr/>
-        </p:nvSpPr>
-        <p:spPr>
-          <a:xfrm>
-            <a:off x="3275856" y="4653136"/>
-            <a:ext cx="1296145" cy="576064"/>
-          </a:xfrm>
-          <a:prstGeom prst="rect">
-            <a:avLst/>
-          </a:prstGeom>
-          <a:ln/>
-        </p:spPr>
-        <p:style>
-          <a:lnRef idx="2">
-            <a:schemeClr val="accent2">
-              <a:shade val="50000"/>
-            </a:schemeClr>
-          </a:lnRef>
-          <a:fillRef idx="1">
-            <a:schemeClr val="accent2"/>
-          </a:fillRef>
-          <a:effectRef idx="0">
-            <a:schemeClr val="accent2"/>
-          </a:effectRef>
-          <a:fontRef idx="minor">
-            <a:schemeClr val="lt1"/>
-          </a:fontRef>
-        </p:style>
-        <p:txBody>
-          <a:bodyPr lIns="91431" tIns="45715" rIns="91431" bIns="45715" rtlCol="0" anchor="ctr"/>
-          <a:lstStyle>
-            <a:defPPr>
-              <a:defRPr lang="en-US"/>
-            </a:defPPr>
-            <a:lvl1pPr marL="0" algn="l" defTabSz="914400" rtl="0" eaLnBrk="1" latinLnBrk="0" hangingPunct="1">
-              <a:defRPr sz="1800" kern="1200">
-                <a:solidFill>
-                  <a:schemeClr val="tx1"/>
-                </a:solidFill>
-                <a:latin typeface="+mn-lt"/>
-                <a:ea typeface="+mn-ea"/>
-                <a:cs typeface="+mn-cs"/>
-              </a:defRPr>
-            </a:lvl1pPr>
-            <a:lvl2pPr marL="457200" algn="l" defTabSz="914400" rtl="0" eaLnBrk="1" latinLnBrk="0" hangingPunct="1">
-              <a:defRPr sz="1800" kern="1200">
-                <a:solidFill>
-                  <a:schemeClr val="tx1"/>
-                </a:solidFill>
-                <a:latin typeface="+mn-lt"/>
-                <a:ea typeface="+mn-ea"/>
-                <a:cs typeface="+mn-cs"/>
-              </a:defRPr>
-            </a:lvl2pPr>
-            <a:lvl3pPr marL="914400" algn="l" defTabSz="914400" rtl="0" eaLnBrk="1" latinLnBrk="0" hangingPunct="1">
-              <a:defRPr sz="1800" kern="1200">
-                <a:solidFill>
-                  <a:schemeClr val="tx1"/>
-                </a:solidFill>
-                <a:latin typeface="+mn-lt"/>
-                <a:ea typeface="+mn-ea"/>
-                <a:cs typeface="+mn-cs"/>
-              </a:defRPr>
-            </a:lvl3pPr>
-            <a:lvl4pPr marL="1371600" algn="l" defTabSz="914400" rtl="0" eaLnBrk="1" latinLnBrk="0" hangingPunct="1">
-              <a:defRPr sz="1800" kern="1200">
-                <a:solidFill>
-                  <a:schemeClr val="tx1"/>
-                </a:solidFill>
-                <a:latin typeface="+mn-lt"/>
-                <a:ea typeface="+mn-ea"/>
-                <a:cs typeface="+mn-cs"/>
-              </a:defRPr>
-            </a:lvl4pPr>
-            <a:lvl5pPr marL="1828800" algn="l" defTabSz="914400" rtl="0" eaLnBrk="1" latinLnBrk="0" hangingPunct="1">
-              <a:defRPr sz="1800" kern="1200">
-                <a:solidFill>
-                  <a:schemeClr val="tx1"/>
-                </a:solidFill>
-                <a:latin typeface="+mn-lt"/>
-                <a:ea typeface="+mn-ea"/>
-                <a:cs typeface="+mn-cs"/>
-              </a:defRPr>
-            </a:lvl5pPr>
-            <a:lvl6pPr marL="2286000" algn="l" defTabSz="914400" rtl="0" eaLnBrk="1" latinLnBrk="0" hangingPunct="1">
-              <a:defRPr sz="1800" kern="1200">
-                <a:solidFill>
-                  <a:schemeClr val="tx1"/>
-                </a:solidFill>
-                <a:latin typeface="+mn-lt"/>
-                <a:ea typeface="+mn-ea"/>
-                <a:cs typeface="+mn-cs"/>
-              </a:defRPr>
-            </a:lvl6pPr>
-            <a:lvl7pPr marL="2743200" algn="l" defTabSz="914400" rtl="0" eaLnBrk="1" latinLnBrk="0" hangingPunct="1">
-              <a:defRPr sz="1800" kern="1200">
-                <a:solidFill>
-                  <a:schemeClr val="tx1"/>
-                </a:solidFill>
-                <a:latin typeface="+mn-lt"/>
-                <a:ea typeface="+mn-ea"/>
-                <a:cs typeface="+mn-cs"/>
-              </a:defRPr>
-            </a:lvl7pPr>
-            <a:lvl8pPr marL="3200400" algn="l" defTabSz="914400" rtl="0" eaLnBrk="1" latinLnBrk="0" hangingPunct="1">
-              <a:defRPr sz="1800" kern="1200">
-                <a:solidFill>
-                  <a:schemeClr val="tx1"/>
-                </a:solidFill>
-                <a:latin typeface="+mn-lt"/>
-                <a:ea typeface="+mn-ea"/>
-                <a:cs typeface="+mn-cs"/>
-              </a:defRPr>
-            </a:lvl8pPr>
-            <a:lvl9pPr marL="3657600" algn="l" defTabSz="914400" rtl="0" eaLnBrk="1" latinLnBrk="0" hangingPunct="1">
-              <a:defRPr sz="1800" kern="1200">
-                <a:solidFill>
-                  <a:schemeClr val="tx1"/>
-                </a:solidFill>
-                <a:latin typeface="+mn-lt"/>
-                <a:ea typeface="+mn-ea"/>
-                <a:cs typeface="+mn-cs"/>
-              </a:defRPr>
-            </a:lvl9pPr>
-          </a:lstStyle>
-          <a:p>
-            <a:pPr algn="ctr" defTabSz="914309">
-              <a:defRPr/>
-            </a:pPr>
-            <a:r>
-              <a:rPr lang="de-AT" sz="1600" i="1" kern="0" dirty="0">
-                <a:solidFill>
-                  <a:sysClr val="window" lastClr="FFFFFF"/>
-                </a:solidFill>
-                <a:latin typeface="Calibri"/>
-              </a:rPr>
-              <a:t>SMP Pilot Cert</a:t>
-            </a:r>
-          </a:p>
-        </p:txBody>
-      </p:sp>
-      <p:cxnSp>
-        <p:nvCxnSpPr>
-          <p:cNvPr id="19" name="Gerade Verbindung mit Pfeil 18"/>
-          <p:cNvCxnSpPr>
-            <a:stCxn id="8" idx="2"/>
-            <a:endCxn id="13" idx="0"/>
-          </p:cNvCxnSpPr>
-          <p:nvPr/>
-        </p:nvCxnSpPr>
-        <p:spPr>
-          <a:xfrm>
-            <a:off x="2483769" y="4221088"/>
-            <a:ext cx="0" cy="432048"/>
-          </a:xfrm>
-          <a:prstGeom prst="straightConnector1">
-            <a:avLst/>
-          </a:prstGeom>
-          <a:ln>
-            <a:tailEnd type="arrow"/>
-          </a:ln>
-        </p:spPr>
-        <p:style>
-          <a:lnRef idx="1">
-            <a:schemeClr val="accent1"/>
-          </a:lnRef>
-          <a:fillRef idx="0">
-            <a:schemeClr val="accent1"/>
-          </a:fillRef>
-          <a:effectRef idx="0">
-            <a:schemeClr val="accent1"/>
-          </a:effectRef>
-          <a:fontRef idx="minor">
-            <a:schemeClr val="tx1"/>
-          </a:fontRef>
-        </p:style>
-      </p:cxnSp>
-      <p:cxnSp>
-        <p:nvCxnSpPr>
-          <p:cNvPr id="21" name="Gerade Verbindung mit Pfeil 20"/>
-          <p:cNvCxnSpPr>
-            <a:stCxn id="7" idx="2"/>
-            <a:endCxn id="14" idx="0"/>
-          </p:cNvCxnSpPr>
-          <p:nvPr/>
-        </p:nvCxnSpPr>
-        <p:spPr>
-          <a:xfrm>
-            <a:off x="3923929" y="4221088"/>
-            <a:ext cx="0" cy="432048"/>
-          </a:xfrm>
-          <a:prstGeom prst="straightConnector1">
-            <a:avLst/>
-          </a:prstGeom>
-          <a:ln>
-            <a:tailEnd type="arrow"/>
-          </a:ln>
-        </p:spPr>
-        <p:style>
-          <a:lnRef idx="1">
-            <a:schemeClr val="accent1"/>
-          </a:lnRef>
-          <a:fillRef idx="0">
-            <a:schemeClr val="accent1"/>
-          </a:fillRef>
-          <a:effectRef idx="0">
-            <a:schemeClr val="accent1"/>
-          </a:effectRef>
-          <a:fontRef idx="minor">
-            <a:schemeClr val="tx1"/>
-          </a:fontRef>
-        </p:style>
-      </p:cxnSp>
-      <p:sp>
-        <p:nvSpPr>
-          <p:cNvPr id="35" name="Rechteck 34"/>
-          <p:cNvSpPr/>
-          <p:nvPr/>
-        </p:nvSpPr>
-        <p:spPr>
-          <a:xfrm>
-            <a:off x="6156177" y="3645024"/>
-            <a:ext cx="1296145" cy="576064"/>
-          </a:xfrm>
-          <a:prstGeom prst="rect">
-            <a:avLst/>
-          </a:prstGeom>
-          <a:solidFill>
-            <a:srgbClr val="9BBB59"/>
-          </a:solidFill>
-          <a:ln w="25400" cap="rnd" cmpd="sng" algn="ctr">
-            <a:solidFill>
-              <a:srgbClr val="9BBB59">
-                <a:shade val="50000"/>
-              </a:srgbClr>
-            </a:solidFill>
-            <a:prstDash val="solid"/>
-          </a:ln>
-          <a:effectLst/>
-        </p:spPr>
-        <p:txBody>
-          <a:bodyPr lIns="91431" tIns="45715" rIns="91431" bIns="45715" rtlCol="0" anchor="ctr"/>
-          <a:lstStyle>
-            <a:defPPr>
-              <a:defRPr lang="en-US"/>
-            </a:defPPr>
-            <a:lvl1pPr marL="0" algn="l" defTabSz="914400" rtl="0" eaLnBrk="1" latinLnBrk="0" hangingPunct="1">
-              <a:defRPr sz="1800" kern="1200">
-                <a:solidFill>
-                  <a:schemeClr val="tx1"/>
-                </a:solidFill>
-                <a:latin typeface="+mn-lt"/>
-                <a:ea typeface="+mn-ea"/>
-                <a:cs typeface="+mn-cs"/>
-              </a:defRPr>
-            </a:lvl1pPr>
-            <a:lvl2pPr marL="457200" algn="l" defTabSz="914400" rtl="0" eaLnBrk="1" latinLnBrk="0" hangingPunct="1">
-              <a:defRPr sz="1800" kern="1200">
-                <a:solidFill>
-                  <a:schemeClr val="tx1"/>
-                </a:solidFill>
-                <a:latin typeface="+mn-lt"/>
-                <a:ea typeface="+mn-ea"/>
-                <a:cs typeface="+mn-cs"/>
-              </a:defRPr>
-            </a:lvl2pPr>
-            <a:lvl3pPr marL="914400" algn="l" defTabSz="914400" rtl="0" eaLnBrk="1" latinLnBrk="0" hangingPunct="1">
-              <a:defRPr sz="1800" kern="1200">
-                <a:solidFill>
-                  <a:schemeClr val="tx1"/>
-                </a:solidFill>
-                <a:latin typeface="+mn-lt"/>
-                <a:ea typeface="+mn-ea"/>
-                <a:cs typeface="+mn-cs"/>
-              </a:defRPr>
-            </a:lvl3pPr>
-            <a:lvl4pPr marL="1371600" algn="l" defTabSz="914400" rtl="0" eaLnBrk="1" latinLnBrk="0" hangingPunct="1">
-              <a:defRPr sz="1800" kern="1200">
-                <a:solidFill>
-                  <a:schemeClr val="tx1"/>
-                </a:solidFill>
-                <a:latin typeface="+mn-lt"/>
-                <a:ea typeface="+mn-ea"/>
-                <a:cs typeface="+mn-cs"/>
-              </a:defRPr>
-            </a:lvl4pPr>
-            <a:lvl5pPr marL="1828800" algn="l" defTabSz="914400" rtl="0" eaLnBrk="1" latinLnBrk="0" hangingPunct="1">
-              <a:defRPr sz="1800" kern="1200">
-                <a:solidFill>
-                  <a:schemeClr val="tx1"/>
-                </a:solidFill>
-                <a:latin typeface="+mn-lt"/>
-                <a:ea typeface="+mn-ea"/>
-                <a:cs typeface="+mn-cs"/>
-              </a:defRPr>
-            </a:lvl5pPr>
-            <a:lvl6pPr marL="2286000" algn="l" defTabSz="914400" rtl="0" eaLnBrk="1" latinLnBrk="0" hangingPunct="1">
-              <a:defRPr sz="1800" kern="1200">
-                <a:solidFill>
-                  <a:schemeClr val="tx1"/>
-                </a:solidFill>
-                <a:latin typeface="+mn-lt"/>
-                <a:ea typeface="+mn-ea"/>
-                <a:cs typeface="+mn-cs"/>
-              </a:defRPr>
-            </a:lvl6pPr>
-            <a:lvl7pPr marL="2743200" algn="l" defTabSz="914400" rtl="0" eaLnBrk="1" latinLnBrk="0" hangingPunct="1">
-              <a:defRPr sz="1800" kern="1200">
-                <a:solidFill>
-                  <a:schemeClr val="tx1"/>
-                </a:solidFill>
-                <a:latin typeface="+mn-lt"/>
-                <a:ea typeface="+mn-ea"/>
-                <a:cs typeface="+mn-cs"/>
-              </a:defRPr>
-            </a:lvl7pPr>
-            <a:lvl8pPr marL="3200400" algn="l" defTabSz="914400" rtl="0" eaLnBrk="1" latinLnBrk="0" hangingPunct="1">
-              <a:defRPr sz="1800" kern="1200">
-                <a:solidFill>
-                  <a:schemeClr val="tx1"/>
-                </a:solidFill>
-                <a:latin typeface="+mn-lt"/>
-                <a:ea typeface="+mn-ea"/>
-                <a:cs typeface="+mn-cs"/>
-              </a:defRPr>
-            </a:lvl8pPr>
-            <a:lvl9pPr marL="3657600" algn="l" defTabSz="914400" rtl="0" eaLnBrk="1" latinLnBrk="0" hangingPunct="1">
-              <a:defRPr sz="1800" kern="1200">
-                <a:solidFill>
-                  <a:schemeClr val="tx1"/>
-                </a:solidFill>
-                <a:latin typeface="+mn-lt"/>
-                <a:ea typeface="+mn-ea"/>
-                <a:cs typeface="+mn-cs"/>
-              </a:defRPr>
-            </a:lvl9pPr>
-          </a:lstStyle>
-          <a:p>
-            <a:pPr algn="ctr" defTabSz="914309">
-              <a:defRPr/>
-            </a:pPr>
-            <a:r>
-              <a:rPr lang="de-AT" sz="1600" kern="0" dirty="0">
-                <a:solidFill>
-                  <a:sysClr val="window" lastClr="FFFFFF"/>
-                </a:solidFill>
-                <a:latin typeface="Calibri"/>
-              </a:rPr>
-              <a:t>PEPPOL </a:t>
-            </a:r>
-            <a:r>
-              <a:rPr lang="de-AT" sz="1600" kern="0" dirty="0" err="1" smtClean="0">
-                <a:solidFill>
-                  <a:sysClr val="window" lastClr="FFFFFF"/>
-                </a:solidFill>
-                <a:latin typeface="Calibri"/>
-              </a:rPr>
-              <a:t>Prod</a:t>
-            </a:r>
-            <a:r>
-              <a:rPr lang="de-AT" sz="1600" kern="0" dirty="0" smtClean="0">
-                <a:solidFill>
-                  <a:sysClr val="window" lastClr="FFFFFF"/>
-                </a:solidFill>
-                <a:latin typeface="Calibri"/>
-              </a:rPr>
-              <a:t> </a:t>
-            </a:r>
-            <a:r>
-              <a:rPr lang="de-AT" sz="1600" kern="0" dirty="0">
-                <a:solidFill>
-                  <a:sysClr val="window" lastClr="FFFFFF"/>
-                </a:solidFill>
-                <a:latin typeface="Calibri"/>
-              </a:rPr>
-              <a:t>SMP CA</a:t>
-            </a:r>
-          </a:p>
-        </p:txBody>
-      </p:sp>
-      <p:sp>
-        <p:nvSpPr>
-          <p:cNvPr id="36" name="Rechteck 35"/>
-          <p:cNvSpPr/>
-          <p:nvPr/>
-        </p:nvSpPr>
-        <p:spPr>
-          <a:xfrm>
-            <a:off x="4716017" y="3645024"/>
-            <a:ext cx="1296145" cy="576064"/>
-          </a:xfrm>
-          <a:prstGeom prst="rect">
-            <a:avLst/>
-          </a:prstGeom>
-          <a:solidFill>
-            <a:srgbClr val="9BBB59"/>
-          </a:solidFill>
-          <a:ln w="25400" cap="rnd" cmpd="sng" algn="ctr">
-            <a:solidFill>
-              <a:srgbClr val="9BBB59">
-                <a:shade val="50000"/>
-              </a:srgbClr>
-            </a:solidFill>
-            <a:prstDash val="solid"/>
-          </a:ln>
-          <a:effectLst/>
-        </p:spPr>
-        <p:txBody>
-          <a:bodyPr lIns="91431" tIns="45715" rIns="91431" bIns="45715" rtlCol="0" anchor="ctr"/>
-          <a:lstStyle>
-            <a:defPPr>
-              <a:defRPr lang="en-US"/>
-            </a:defPPr>
-            <a:lvl1pPr marL="0" algn="l" defTabSz="914400" rtl="0" eaLnBrk="1" latinLnBrk="0" hangingPunct="1">
-              <a:defRPr sz="1800" kern="1200">
-                <a:solidFill>
-                  <a:schemeClr val="tx1"/>
-                </a:solidFill>
-                <a:latin typeface="+mn-lt"/>
-                <a:ea typeface="+mn-ea"/>
-                <a:cs typeface="+mn-cs"/>
-              </a:defRPr>
-            </a:lvl1pPr>
-            <a:lvl2pPr marL="457200" algn="l" defTabSz="914400" rtl="0" eaLnBrk="1" latinLnBrk="0" hangingPunct="1">
-              <a:defRPr sz="1800" kern="1200">
-                <a:solidFill>
-                  <a:schemeClr val="tx1"/>
-                </a:solidFill>
-                <a:latin typeface="+mn-lt"/>
-                <a:ea typeface="+mn-ea"/>
-                <a:cs typeface="+mn-cs"/>
-              </a:defRPr>
-            </a:lvl2pPr>
-            <a:lvl3pPr marL="914400" algn="l" defTabSz="914400" rtl="0" eaLnBrk="1" latinLnBrk="0" hangingPunct="1">
-              <a:defRPr sz="1800" kern="1200">
-                <a:solidFill>
-                  <a:schemeClr val="tx1"/>
-                </a:solidFill>
-                <a:latin typeface="+mn-lt"/>
-                <a:ea typeface="+mn-ea"/>
-                <a:cs typeface="+mn-cs"/>
-              </a:defRPr>
-            </a:lvl3pPr>
-            <a:lvl4pPr marL="1371600" algn="l" defTabSz="914400" rtl="0" eaLnBrk="1" latinLnBrk="0" hangingPunct="1">
-              <a:defRPr sz="1800" kern="1200">
-                <a:solidFill>
-                  <a:schemeClr val="tx1"/>
-                </a:solidFill>
-                <a:latin typeface="+mn-lt"/>
-                <a:ea typeface="+mn-ea"/>
-                <a:cs typeface="+mn-cs"/>
-              </a:defRPr>
-            </a:lvl4pPr>
-            <a:lvl5pPr marL="1828800" algn="l" defTabSz="914400" rtl="0" eaLnBrk="1" latinLnBrk="0" hangingPunct="1">
-              <a:defRPr sz="1800" kern="1200">
-                <a:solidFill>
-                  <a:schemeClr val="tx1"/>
-                </a:solidFill>
-                <a:latin typeface="+mn-lt"/>
-                <a:ea typeface="+mn-ea"/>
-                <a:cs typeface="+mn-cs"/>
-              </a:defRPr>
-            </a:lvl5pPr>
-            <a:lvl6pPr marL="2286000" algn="l" defTabSz="914400" rtl="0" eaLnBrk="1" latinLnBrk="0" hangingPunct="1">
-              <a:defRPr sz="1800" kern="1200">
-                <a:solidFill>
-                  <a:schemeClr val="tx1"/>
-                </a:solidFill>
-                <a:latin typeface="+mn-lt"/>
-                <a:ea typeface="+mn-ea"/>
-                <a:cs typeface="+mn-cs"/>
-              </a:defRPr>
-            </a:lvl6pPr>
-            <a:lvl7pPr marL="2743200" algn="l" defTabSz="914400" rtl="0" eaLnBrk="1" latinLnBrk="0" hangingPunct="1">
-              <a:defRPr sz="1800" kern="1200">
-                <a:solidFill>
-                  <a:schemeClr val="tx1"/>
-                </a:solidFill>
-                <a:latin typeface="+mn-lt"/>
-                <a:ea typeface="+mn-ea"/>
-                <a:cs typeface="+mn-cs"/>
-              </a:defRPr>
-            </a:lvl7pPr>
-            <a:lvl8pPr marL="3200400" algn="l" defTabSz="914400" rtl="0" eaLnBrk="1" latinLnBrk="0" hangingPunct="1">
-              <a:defRPr sz="1800" kern="1200">
-                <a:solidFill>
-                  <a:schemeClr val="tx1"/>
-                </a:solidFill>
-                <a:latin typeface="+mn-lt"/>
-                <a:ea typeface="+mn-ea"/>
-                <a:cs typeface="+mn-cs"/>
-              </a:defRPr>
-            </a:lvl8pPr>
-            <a:lvl9pPr marL="3657600" algn="l" defTabSz="914400" rtl="0" eaLnBrk="1" latinLnBrk="0" hangingPunct="1">
-              <a:defRPr sz="1800" kern="1200">
-                <a:solidFill>
-                  <a:schemeClr val="tx1"/>
-                </a:solidFill>
-                <a:latin typeface="+mn-lt"/>
-                <a:ea typeface="+mn-ea"/>
-                <a:cs typeface="+mn-cs"/>
-              </a:defRPr>
-            </a:lvl9pPr>
-          </a:lstStyle>
-          <a:p>
-            <a:pPr algn="ctr" defTabSz="914309">
-              <a:defRPr/>
-            </a:pPr>
-            <a:r>
-              <a:rPr lang="de-AT" sz="1600" kern="0" dirty="0">
-                <a:solidFill>
-                  <a:sysClr val="window" lastClr="FFFFFF"/>
-                </a:solidFill>
-                <a:latin typeface="Calibri"/>
-              </a:rPr>
-              <a:t>PEPPOL </a:t>
-            </a:r>
-            <a:r>
-              <a:rPr lang="de-AT" sz="1600" kern="0" dirty="0" err="1" smtClean="0">
-                <a:solidFill>
-                  <a:sysClr val="window" lastClr="FFFFFF"/>
-                </a:solidFill>
-                <a:latin typeface="Calibri"/>
-              </a:rPr>
-              <a:t>Prod</a:t>
-            </a:r>
-            <a:r>
-              <a:rPr lang="de-AT" sz="1600" kern="0" dirty="0" smtClean="0">
-                <a:solidFill>
-                  <a:sysClr val="window" lastClr="FFFFFF"/>
-                </a:solidFill>
-                <a:latin typeface="Calibri"/>
-              </a:rPr>
-              <a:t> </a:t>
-            </a:r>
-            <a:r>
-              <a:rPr lang="de-AT" sz="1600" kern="0" dirty="0">
-                <a:solidFill>
-                  <a:sysClr val="window" lastClr="FFFFFF"/>
-                </a:solidFill>
-                <a:latin typeface="Calibri"/>
-              </a:rPr>
-              <a:t>AP CA</a:t>
-            </a:r>
-          </a:p>
-        </p:txBody>
-      </p:sp>
-      <p:sp>
-        <p:nvSpPr>
-          <p:cNvPr id="40" name="Rechteck 39"/>
-          <p:cNvSpPr/>
-          <p:nvPr/>
-        </p:nvSpPr>
-        <p:spPr>
-          <a:xfrm>
-            <a:off x="4716017" y="4653136"/>
-            <a:ext cx="1296145" cy="576064"/>
-          </a:xfrm>
-          <a:prstGeom prst="rect">
-            <a:avLst/>
-          </a:prstGeom>
-          <a:ln/>
-        </p:spPr>
-        <p:style>
-          <a:lnRef idx="2">
-            <a:schemeClr val="accent2">
-              <a:shade val="50000"/>
-            </a:schemeClr>
-          </a:lnRef>
-          <a:fillRef idx="1">
-            <a:schemeClr val="accent2"/>
-          </a:fillRef>
-          <a:effectRef idx="0">
-            <a:schemeClr val="accent2"/>
-          </a:effectRef>
-          <a:fontRef idx="minor">
-            <a:schemeClr val="lt1"/>
-          </a:fontRef>
-        </p:style>
-        <p:txBody>
-          <a:bodyPr lIns="91431" tIns="45715" rIns="91431" bIns="45715" rtlCol="0" anchor="ctr"/>
-          <a:lstStyle>
-            <a:defPPr>
-              <a:defRPr lang="en-US"/>
-            </a:defPPr>
-            <a:lvl1pPr marL="0" algn="l" defTabSz="914400" rtl="0" eaLnBrk="1" latinLnBrk="0" hangingPunct="1">
-              <a:defRPr sz="1800" kern="1200">
-                <a:solidFill>
-                  <a:schemeClr val="tx1"/>
-                </a:solidFill>
-                <a:latin typeface="+mn-lt"/>
-                <a:ea typeface="+mn-ea"/>
-                <a:cs typeface="+mn-cs"/>
-              </a:defRPr>
-            </a:lvl1pPr>
-            <a:lvl2pPr marL="457200" algn="l" defTabSz="914400" rtl="0" eaLnBrk="1" latinLnBrk="0" hangingPunct="1">
-              <a:defRPr sz="1800" kern="1200">
-                <a:solidFill>
-                  <a:schemeClr val="tx1"/>
-                </a:solidFill>
-                <a:latin typeface="+mn-lt"/>
-                <a:ea typeface="+mn-ea"/>
-                <a:cs typeface="+mn-cs"/>
-              </a:defRPr>
-            </a:lvl2pPr>
-            <a:lvl3pPr marL="914400" algn="l" defTabSz="914400" rtl="0" eaLnBrk="1" latinLnBrk="0" hangingPunct="1">
-              <a:defRPr sz="1800" kern="1200">
-                <a:solidFill>
-                  <a:schemeClr val="tx1"/>
-                </a:solidFill>
-                <a:latin typeface="+mn-lt"/>
-                <a:ea typeface="+mn-ea"/>
-                <a:cs typeface="+mn-cs"/>
-              </a:defRPr>
-            </a:lvl3pPr>
-            <a:lvl4pPr marL="1371600" algn="l" defTabSz="914400" rtl="0" eaLnBrk="1" latinLnBrk="0" hangingPunct="1">
-              <a:defRPr sz="1800" kern="1200">
-                <a:solidFill>
-                  <a:schemeClr val="tx1"/>
-                </a:solidFill>
-                <a:latin typeface="+mn-lt"/>
-                <a:ea typeface="+mn-ea"/>
-                <a:cs typeface="+mn-cs"/>
-              </a:defRPr>
-            </a:lvl4pPr>
-            <a:lvl5pPr marL="1828800" algn="l" defTabSz="914400" rtl="0" eaLnBrk="1" latinLnBrk="0" hangingPunct="1">
-              <a:defRPr sz="1800" kern="1200">
-                <a:solidFill>
-                  <a:schemeClr val="tx1"/>
-                </a:solidFill>
-                <a:latin typeface="+mn-lt"/>
-                <a:ea typeface="+mn-ea"/>
-                <a:cs typeface="+mn-cs"/>
-              </a:defRPr>
-            </a:lvl5pPr>
-            <a:lvl6pPr marL="2286000" algn="l" defTabSz="914400" rtl="0" eaLnBrk="1" latinLnBrk="0" hangingPunct="1">
-              <a:defRPr sz="1800" kern="1200">
-                <a:solidFill>
-                  <a:schemeClr val="tx1"/>
-                </a:solidFill>
-                <a:latin typeface="+mn-lt"/>
-                <a:ea typeface="+mn-ea"/>
-                <a:cs typeface="+mn-cs"/>
-              </a:defRPr>
-            </a:lvl6pPr>
-            <a:lvl7pPr marL="2743200" algn="l" defTabSz="914400" rtl="0" eaLnBrk="1" latinLnBrk="0" hangingPunct="1">
-              <a:defRPr sz="1800" kern="1200">
-                <a:solidFill>
-                  <a:schemeClr val="tx1"/>
-                </a:solidFill>
-                <a:latin typeface="+mn-lt"/>
-                <a:ea typeface="+mn-ea"/>
-                <a:cs typeface="+mn-cs"/>
-              </a:defRPr>
-            </a:lvl7pPr>
-            <a:lvl8pPr marL="3200400" algn="l" defTabSz="914400" rtl="0" eaLnBrk="1" latinLnBrk="0" hangingPunct="1">
-              <a:defRPr sz="1800" kern="1200">
-                <a:solidFill>
-                  <a:schemeClr val="tx1"/>
-                </a:solidFill>
-                <a:latin typeface="+mn-lt"/>
-                <a:ea typeface="+mn-ea"/>
-                <a:cs typeface="+mn-cs"/>
-              </a:defRPr>
-            </a:lvl8pPr>
-            <a:lvl9pPr marL="3657600" algn="l" defTabSz="914400" rtl="0" eaLnBrk="1" latinLnBrk="0" hangingPunct="1">
-              <a:defRPr sz="1800" kern="1200">
-                <a:solidFill>
-                  <a:schemeClr val="tx1"/>
-                </a:solidFill>
-                <a:latin typeface="+mn-lt"/>
-                <a:ea typeface="+mn-ea"/>
-                <a:cs typeface="+mn-cs"/>
-              </a:defRPr>
-            </a:lvl9pPr>
-          </a:lstStyle>
-          <a:p>
-            <a:pPr algn="ctr" defTabSz="914309">
-              <a:defRPr/>
-            </a:pPr>
-            <a:r>
-              <a:rPr lang="de-AT" sz="1600" i="1" kern="0" dirty="0">
-                <a:solidFill>
-                  <a:sysClr val="window" lastClr="FFFFFF"/>
-                </a:solidFill>
-                <a:latin typeface="Calibri"/>
-              </a:rPr>
-              <a:t>AP </a:t>
-            </a:r>
-            <a:r>
-              <a:rPr lang="de-AT" sz="1600" i="1" kern="0" dirty="0" err="1" smtClean="0">
-                <a:solidFill>
-                  <a:sysClr val="window" lastClr="FFFFFF"/>
-                </a:solidFill>
-                <a:latin typeface="Calibri"/>
-              </a:rPr>
-              <a:t>Prod</a:t>
-            </a:r>
-            <a:r>
-              <a:rPr lang="de-AT" sz="1600" i="1" kern="0" dirty="0" smtClean="0">
-                <a:solidFill>
-                  <a:sysClr val="window" lastClr="FFFFFF"/>
-                </a:solidFill>
-                <a:latin typeface="Calibri"/>
-              </a:rPr>
-              <a:t> </a:t>
-            </a:r>
-            <a:r>
-              <a:rPr lang="de-AT" sz="1600" i="1" kern="0" dirty="0">
-                <a:solidFill>
-                  <a:sysClr val="window" lastClr="FFFFFF"/>
-                </a:solidFill>
-                <a:latin typeface="Calibri"/>
-              </a:rPr>
-              <a:t>Cert</a:t>
-            </a:r>
-          </a:p>
-        </p:txBody>
-      </p:sp>
-      <p:sp>
-        <p:nvSpPr>
-          <p:cNvPr id="41" name="Rechteck 40"/>
-          <p:cNvSpPr/>
-          <p:nvPr/>
-        </p:nvSpPr>
-        <p:spPr>
-          <a:xfrm>
-            <a:off x="6156177" y="4653136"/>
-            <a:ext cx="1296145" cy="576064"/>
-          </a:xfrm>
-          <a:prstGeom prst="rect">
-            <a:avLst/>
-          </a:prstGeom>
-          <a:ln/>
-        </p:spPr>
-        <p:style>
-          <a:lnRef idx="2">
-            <a:schemeClr val="accent2">
-              <a:shade val="50000"/>
-            </a:schemeClr>
-          </a:lnRef>
-          <a:fillRef idx="1">
-            <a:schemeClr val="accent2"/>
-          </a:fillRef>
-          <a:effectRef idx="0">
-            <a:schemeClr val="accent2"/>
-          </a:effectRef>
-          <a:fontRef idx="minor">
-            <a:schemeClr val="lt1"/>
-          </a:fontRef>
-        </p:style>
-        <p:txBody>
-          <a:bodyPr lIns="91431" tIns="45715" rIns="91431" bIns="45715" rtlCol="0" anchor="ctr"/>
-          <a:lstStyle>
-            <a:defPPr>
-              <a:defRPr lang="en-US"/>
-            </a:defPPr>
-            <a:lvl1pPr marL="0" algn="l" defTabSz="914400" rtl="0" eaLnBrk="1" latinLnBrk="0" hangingPunct="1">
-              <a:defRPr sz="1800" kern="1200">
-                <a:solidFill>
-                  <a:schemeClr val="tx1"/>
-                </a:solidFill>
-                <a:latin typeface="+mn-lt"/>
-                <a:ea typeface="+mn-ea"/>
-                <a:cs typeface="+mn-cs"/>
-              </a:defRPr>
-            </a:lvl1pPr>
-            <a:lvl2pPr marL="457200" algn="l" defTabSz="914400" rtl="0" eaLnBrk="1" latinLnBrk="0" hangingPunct="1">
-              <a:defRPr sz="1800" kern="1200">
-                <a:solidFill>
-                  <a:schemeClr val="tx1"/>
-                </a:solidFill>
-                <a:latin typeface="+mn-lt"/>
-                <a:ea typeface="+mn-ea"/>
-                <a:cs typeface="+mn-cs"/>
-              </a:defRPr>
-            </a:lvl2pPr>
-            <a:lvl3pPr marL="914400" algn="l" defTabSz="914400" rtl="0" eaLnBrk="1" latinLnBrk="0" hangingPunct="1">
-              <a:defRPr sz="1800" kern="1200">
-                <a:solidFill>
-                  <a:schemeClr val="tx1"/>
-                </a:solidFill>
-                <a:latin typeface="+mn-lt"/>
-                <a:ea typeface="+mn-ea"/>
-                <a:cs typeface="+mn-cs"/>
-              </a:defRPr>
-            </a:lvl3pPr>
-            <a:lvl4pPr marL="1371600" algn="l" defTabSz="914400" rtl="0" eaLnBrk="1" latinLnBrk="0" hangingPunct="1">
-              <a:defRPr sz="1800" kern="1200">
-                <a:solidFill>
-                  <a:schemeClr val="tx1"/>
-                </a:solidFill>
-                <a:latin typeface="+mn-lt"/>
-                <a:ea typeface="+mn-ea"/>
-                <a:cs typeface="+mn-cs"/>
-              </a:defRPr>
-            </a:lvl4pPr>
-            <a:lvl5pPr marL="1828800" algn="l" defTabSz="914400" rtl="0" eaLnBrk="1" latinLnBrk="0" hangingPunct="1">
-              <a:defRPr sz="1800" kern="1200">
-                <a:solidFill>
-                  <a:schemeClr val="tx1"/>
-                </a:solidFill>
-                <a:latin typeface="+mn-lt"/>
-                <a:ea typeface="+mn-ea"/>
-                <a:cs typeface="+mn-cs"/>
-              </a:defRPr>
-            </a:lvl5pPr>
-            <a:lvl6pPr marL="2286000" algn="l" defTabSz="914400" rtl="0" eaLnBrk="1" latinLnBrk="0" hangingPunct="1">
-              <a:defRPr sz="1800" kern="1200">
-                <a:solidFill>
-                  <a:schemeClr val="tx1"/>
-                </a:solidFill>
-                <a:latin typeface="+mn-lt"/>
-                <a:ea typeface="+mn-ea"/>
-                <a:cs typeface="+mn-cs"/>
-              </a:defRPr>
-            </a:lvl6pPr>
-            <a:lvl7pPr marL="2743200" algn="l" defTabSz="914400" rtl="0" eaLnBrk="1" latinLnBrk="0" hangingPunct="1">
-              <a:defRPr sz="1800" kern="1200">
-                <a:solidFill>
-                  <a:schemeClr val="tx1"/>
-                </a:solidFill>
-                <a:latin typeface="+mn-lt"/>
-                <a:ea typeface="+mn-ea"/>
-                <a:cs typeface="+mn-cs"/>
-              </a:defRPr>
-            </a:lvl7pPr>
-            <a:lvl8pPr marL="3200400" algn="l" defTabSz="914400" rtl="0" eaLnBrk="1" latinLnBrk="0" hangingPunct="1">
-              <a:defRPr sz="1800" kern="1200">
-                <a:solidFill>
-                  <a:schemeClr val="tx1"/>
-                </a:solidFill>
-                <a:latin typeface="+mn-lt"/>
-                <a:ea typeface="+mn-ea"/>
-                <a:cs typeface="+mn-cs"/>
-              </a:defRPr>
-            </a:lvl8pPr>
-            <a:lvl9pPr marL="3657600" algn="l" defTabSz="914400" rtl="0" eaLnBrk="1" latinLnBrk="0" hangingPunct="1">
-              <a:defRPr sz="1800" kern="1200">
-                <a:solidFill>
-                  <a:schemeClr val="tx1"/>
-                </a:solidFill>
-                <a:latin typeface="+mn-lt"/>
-                <a:ea typeface="+mn-ea"/>
-                <a:cs typeface="+mn-cs"/>
-              </a:defRPr>
-            </a:lvl9pPr>
-          </a:lstStyle>
-          <a:p>
-            <a:pPr algn="ctr" defTabSz="914309">
-              <a:defRPr/>
-            </a:pPr>
-            <a:r>
-              <a:rPr lang="de-AT" sz="1600" i="1" kern="0" dirty="0">
-                <a:solidFill>
-                  <a:sysClr val="window" lastClr="FFFFFF"/>
-                </a:solidFill>
-                <a:latin typeface="Calibri"/>
-              </a:rPr>
-              <a:t>SMP </a:t>
-            </a:r>
-            <a:r>
-              <a:rPr lang="de-AT" sz="1600" i="1" kern="0" dirty="0" err="1" smtClean="0">
-                <a:solidFill>
-                  <a:sysClr val="window" lastClr="FFFFFF"/>
-                </a:solidFill>
-                <a:latin typeface="Calibri"/>
-              </a:rPr>
-              <a:t>Prod</a:t>
-            </a:r>
-            <a:r>
-              <a:rPr lang="de-AT" sz="1600" i="1" kern="0" dirty="0" smtClean="0">
-                <a:solidFill>
-                  <a:sysClr val="window" lastClr="FFFFFF"/>
-                </a:solidFill>
-                <a:latin typeface="Calibri"/>
-              </a:rPr>
-              <a:t> Cert</a:t>
-            </a:r>
-            <a:endParaRPr lang="de-AT" sz="1600" i="1" kern="0" dirty="0">
-              <a:solidFill>
-                <a:sysClr val="window" lastClr="FFFFFF"/>
-              </a:solidFill>
-              <a:latin typeface="Calibri"/>
-            </a:endParaRPr>
-          </a:p>
-        </p:txBody>
-      </p:sp>
-      <p:cxnSp>
-        <p:nvCxnSpPr>
-          <p:cNvPr id="42" name="Gerade Verbindung mit Pfeil 41"/>
-          <p:cNvCxnSpPr>
-            <a:stCxn id="36" idx="2"/>
-            <a:endCxn id="40" idx="0"/>
-          </p:cNvCxnSpPr>
-          <p:nvPr/>
-        </p:nvCxnSpPr>
-        <p:spPr>
-          <a:xfrm>
-            <a:off x="5364090" y="4221088"/>
-            <a:ext cx="0" cy="432048"/>
-          </a:xfrm>
-          <a:prstGeom prst="straightConnector1">
-            <a:avLst/>
-          </a:prstGeom>
-          <a:ln>
-            <a:tailEnd type="arrow"/>
-          </a:ln>
-        </p:spPr>
-        <p:style>
-          <a:lnRef idx="1">
-            <a:schemeClr val="accent1"/>
-          </a:lnRef>
-          <a:fillRef idx="0">
-            <a:schemeClr val="accent1"/>
-          </a:fillRef>
-          <a:effectRef idx="0">
-            <a:schemeClr val="accent1"/>
-          </a:effectRef>
-          <a:fontRef idx="minor">
-            <a:schemeClr val="tx1"/>
-          </a:fontRef>
-        </p:style>
-      </p:cxnSp>
-      <p:cxnSp>
-        <p:nvCxnSpPr>
-          <p:cNvPr id="43" name="Gerade Verbindung mit Pfeil 42"/>
-          <p:cNvCxnSpPr>
-            <a:stCxn id="35" idx="2"/>
-            <a:endCxn id="41" idx="0"/>
-          </p:cNvCxnSpPr>
-          <p:nvPr/>
-        </p:nvCxnSpPr>
-        <p:spPr>
-          <a:xfrm>
-            <a:off x="6804250" y="4221088"/>
-            <a:ext cx="0" cy="432048"/>
-          </a:xfrm>
-          <a:prstGeom prst="straightConnector1">
-            <a:avLst/>
-          </a:prstGeom>
-          <a:ln>
-            <a:tailEnd type="arrow"/>
-          </a:ln>
-        </p:spPr>
-        <p:style>
-          <a:lnRef idx="1">
-            <a:schemeClr val="accent1"/>
-          </a:lnRef>
-          <a:fillRef idx="0">
-            <a:schemeClr val="accent1"/>
-          </a:fillRef>
-          <a:effectRef idx="0">
-            <a:schemeClr val="accent1"/>
-          </a:effectRef>
-          <a:fontRef idx="minor">
-            <a:schemeClr val="tx1"/>
-          </a:fontRef>
-        </p:style>
-      </p:cxnSp>
-      <p:cxnSp>
-        <p:nvCxnSpPr>
-          <p:cNvPr id="27" name="Gewinkelte Verbindung 26"/>
-          <p:cNvCxnSpPr>
-            <a:stCxn id="5" idx="2"/>
-            <a:endCxn id="35" idx="0"/>
-          </p:cNvCxnSpPr>
-          <p:nvPr/>
-        </p:nvCxnSpPr>
-        <p:spPr>
-          <a:xfrm rot="16200000" flipH="1">
-            <a:off x="5345785" y="2186559"/>
-            <a:ext cx="756688" cy="2160241"/>
-          </a:xfrm>
-          <a:prstGeom prst="bentConnector3">
-            <a:avLst>
-              <a:gd name="adj1" fmla="val 50000"/>
-            </a:avLst>
-          </a:prstGeom>
-          <a:ln>
-            <a:tailEnd type="arrow"/>
-          </a:ln>
-        </p:spPr>
-        <p:style>
-          <a:lnRef idx="1">
-            <a:schemeClr val="accent1"/>
-          </a:lnRef>
-          <a:fillRef idx="0">
-            <a:schemeClr val="accent1"/>
-          </a:fillRef>
-          <a:effectRef idx="0">
-            <a:schemeClr val="accent1"/>
-          </a:effectRef>
-          <a:fontRef idx="minor">
-            <a:schemeClr val="tx1"/>
-          </a:fontRef>
-        </p:style>
-      </p:cxnSp>
-      <p:cxnSp>
-        <p:nvCxnSpPr>
-          <p:cNvPr id="32" name="Gewinkelte Verbindung 31"/>
-          <p:cNvCxnSpPr>
-            <a:stCxn id="5" idx="2"/>
-            <a:endCxn id="36" idx="0"/>
-          </p:cNvCxnSpPr>
-          <p:nvPr/>
-        </p:nvCxnSpPr>
-        <p:spPr>
-          <a:xfrm rot="16200000" flipH="1">
-            <a:off x="4625705" y="2906639"/>
-            <a:ext cx="756688" cy="720081"/>
-          </a:xfrm>
-          <a:prstGeom prst="bentConnector3">
-            <a:avLst>
-              <a:gd name="adj1" fmla="val 50000"/>
-            </a:avLst>
-          </a:prstGeom>
-          <a:ln>
-            <a:tailEnd type="arrow"/>
-          </a:ln>
-        </p:spPr>
-        <p:style>
-          <a:lnRef idx="1">
-            <a:schemeClr val="accent1"/>
-          </a:lnRef>
-          <a:fillRef idx="0">
-            <a:schemeClr val="accent1"/>
-          </a:fillRef>
-          <a:effectRef idx="0">
-            <a:schemeClr val="accent1"/>
-          </a:effectRef>
-          <a:fontRef idx="minor">
-            <a:schemeClr val="tx1"/>
-          </a:fontRef>
-        </p:style>
-      </p:cxnSp>
-      <p:cxnSp>
-        <p:nvCxnSpPr>
-          <p:cNvPr id="45" name="Gewinkelte Verbindung 44"/>
-          <p:cNvCxnSpPr>
-            <a:stCxn id="5" idx="2"/>
-            <a:endCxn id="7" idx="0"/>
-          </p:cNvCxnSpPr>
-          <p:nvPr/>
-        </p:nvCxnSpPr>
-        <p:spPr>
-          <a:xfrm rot="5400000">
-            <a:off x="3905625" y="2906640"/>
-            <a:ext cx="756688" cy="720080"/>
-          </a:xfrm>
-          <a:prstGeom prst="bentConnector3">
-            <a:avLst>
-              <a:gd name="adj1" fmla="val 50000"/>
-            </a:avLst>
-          </a:prstGeom>
-          <a:ln>
-            <a:tailEnd type="arrow"/>
-          </a:ln>
-        </p:spPr>
-        <p:style>
-          <a:lnRef idx="1">
-            <a:schemeClr val="accent1"/>
-          </a:lnRef>
-          <a:fillRef idx="0">
-            <a:schemeClr val="accent1"/>
-          </a:fillRef>
-          <a:effectRef idx="0">
-            <a:schemeClr val="accent1"/>
-          </a:effectRef>
-          <a:fontRef idx="minor">
-            <a:schemeClr val="tx1"/>
-          </a:fontRef>
-        </p:style>
-      </p:cxnSp>
+      <p:sp>
+        <p:nvSpPr>
+          <p:cNvPr id="24" name="Titel 23"/>
+          <p:cNvSpPr>
+            <a:spLocks noGrp="1"/>
+          </p:cNvSpPr>
+          <p:nvPr>
+            <p:ph type="title"/>
+          </p:nvPr>
+        </p:nvSpPr>
+        <p:spPr/>
+        <p:txBody>
+          <a:bodyPr/>
+          <a:lstStyle/>
+          <a:p>
+            <a:r>
+              <a:rPr lang="en-GB" dirty="0" smtClean="0"/>
+              <a:t>OpenPEPPOL PKI v3</a:t>
+            </a:r>
+            <a:endParaRPr lang="en-GB" dirty="0"/>
+          </a:p>
+        </p:txBody>
+      </p:sp>
     </p:spTree>
     <p:extLst>
       <p:ext uri="{BB962C8B-B14F-4D97-AF65-F5344CB8AC3E}">

</xml_diff>